<commit_message>
added 2nd picture with dwh layers
</commit_message>
<xml_diff>
--- a/themes/hugo-elate-theme/static/images/Pictures for blog.pptx
+++ b/themes/hugo-elate-theme/static/images/Pictures for blog.pptx
@@ -3497,7 +3497,7 @@
         </p:blipFill>
         <p:spPr>
           <a:xfrm>
-            <a:off x="724029" y="5211435"/>
+            <a:off x="464462" y="5163881"/>
             <a:ext cx="914400" cy="914400"/>
           </a:xfrm>
           <a:prstGeom prst="rect">
@@ -3536,7 +3536,7 @@
         </p:blipFill>
         <p:spPr>
           <a:xfrm>
-            <a:off x="1738988" y="5211435"/>
+            <a:off x="1496981" y="5113631"/>
             <a:ext cx="914400" cy="914400"/>
           </a:xfrm>
           <a:prstGeom prst="rect">
@@ -3575,46 +3575,7 @@
         </p:blipFill>
         <p:spPr>
           <a:xfrm>
-            <a:off x="708974" y="4026630"/>
-            <a:ext cx="914400" cy="914400"/>
-          </a:xfrm>
-          <a:prstGeom prst="rect">
-            <a:avLst/>
-          </a:prstGeom>
-        </p:spPr>
-      </p:pic>
-      <p:pic>
-        <p:nvPicPr>
-          <p:cNvPr id="10" name="Grafika 9" descr="Otwarty folder">
-            <a:extLst>
-              <a:ext uri="{FF2B5EF4-FFF2-40B4-BE49-F238E27FC236}">
-                <a16:creationId xmlns:a16="http://schemas.microsoft.com/office/drawing/2014/main" id="{AFBC10FB-EEEB-4B41-950C-78D45405EB79}"/>
-              </a:ext>
-            </a:extLst>
-          </p:cNvPr>
-          <p:cNvPicPr>
-            <a:picLocks noChangeAspect="1"/>
-          </p:cNvPicPr>
-          <p:nvPr/>
-        </p:nvPicPr>
-        <p:blipFill>
-          <a:blip r:embed="rId9">
-            <a:extLst>
-              <a:ext uri="{28A0092B-C50C-407E-A947-70E740481C1C}">
-                <a14:useLocalDpi xmlns:a14="http://schemas.microsoft.com/office/drawing/2010/main" val="0"/>
-              </a:ext>
-              <a:ext uri="{96DAC541-7B7A-43D3-8B79-37D633B846F1}">
-                <asvg:svgBlip xmlns:asvg="http://schemas.microsoft.com/office/drawing/2016/SVG/main" r:embed="rId10"/>
-              </a:ext>
-            </a:extLst>
-          </a:blip>
-          <a:stretch>
-            <a:fillRect/>
-          </a:stretch>
-        </p:blipFill>
-        <p:spPr>
-          <a:xfrm>
-            <a:off x="1707334" y="4035209"/>
+            <a:off x="437957" y="3864276"/>
             <a:ext cx="914400" cy="914400"/>
           </a:xfrm>
           <a:prstGeom prst="rect">
@@ -3637,13 +3598,13 @@
           <p:nvPr/>
         </p:nvPicPr>
         <p:blipFill>
-          <a:blip r:embed="rId11">
+          <a:blip r:embed="rId9">
             <a:extLst>
               <a:ext uri="{28A0092B-C50C-407E-A947-70E740481C1C}">
                 <a14:useLocalDpi xmlns:a14="http://schemas.microsoft.com/office/drawing/2010/main" val="0"/>
               </a:ext>
               <a:ext uri="{96DAC541-7B7A-43D3-8B79-37D633B846F1}">
-                <asvg:svgBlip xmlns:asvg="http://schemas.microsoft.com/office/drawing/2016/SVG/main" r:embed="rId12"/>
+                <asvg:svgBlip xmlns:asvg="http://schemas.microsoft.com/office/drawing/2016/SVG/main" r:embed="rId10"/>
               </a:ext>
             </a:extLst>
           </a:blip>
@@ -3653,7 +3614,46 @@
         </p:blipFill>
         <p:spPr>
           <a:xfrm>
-            <a:off x="1166174" y="2935408"/>
+            <a:off x="515685" y="2528978"/>
+            <a:ext cx="914400" cy="914400"/>
+          </a:xfrm>
+          <a:prstGeom prst="rect">
+            <a:avLst/>
+          </a:prstGeom>
+        </p:spPr>
+      </p:pic>
+      <p:pic>
+        <p:nvPicPr>
+          <p:cNvPr id="4" name="Grafika 3" descr="Kalendarz dzienny">
+            <a:extLst>
+              <a:ext uri="{FF2B5EF4-FFF2-40B4-BE49-F238E27FC236}">
+                <a16:creationId xmlns:a16="http://schemas.microsoft.com/office/drawing/2014/main" id="{44FE4857-CC6D-4AE3-8438-B12D12861E16}"/>
+              </a:ext>
+            </a:extLst>
+          </p:cNvPr>
+          <p:cNvPicPr>
+            <a:picLocks noChangeAspect="1"/>
+          </p:cNvPicPr>
+          <p:nvPr/>
+        </p:nvPicPr>
+        <p:blipFill>
+          <a:blip r:embed="rId11">
+            <a:extLst>
+              <a:ext uri="{28A0092B-C50C-407E-A947-70E740481C1C}">
+                <a14:useLocalDpi xmlns:a14="http://schemas.microsoft.com/office/drawing/2010/main" val="0"/>
+              </a:ext>
+              <a:ext uri="{96DAC541-7B7A-43D3-8B79-37D633B846F1}">
+                <asvg:svgBlip xmlns:asvg="http://schemas.microsoft.com/office/drawing/2016/SVG/main" r:embed="rId12"/>
+              </a:ext>
+            </a:extLst>
+          </a:blip>
+          <a:stretch>
+            <a:fillRect/>
+          </a:stretch>
+        </p:blipFill>
+        <p:spPr>
+          <a:xfrm>
+            <a:off x="1496981" y="2535962"/>
             <a:ext cx="914400" cy="914400"/>
           </a:xfrm>
           <a:prstGeom prst="rect">
@@ -3663,10 +3663,10 @@
       </p:pic>
       <p:sp>
         <p:nvSpPr>
-          <p:cNvPr id="13" name="Prostokąt: zaokrąglone rogi 12">
+          <p:cNvPr id="9" name="Schemat blokowy: dysk magnetyczny 8">
             <a:extLst>
               <a:ext uri="{FF2B5EF4-FFF2-40B4-BE49-F238E27FC236}">
-                <a16:creationId xmlns:a16="http://schemas.microsoft.com/office/drawing/2014/main" id="{99F87B7D-3ACA-471D-8FBE-DE88E017F66D}"/>
+                <a16:creationId xmlns:a16="http://schemas.microsoft.com/office/drawing/2014/main" id="{8C447BA2-C81D-440D-900A-2620E64FAA0D}"/>
               </a:ext>
             </a:extLst>
           </p:cNvPr>
@@ -3675,19 +3675,2494 @@
         </p:nvSpPr>
         <p:spPr>
           <a:xfrm>
-            <a:off x="293333" y="2040834"/>
-            <a:ext cx="2690191" cy="4359966"/>
+            <a:off x="3288515" y="3229776"/>
+            <a:ext cx="1099931" cy="410818"/>
           </a:xfrm>
-          <a:prstGeom prst="roundRect">
+          <a:prstGeom prst="flowChartMagneticDisk">
+            <a:avLst/>
+          </a:prstGeom>
+          <a:ln>
+            <a:solidFill>
+              <a:srgbClr val="11CFD9"/>
+            </a:solidFill>
+          </a:ln>
+        </p:spPr>
+        <p:style>
+          <a:lnRef idx="2">
+            <a:schemeClr val="accent6"/>
+          </a:lnRef>
+          <a:fillRef idx="1">
+            <a:schemeClr val="lt1"/>
+          </a:fillRef>
+          <a:effectRef idx="0">
+            <a:schemeClr val="accent6"/>
+          </a:effectRef>
+          <a:fontRef idx="minor">
+            <a:schemeClr val="dk1"/>
+          </a:fontRef>
+        </p:style>
+        <p:txBody>
+          <a:bodyPr rtlCol="0" anchor="ctr"/>
+          <a:lstStyle/>
+          <a:p>
+            <a:pPr algn="ctr"/>
+            <a:endParaRPr lang="pl-PL"/>
+          </a:p>
+        </p:txBody>
+      </p:sp>
+      <p:sp>
+        <p:nvSpPr>
+          <p:cNvPr id="14" name="Schemat blokowy: dysk magnetyczny 13">
+            <a:extLst>
+              <a:ext uri="{FF2B5EF4-FFF2-40B4-BE49-F238E27FC236}">
+                <a16:creationId xmlns:a16="http://schemas.microsoft.com/office/drawing/2014/main" id="{24F99C1B-AF06-4611-8CEB-9B09C2EF3DD4}"/>
+              </a:ext>
+            </a:extLst>
+          </p:cNvPr>
+          <p:cNvSpPr/>
+          <p:nvPr/>
+        </p:nvSpPr>
+        <p:spPr>
+          <a:xfrm>
+            <a:off x="3288516" y="3854863"/>
+            <a:ext cx="1099931" cy="410818"/>
+          </a:xfrm>
+          <a:prstGeom prst="flowChartMagneticDisk">
+            <a:avLst/>
+          </a:prstGeom>
+          <a:ln>
+            <a:solidFill>
+              <a:srgbClr val="11CFD9"/>
+            </a:solidFill>
+          </a:ln>
+        </p:spPr>
+        <p:style>
+          <a:lnRef idx="2">
+            <a:schemeClr val="accent6"/>
+          </a:lnRef>
+          <a:fillRef idx="1">
+            <a:schemeClr val="lt1"/>
+          </a:fillRef>
+          <a:effectRef idx="0">
+            <a:schemeClr val="accent6"/>
+          </a:effectRef>
+          <a:fontRef idx="minor">
+            <a:schemeClr val="dk1"/>
+          </a:fontRef>
+        </p:style>
+        <p:txBody>
+          <a:bodyPr rtlCol="0" anchor="ctr"/>
+          <a:lstStyle/>
+          <a:p>
+            <a:pPr algn="ctr"/>
+            <a:endParaRPr lang="pl-PL"/>
+          </a:p>
+        </p:txBody>
+      </p:sp>
+      <p:sp>
+        <p:nvSpPr>
+          <p:cNvPr id="15" name="Schemat blokowy: dysk magnetyczny 14">
+            <a:extLst>
+              <a:ext uri="{FF2B5EF4-FFF2-40B4-BE49-F238E27FC236}">
+                <a16:creationId xmlns:a16="http://schemas.microsoft.com/office/drawing/2014/main" id="{592223A3-74CC-4D9D-8C3D-D1D01AE9D903}"/>
+              </a:ext>
+            </a:extLst>
+          </p:cNvPr>
+          <p:cNvSpPr/>
+          <p:nvPr/>
+        </p:nvSpPr>
+        <p:spPr>
+          <a:xfrm>
+            <a:off x="3288516" y="4459057"/>
+            <a:ext cx="1099931" cy="410818"/>
+          </a:xfrm>
+          <a:prstGeom prst="flowChartMagneticDisk">
+            <a:avLst/>
+          </a:prstGeom>
+          <a:ln>
+            <a:solidFill>
+              <a:srgbClr val="11CFD9"/>
+            </a:solidFill>
+          </a:ln>
+        </p:spPr>
+        <p:style>
+          <a:lnRef idx="2">
+            <a:schemeClr val="accent6"/>
+          </a:lnRef>
+          <a:fillRef idx="1">
+            <a:schemeClr val="lt1"/>
+          </a:fillRef>
+          <a:effectRef idx="0">
+            <a:schemeClr val="accent6"/>
+          </a:effectRef>
+          <a:fontRef idx="minor">
+            <a:schemeClr val="dk1"/>
+          </a:fontRef>
+        </p:style>
+        <p:txBody>
+          <a:bodyPr rtlCol="0" anchor="ctr"/>
+          <a:lstStyle/>
+          <a:p>
+            <a:pPr algn="ctr"/>
+            <a:endParaRPr lang="pl-PL"/>
+          </a:p>
+        </p:txBody>
+      </p:sp>
+      <p:pic>
+        <p:nvPicPr>
+          <p:cNvPr id="38" name="Grafika 37" descr="Baza danych">
+            <a:extLst>
+              <a:ext uri="{FF2B5EF4-FFF2-40B4-BE49-F238E27FC236}">
+                <a16:creationId xmlns:a16="http://schemas.microsoft.com/office/drawing/2014/main" id="{F4E90393-76FF-4E59-8A88-D3238E71AAA9}"/>
+              </a:ext>
+            </a:extLst>
+          </p:cNvPr>
+          <p:cNvPicPr>
+            <a:picLocks noChangeAspect="1"/>
+          </p:cNvPicPr>
+          <p:nvPr/>
+        </p:nvPicPr>
+        <p:blipFill>
+          <a:blip r:embed="rId5">
+            <a:extLst>
+              <a:ext uri="{28A0092B-C50C-407E-A947-70E740481C1C}">
+                <a14:useLocalDpi xmlns:a14="http://schemas.microsoft.com/office/drawing/2010/main" val="0"/>
+              </a:ext>
+              <a:ext uri="{96DAC541-7B7A-43D3-8B79-37D633B846F1}">
+                <asvg:svgBlip xmlns:asvg="http://schemas.microsoft.com/office/drawing/2016/SVG/main" r:embed="rId6"/>
+              </a:ext>
+            </a:extLst>
+          </a:blip>
+          <a:stretch>
+            <a:fillRect/>
+          </a:stretch>
+        </p:blipFill>
+        <p:spPr>
+          <a:xfrm>
+            <a:off x="10307140" y="2552083"/>
+            <a:ext cx="1392064" cy="1078679"/>
+          </a:xfrm>
+          <a:prstGeom prst="rect">
+            <a:avLst/>
+          </a:prstGeom>
+        </p:spPr>
+      </p:pic>
+      <p:pic>
+        <p:nvPicPr>
+          <p:cNvPr id="39" name="Grafika 38" descr="Baza danych">
+            <a:extLst>
+              <a:ext uri="{FF2B5EF4-FFF2-40B4-BE49-F238E27FC236}">
+                <a16:creationId xmlns:a16="http://schemas.microsoft.com/office/drawing/2014/main" id="{3D974693-F6C5-4EBD-B6D8-DAEB9C441C82}"/>
+              </a:ext>
+            </a:extLst>
+          </p:cNvPr>
+          <p:cNvPicPr>
+            <a:picLocks noChangeAspect="1"/>
+          </p:cNvPicPr>
+          <p:nvPr/>
+        </p:nvPicPr>
+        <p:blipFill>
+          <a:blip r:embed="rId5">
+            <a:extLst>
+              <a:ext uri="{28A0092B-C50C-407E-A947-70E740481C1C}">
+                <a14:useLocalDpi xmlns:a14="http://schemas.microsoft.com/office/drawing/2010/main" val="0"/>
+              </a:ext>
+              <a:ext uri="{96DAC541-7B7A-43D3-8B79-37D633B846F1}">
+                <asvg:svgBlip xmlns:asvg="http://schemas.microsoft.com/office/drawing/2016/SVG/main" r:embed="rId6"/>
+              </a:ext>
+            </a:extLst>
+          </a:blip>
+          <a:stretch>
+            <a:fillRect/>
+          </a:stretch>
+        </p:blipFill>
+        <p:spPr>
+          <a:xfrm>
+            <a:off x="10307140" y="3740160"/>
+            <a:ext cx="1392064" cy="1078679"/>
+          </a:xfrm>
+          <a:prstGeom prst="rect">
+            <a:avLst/>
+          </a:prstGeom>
+        </p:spPr>
+      </p:pic>
+      <p:pic>
+        <p:nvPicPr>
+          <p:cNvPr id="40" name="Grafika 39" descr="Baza danych">
+            <a:extLst>
+              <a:ext uri="{FF2B5EF4-FFF2-40B4-BE49-F238E27FC236}">
+                <a16:creationId xmlns:a16="http://schemas.microsoft.com/office/drawing/2014/main" id="{BD9550F6-DE5F-456C-A089-569F434E645C}"/>
+              </a:ext>
+            </a:extLst>
+          </p:cNvPr>
+          <p:cNvPicPr>
+            <a:picLocks noChangeAspect="1"/>
+          </p:cNvPicPr>
+          <p:nvPr/>
+        </p:nvPicPr>
+        <p:blipFill>
+          <a:blip r:embed="rId5">
+            <a:extLst>
+              <a:ext uri="{28A0092B-C50C-407E-A947-70E740481C1C}">
+                <a14:useLocalDpi xmlns:a14="http://schemas.microsoft.com/office/drawing/2010/main" val="0"/>
+              </a:ext>
+              <a:ext uri="{96DAC541-7B7A-43D3-8B79-37D633B846F1}">
+                <asvg:svgBlip xmlns:asvg="http://schemas.microsoft.com/office/drawing/2016/SVG/main" r:embed="rId6"/>
+              </a:ext>
+            </a:extLst>
+          </a:blip>
+          <a:stretch>
+            <a:fillRect/>
+          </a:stretch>
+        </p:blipFill>
+        <p:spPr>
+          <a:xfrm>
+            <a:off x="10307140" y="4981239"/>
+            <a:ext cx="1392064" cy="1078679"/>
+          </a:xfrm>
+          <a:prstGeom prst="rect">
+            <a:avLst/>
+          </a:prstGeom>
+        </p:spPr>
+      </p:pic>
+      <p:pic>
+        <p:nvPicPr>
+          <p:cNvPr id="41" name="Grafika 40" descr="Dokument">
+            <a:extLst>
+              <a:ext uri="{FF2B5EF4-FFF2-40B4-BE49-F238E27FC236}">
+                <a16:creationId xmlns:a16="http://schemas.microsoft.com/office/drawing/2014/main" id="{F095E350-E1AC-480D-B498-CB7B2529B23F}"/>
+              </a:ext>
+            </a:extLst>
+          </p:cNvPr>
+          <p:cNvPicPr>
+            <a:picLocks noChangeAspect="1"/>
+          </p:cNvPicPr>
+          <p:nvPr/>
+        </p:nvPicPr>
+        <p:blipFill>
+          <a:blip r:embed="rId13">
+            <a:extLst>
+              <a:ext uri="{28A0092B-C50C-407E-A947-70E740481C1C}">
+                <a14:useLocalDpi xmlns:a14="http://schemas.microsoft.com/office/drawing/2010/main" val="0"/>
+              </a:ext>
+              <a:ext uri="{96DAC541-7B7A-43D3-8B79-37D633B846F1}">
+                <asvg:svgBlip xmlns:asvg="http://schemas.microsoft.com/office/drawing/2016/SVG/main" r:embed="rId14"/>
+              </a:ext>
+            </a:extLst>
+          </a:blip>
+          <a:stretch>
+            <a:fillRect/>
+          </a:stretch>
+        </p:blipFill>
+        <p:spPr>
+          <a:xfrm>
+            <a:off x="478434" y="3794192"/>
+            <a:ext cx="914400" cy="914400"/>
+          </a:xfrm>
+          <a:prstGeom prst="rect">
+            <a:avLst/>
+          </a:prstGeom>
+        </p:spPr>
+      </p:pic>
+      <p:pic>
+        <p:nvPicPr>
+          <p:cNvPr id="42" name="Grafika 41" descr="Pobieranie z chmury">
+            <a:extLst>
+              <a:ext uri="{FF2B5EF4-FFF2-40B4-BE49-F238E27FC236}">
+                <a16:creationId xmlns:a16="http://schemas.microsoft.com/office/drawing/2014/main" id="{28E5113E-56E3-40A8-87C4-61BB5AF6429A}"/>
+              </a:ext>
+            </a:extLst>
+          </p:cNvPr>
+          <p:cNvPicPr>
+            <a:picLocks noChangeAspect="1"/>
+          </p:cNvPicPr>
+          <p:nvPr/>
+        </p:nvPicPr>
+        <p:blipFill>
+          <a:blip r:embed="rId15">
+            <a:extLst>
+              <a:ext uri="{28A0092B-C50C-407E-A947-70E740481C1C}">
+                <a14:useLocalDpi xmlns:a14="http://schemas.microsoft.com/office/drawing/2010/main" val="0"/>
+              </a:ext>
+              <a:ext uri="{96DAC541-7B7A-43D3-8B79-37D633B846F1}">
+                <asvg:svgBlip xmlns:asvg="http://schemas.microsoft.com/office/drawing/2016/SVG/main" r:embed="rId16"/>
+              </a:ext>
+            </a:extLst>
+          </a:blip>
+          <a:stretch>
+            <a:fillRect/>
+          </a:stretch>
+        </p:blipFill>
+        <p:spPr>
+          <a:xfrm>
+            <a:off x="540600" y="2580576"/>
+            <a:ext cx="914400" cy="914400"/>
+          </a:xfrm>
+          <a:prstGeom prst="rect">
+            <a:avLst/>
+          </a:prstGeom>
+        </p:spPr>
+      </p:pic>
+      <p:pic>
+        <p:nvPicPr>
+          <p:cNvPr id="43" name="Grafika 42" descr="Kalendarz dzienny">
+            <a:extLst>
+              <a:ext uri="{FF2B5EF4-FFF2-40B4-BE49-F238E27FC236}">
+                <a16:creationId xmlns:a16="http://schemas.microsoft.com/office/drawing/2014/main" id="{2BF003CC-5061-4B40-A0F9-5B3E666118EC}"/>
+              </a:ext>
+            </a:extLst>
+          </p:cNvPr>
+          <p:cNvPicPr>
+            <a:picLocks noChangeAspect="1"/>
+          </p:cNvPicPr>
+          <p:nvPr/>
+        </p:nvPicPr>
+        <p:blipFill>
+          <a:blip r:embed="rId17">
+            <a:extLst>
+              <a:ext uri="{28A0092B-C50C-407E-A947-70E740481C1C}">
+                <a14:useLocalDpi xmlns:a14="http://schemas.microsoft.com/office/drawing/2010/main" val="0"/>
+              </a:ext>
+              <a:ext uri="{96DAC541-7B7A-43D3-8B79-37D633B846F1}">
+                <asvg:svgBlip xmlns:asvg="http://schemas.microsoft.com/office/drawing/2016/SVG/main" r:embed="rId18"/>
+              </a:ext>
+            </a:extLst>
+          </a:blip>
+          <a:stretch>
+            <a:fillRect/>
+          </a:stretch>
+        </p:blipFill>
+        <p:spPr>
+          <a:xfrm>
+            <a:off x="1535124" y="2618201"/>
+            <a:ext cx="914400" cy="914400"/>
+          </a:xfrm>
+          <a:prstGeom prst="rect">
+            <a:avLst/>
+          </a:prstGeom>
+        </p:spPr>
+      </p:pic>
+      <p:grpSp>
+        <p:nvGrpSpPr>
+          <p:cNvPr id="130" name="Grupa 129">
+            <a:extLst>
+              <a:ext uri="{FF2B5EF4-FFF2-40B4-BE49-F238E27FC236}">
+                <a16:creationId xmlns:a16="http://schemas.microsoft.com/office/drawing/2014/main" id="{CBFB8C34-6BE9-4EA5-A21A-D8A97972CFED}"/>
+              </a:ext>
+            </a:extLst>
+          </p:cNvPr>
+          <p:cNvGrpSpPr/>
+          <p:nvPr/>
+        </p:nvGrpSpPr>
+        <p:grpSpPr>
+          <a:xfrm>
+            <a:off x="5362922" y="2927815"/>
+            <a:ext cx="1414442" cy="2880086"/>
+            <a:chOff x="5361837" y="2683120"/>
+            <a:chExt cx="1414442" cy="2880086"/>
+          </a:xfrm>
+        </p:grpSpPr>
+        <p:sp>
+          <p:nvSpPr>
+            <p:cNvPr id="11" name="Prostokąt 10">
+              <a:extLst>
+                <a:ext uri="{FF2B5EF4-FFF2-40B4-BE49-F238E27FC236}">
+                  <a16:creationId xmlns:a16="http://schemas.microsoft.com/office/drawing/2014/main" id="{840F94FE-8DBD-4F85-AECD-20647E27F9F4}"/>
+                </a:ext>
+              </a:extLst>
+            </p:cNvPr>
+            <p:cNvSpPr/>
+            <p:nvPr/>
+          </p:nvSpPr>
+          <p:spPr>
+            <a:xfrm>
+              <a:off x="5506654" y="3360389"/>
+              <a:ext cx="357809" cy="326866"/>
+            </a:xfrm>
+            <a:prstGeom prst="rect">
+              <a:avLst/>
+            </a:prstGeom>
+            <a:solidFill>
+              <a:schemeClr val="bg1"/>
+            </a:solidFill>
+            <a:ln>
+              <a:solidFill>
+                <a:srgbClr val="11CFD9"/>
+              </a:solidFill>
+            </a:ln>
+          </p:spPr>
+          <p:style>
+            <a:lnRef idx="2">
+              <a:schemeClr val="accent1">
+                <a:shade val="50000"/>
+              </a:schemeClr>
+            </a:lnRef>
+            <a:fillRef idx="1">
+              <a:schemeClr val="accent1"/>
+            </a:fillRef>
+            <a:effectRef idx="0">
+              <a:schemeClr val="accent1"/>
+            </a:effectRef>
+            <a:fontRef idx="minor">
+              <a:schemeClr val="lt1"/>
+            </a:fontRef>
+          </p:style>
+          <p:txBody>
+            <a:bodyPr rtlCol="0" anchor="ctr"/>
+            <a:lstStyle/>
+            <a:p>
+              <a:pPr algn="ctr"/>
+              <a:endParaRPr lang="pl-PL"/>
+            </a:p>
+          </p:txBody>
+        </p:sp>
+        <p:sp>
+          <p:nvSpPr>
+            <p:cNvPr id="23" name="Prostokąt 22">
+              <a:extLst>
+                <a:ext uri="{FF2B5EF4-FFF2-40B4-BE49-F238E27FC236}">
+                  <a16:creationId xmlns:a16="http://schemas.microsoft.com/office/drawing/2014/main" id="{3D546C18-B024-421E-A53A-AAC775B356C4}"/>
+                </a:ext>
+              </a:extLst>
+            </p:cNvPr>
+            <p:cNvSpPr/>
+            <p:nvPr/>
+          </p:nvSpPr>
+          <p:spPr>
+            <a:xfrm>
+              <a:off x="5806611" y="3952634"/>
+              <a:ext cx="357809" cy="326866"/>
+            </a:xfrm>
+            <a:prstGeom prst="rect">
+              <a:avLst/>
+            </a:prstGeom>
+            <a:solidFill>
+              <a:schemeClr val="bg1"/>
+            </a:solidFill>
+            <a:ln>
+              <a:solidFill>
+                <a:srgbClr val="11CFD9"/>
+              </a:solidFill>
+            </a:ln>
+          </p:spPr>
+          <p:style>
+            <a:lnRef idx="2">
+              <a:schemeClr val="accent1">
+                <a:shade val="50000"/>
+              </a:schemeClr>
+            </a:lnRef>
+            <a:fillRef idx="1">
+              <a:schemeClr val="accent1"/>
+            </a:fillRef>
+            <a:effectRef idx="0">
+              <a:schemeClr val="accent1"/>
+            </a:effectRef>
+            <a:fontRef idx="minor">
+              <a:schemeClr val="lt1"/>
+            </a:fontRef>
+          </p:style>
+          <p:txBody>
+            <a:bodyPr rtlCol="0" anchor="ctr"/>
+            <a:lstStyle/>
+            <a:p>
+              <a:pPr algn="ctr"/>
+              <a:endParaRPr lang="pl-PL"/>
+            </a:p>
+          </p:txBody>
+        </p:sp>
+        <p:sp>
+          <p:nvSpPr>
+            <p:cNvPr id="24" name="Prostokąt 23">
+              <a:extLst>
+                <a:ext uri="{FF2B5EF4-FFF2-40B4-BE49-F238E27FC236}">
+                  <a16:creationId xmlns:a16="http://schemas.microsoft.com/office/drawing/2014/main" id="{80C62FFC-213C-469A-A967-ED2E303F1939}"/>
+                </a:ext>
+              </a:extLst>
+            </p:cNvPr>
+            <p:cNvSpPr/>
+            <p:nvPr/>
+          </p:nvSpPr>
+          <p:spPr>
+            <a:xfrm>
+              <a:off x="5685558" y="2683120"/>
+              <a:ext cx="357809" cy="326866"/>
+            </a:xfrm>
+            <a:prstGeom prst="rect">
+              <a:avLst/>
+            </a:prstGeom>
+            <a:solidFill>
+              <a:schemeClr val="bg1"/>
+            </a:solidFill>
+            <a:ln>
+              <a:solidFill>
+                <a:srgbClr val="11CFD9"/>
+              </a:solidFill>
+            </a:ln>
+          </p:spPr>
+          <p:style>
+            <a:lnRef idx="2">
+              <a:schemeClr val="accent1">
+                <a:shade val="50000"/>
+              </a:schemeClr>
+            </a:lnRef>
+            <a:fillRef idx="1">
+              <a:schemeClr val="accent1"/>
+            </a:fillRef>
+            <a:effectRef idx="0">
+              <a:schemeClr val="accent1"/>
+            </a:effectRef>
+            <a:fontRef idx="minor">
+              <a:schemeClr val="lt1"/>
+            </a:fontRef>
+          </p:style>
+          <p:txBody>
+            <a:bodyPr rtlCol="0" anchor="ctr"/>
+            <a:lstStyle/>
+            <a:p>
+              <a:pPr algn="ctr"/>
+              <a:endParaRPr lang="pl-PL"/>
+            </a:p>
+          </p:txBody>
+        </p:sp>
+        <p:sp>
+          <p:nvSpPr>
+            <p:cNvPr id="25" name="Prostokąt 24">
+              <a:extLst>
+                <a:ext uri="{FF2B5EF4-FFF2-40B4-BE49-F238E27FC236}">
+                  <a16:creationId xmlns:a16="http://schemas.microsoft.com/office/drawing/2014/main" id="{7CC0A18D-689E-4BF0-8949-1A075553164D}"/>
+                </a:ext>
+              </a:extLst>
+            </p:cNvPr>
+            <p:cNvSpPr/>
+            <p:nvPr/>
+          </p:nvSpPr>
+          <p:spPr>
+            <a:xfrm>
+              <a:off x="5361837" y="4523470"/>
+              <a:ext cx="357809" cy="326866"/>
+            </a:xfrm>
+            <a:prstGeom prst="rect">
+              <a:avLst/>
+            </a:prstGeom>
+            <a:solidFill>
+              <a:schemeClr val="bg1"/>
+            </a:solidFill>
+            <a:ln>
+              <a:solidFill>
+                <a:srgbClr val="11CFD9"/>
+              </a:solidFill>
+            </a:ln>
+          </p:spPr>
+          <p:style>
+            <a:lnRef idx="2">
+              <a:schemeClr val="accent1">
+                <a:shade val="50000"/>
+              </a:schemeClr>
+            </a:lnRef>
+            <a:fillRef idx="1">
+              <a:schemeClr val="accent1"/>
+            </a:fillRef>
+            <a:effectRef idx="0">
+              <a:schemeClr val="accent1"/>
+            </a:effectRef>
+            <a:fontRef idx="minor">
+              <a:schemeClr val="lt1"/>
+            </a:fontRef>
+          </p:style>
+          <p:txBody>
+            <a:bodyPr rtlCol="0" anchor="ctr"/>
+            <a:lstStyle/>
+            <a:p>
+              <a:pPr algn="ctr"/>
+              <a:endParaRPr lang="pl-PL"/>
+            </a:p>
+          </p:txBody>
+        </p:sp>
+        <p:sp>
+          <p:nvSpPr>
+            <p:cNvPr id="26" name="Prostokąt 25">
+              <a:extLst>
+                <a:ext uri="{FF2B5EF4-FFF2-40B4-BE49-F238E27FC236}">
+                  <a16:creationId xmlns:a16="http://schemas.microsoft.com/office/drawing/2014/main" id="{7008C7E1-584A-4138-A297-B4849C4B3478}"/>
+                </a:ext>
+              </a:extLst>
+            </p:cNvPr>
+            <p:cNvSpPr/>
+            <p:nvPr/>
+          </p:nvSpPr>
+          <p:spPr>
+            <a:xfrm>
+              <a:off x="6366587" y="3961353"/>
+              <a:ext cx="357809" cy="326866"/>
+            </a:xfrm>
+            <a:prstGeom prst="rect">
+              <a:avLst/>
+            </a:prstGeom>
+            <a:solidFill>
+              <a:schemeClr val="bg1"/>
+            </a:solidFill>
+            <a:ln>
+              <a:solidFill>
+                <a:srgbClr val="11CFD9"/>
+              </a:solidFill>
+            </a:ln>
+          </p:spPr>
+          <p:style>
+            <a:lnRef idx="2">
+              <a:schemeClr val="accent1">
+                <a:shade val="50000"/>
+              </a:schemeClr>
+            </a:lnRef>
+            <a:fillRef idx="1">
+              <a:schemeClr val="accent1"/>
+            </a:fillRef>
+            <a:effectRef idx="0">
+              <a:schemeClr val="accent1"/>
+            </a:effectRef>
+            <a:fontRef idx="minor">
+              <a:schemeClr val="lt1"/>
+            </a:fontRef>
+          </p:style>
+          <p:txBody>
+            <a:bodyPr rtlCol="0" anchor="ctr"/>
+            <a:lstStyle/>
+            <a:p>
+              <a:pPr algn="ctr"/>
+              <a:endParaRPr lang="pl-PL"/>
+            </a:p>
+          </p:txBody>
+        </p:sp>
+        <p:sp>
+          <p:nvSpPr>
+            <p:cNvPr id="27" name="Prostokąt 26">
+              <a:extLst>
+                <a:ext uri="{FF2B5EF4-FFF2-40B4-BE49-F238E27FC236}">
+                  <a16:creationId xmlns:a16="http://schemas.microsoft.com/office/drawing/2014/main" id="{DE07E89A-3092-4385-A635-7A57DAA7F2B7}"/>
+                </a:ext>
+              </a:extLst>
+            </p:cNvPr>
+            <p:cNvSpPr/>
+            <p:nvPr/>
+          </p:nvSpPr>
+          <p:spPr>
+            <a:xfrm>
+              <a:off x="6040304" y="4611967"/>
+              <a:ext cx="357809" cy="326866"/>
+            </a:xfrm>
+            <a:prstGeom prst="rect">
+              <a:avLst/>
+            </a:prstGeom>
+            <a:solidFill>
+              <a:schemeClr val="bg1"/>
+            </a:solidFill>
+            <a:ln>
+              <a:solidFill>
+                <a:srgbClr val="11CFD9"/>
+              </a:solidFill>
+            </a:ln>
+          </p:spPr>
+          <p:style>
+            <a:lnRef idx="2">
+              <a:schemeClr val="accent1">
+                <a:shade val="50000"/>
+              </a:schemeClr>
+            </a:lnRef>
+            <a:fillRef idx="1">
+              <a:schemeClr val="accent1"/>
+            </a:fillRef>
+            <a:effectRef idx="0">
+              <a:schemeClr val="accent1"/>
+            </a:effectRef>
+            <a:fontRef idx="minor">
+              <a:schemeClr val="lt1"/>
+            </a:fontRef>
+          </p:style>
+          <p:txBody>
+            <a:bodyPr rtlCol="0" anchor="ctr"/>
+            <a:lstStyle/>
+            <a:p>
+              <a:pPr algn="ctr"/>
+              <a:endParaRPr lang="pl-PL"/>
+            </a:p>
+          </p:txBody>
+        </p:sp>
+        <p:sp>
+          <p:nvSpPr>
+            <p:cNvPr id="28" name="Prostokąt 27">
+              <a:extLst>
+                <a:ext uri="{FF2B5EF4-FFF2-40B4-BE49-F238E27FC236}">
+                  <a16:creationId xmlns:a16="http://schemas.microsoft.com/office/drawing/2014/main" id="{05D6D37A-422C-4AC8-9EE3-53E4348B2BA2}"/>
+                </a:ext>
+              </a:extLst>
+            </p:cNvPr>
+            <p:cNvSpPr/>
+            <p:nvPr/>
+          </p:nvSpPr>
+          <p:spPr>
+            <a:xfrm>
+              <a:off x="6297083" y="3123496"/>
+              <a:ext cx="357809" cy="326866"/>
+            </a:xfrm>
+            <a:prstGeom prst="rect">
+              <a:avLst/>
+            </a:prstGeom>
+            <a:solidFill>
+              <a:schemeClr val="bg1"/>
+            </a:solidFill>
+            <a:ln>
+              <a:solidFill>
+                <a:srgbClr val="11CFD9"/>
+              </a:solidFill>
+            </a:ln>
+          </p:spPr>
+          <p:style>
+            <a:lnRef idx="2">
+              <a:schemeClr val="accent1">
+                <a:shade val="50000"/>
+              </a:schemeClr>
+            </a:lnRef>
+            <a:fillRef idx="1">
+              <a:schemeClr val="accent1"/>
+            </a:fillRef>
+            <a:effectRef idx="0">
+              <a:schemeClr val="accent1"/>
+            </a:effectRef>
+            <a:fontRef idx="minor">
+              <a:schemeClr val="lt1"/>
+            </a:fontRef>
+          </p:style>
+          <p:txBody>
+            <a:bodyPr rtlCol="0" anchor="ctr"/>
+            <a:lstStyle/>
+            <a:p>
+              <a:pPr algn="ctr"/>
+              <a:endParaRPr lang="pl-PL"/>
+            </a:p>
+          </p:txBody>
+        </p:sp>
+        <p:sp>
+          <p:nvSpPr>
+            <p:cNvPr id="29" name="Prostokąt 28">
+              <a:extLst>
+                <a:ext uri="{FF2B5EF4-FFF2-40B4-BE49-F238E27FC236}">
+                  <a16:creationId xmlns:a16="http://schemas.microsoft.com/office/drawing/2014/main" id="{1FC6A00C-9945-477E-9A27-4758A3E25AEE}"/>
+                </a:ext>
+              </a:extLst>
+            </p:cNvPr>
+            <p:cNvSpPr/>
+            <p:nvPr/>
+          </p:nvSpPr>
+          <p:spPr>
+            <a:xfrm>
+              <a:off x="5653761" y="5236340"/>
+              <a:ext cx="357809" cy="326866"/>
+            </a:xfrm>
+            <a:prstGeom prst="rect">
+              <a:avLst/>
+            </a:prstGeom>
+            <a:solidFill>
+              <a:schemeClr val="bg1"/>
+            </a:solidFill>
+            <a:ln>
+              <a:solidFill>
+                <a:srgbClr val="11CFD9"/>
+              </a:solidFill>
+            </a:ln>
+          </p:spPr>
+          <p:style>
+            <a:lnRef idx="2">
+              <a:schemeClr val="accent1">
+                <a:shade val="50000"/>
+              </a:schemeClr>
+            </a:lnRef>
+            <a:fillRef idx="1">
+              <a:schemeClr val="accent1"/>
+            </a:fillRef>
+            <a:effectRef idx="0">
+              <a:schemeClr val="accent1"/>
+            </a:effectRef>
+            <a:fontRef idx="minor">
+              <a:schemeClr val="lt1"/>
+            </a:fontRef>
+          </p:style>
+          <p:txBody>
+            <a:bodyPr rtlCol="0" anchor="ctr"/>
+            <a:lstStyle/>
+            <a:p>
+              <a:pPr algn="ctr"/>
+              <a:endParaRPr lang="pl-PL"/>
+            </a:p>
+          </p:txBody>
+        </p:sp>
+        <p:sp>
+          <p:nvSpPr>
+            <p:cNvPr id="30" name="Prostokąt 29">
+              <a:extLst>
+                <a:ext uri="{FF2B5EF4-FFF2-40B4-BE49-F238E27FC236}">
+                  <a16:creationId xmlns:a16="http://schemas.microsoft.com/office/drawing/2014/main" id="{1CA690A3-23A6-47EF-8682-B96D3369AD17}"/>
+                </a:ext>
+              </a:extLst>
+            </p:cNvPr>
+            <p:cNvSpPr/>
+            <p:nvPr/>
+          </p:nvSpPr>
+          <p:spPr>
+            <a:xfrm>
+              <a:off x="6418470" y="5016199"/>
+              <a:ext cx="357809" cy="326866"/>
+            </a:xfrm>
+            <a:prstGeom prst="rect">
+              <a:avLst/>
+            </a:prstGeom>
+            <a:solidFill>
+              <a:schemeClr val="bg1"/>
+            </a:solidFill>
+            <a:ln>
+              <a:solidFill>
+                <a:srgbClr val="11CFD9"/>
+              </a:solidFill>
+            </a:ln>
+          </p:spPr>
+          <p:style>
+            <a:lnRef idx="2">
+              <a:schemeClr val="accent1">
+                <a:shade val="50000"/>
+              </a:schemeClr>
+            </a:lnRef>
+            <a:fillRef idx="1">
+              <a:schemeClr val="accent1"/>
+            </a:fillRef>
+            <a:effectRef idx="0">
+              <a:schemeClr val="accent1"/>
+            </a:effectRef>
+            <a:fontRef idx="minor">
+              <a:schemeClr val="lt1"/>
+            </a:fontRef>
+          </p:style>
+          <p:txBody>
+            <a:bodyPr rtlCol="0" anchor="ctr"/>
+            <a:lstStyle/>
+            <a:p>
+              <a:pPr algn="ctr"/>
+              <a:endParaRPr lang="pl-PL"/>
+            </a:p>
+          </p:txBody>
+        </p:sp>
+        <p:cxnSp>
+          <p:nvCxnSpPr>
+            <p:cNvPr id="47" name="Łącznik: łamany 46">
+              <a:extLst>
+                <a:ext uri="{FF2B5EF4-FFF2-40B4-BE49-F238E27FC236}">
+                  <a16:creationId xmlns:a16="http://schemas.microsoft.com/office/drawing/2014/main" id="{00B658A4-CAAB-4670-8804-681911AC4DDD}"/>
+                </a:ext>
+              </a:extLst>
+            </p:cNvPr>
+            <p:cNvCxnSpPr>
+              <a:cxnSpLocks/>
+              <a:stCxn id="24" idx="3"/>
+              <a:endCxn id="28" idx="0"/>
+            </p:cNvCxnSpPr>
+            <p:nvPr/>
+          </p:nvCxnSpPr>
+          <p:spPr>
+            <a:xfrm>
+              <a:off x="6043367" y="2846553"/>
+              <a:ext cx="432621" cy="276943"/>
+            </a:xfrm>
+            <a:prstGeom prst="bentConnector2">
+              <a:avLst/>
+            </a:prstGeom>
+            <a:ln w="57150">
+              <a:solidFill>
+                <a:schemeClr val="bg1"/>
+              </a:solidFill>
+            </a:ln>
+          </p:spPr>
+          <p:style>
+            <a:lnRef idx="1">
+              <a:schemeClr val="accent1"/>
+            </a:lnRef>
+            <a:fillRef idx="0">
+              <a:schemeClr val="accent1"/>
+            </a:fillRef>
+            <a:effectRef idx="0">
+              <a:schemeClr val="accent1"/>
+            </a:effectRef>
+            <a:fontRef idx="minor">
+              <a:schemeClr val="tx1"/>
+            </a:fontRef>
+          </p:style>
+        </p:cxnSp>
+        <p:cxnSp>
+          <p:nvCxnSpPr>
+            <p:cNvPr id="49" name="Łącznik: łamany 48">
+              <a:extLst>
+                <a:ext uri="{FF2B5EF4-FFF2-40B4-BE49-F238E27FC236}">
+                  <a16:creationId xmlns:a16="http://schemas.microsoft.com/office/drawing/2014/main" id="{EC5E9F1D-B914-41D5-B526-25490970ADAE}"/>
+                </a:ext>
+              </a:extLst>
+            </p:cNvPr>
+            <p:cNvCxnSpPr>
+              <a:cxnSpLocks/>
+              <a:stCxn id="11" idx="3"/>
+              <a:endCxn id="28" idx="2"/>
+            </p:cNvCxnSpPr>
+            <p:nvPr/>
+          </p:nvCxnSpPr>
+          <p:spPr>
+            <a:xfrm flipV="1">
+              <a:off x="5864463" y="3450362"/>
+              <a:ext cx="611525" cy="73460"/>
+            </a:xfrm>
+            <a:prstGeom prst="bentConnector2">
+              <a:avLst/>
+            </a:prstGeom>
+            <a:ln w="57150">
+              <a:solidFill>
+                <a:schemeClr val="bg1"/>
+              </a:solidFill>
+            </a:ln>
+          </p:spPr>
+          <p:style>
+            <a:lnRef idx="1">
+              <a:schemeClr val="accent1"/>
+            </a:lnRef>
+            <a:fillRef idx="0">
+              <a:schemeClr val="accent1"/>
+            </a:fillRef>
+            <a:effectRef idx="0">
+              <a:schemeClr val="accent1"/>
+            </a:effectRef>
+            <a:fontRef idx="minor">
+              <a:schemeClr val="tx1"/>
+            </a:fontRef>
+          </p:style>
+        </p:cxnSp>
+        <p:cxnSp>
+          <p:nvCxnSpPr>
+            <p:cNvPr id="52" name="Łącznik: łamany 51">
+              <a:extLst>
+                <a:ext uri="{FF2B5EF4-FFF2-40B4-BE49-F238E27FC236}">
+                  <a16:creationId xmlns:a16="http://schemas.microsoft.com/office/drawing/2014/main" id="{AF2121A5-DF5F-4139-B06E-89F19F12A043}"/>
+                </a:ext>
+              </a:extLst>
+            </p:cNvPr>
+            <p:cNvCxnSpPr>
+              <a:cxnSpLocks/>
+              <a:stCxn id="11" idx="2"/>
+              <a:endCxn id="26" idx="0"/>
+            </p:cNvCxnSpPr>
+            <p:nvPr/>
+          </p:nvCxnSpPr>
+          <p:spPr>
+            <a:xfrm rot="16200000" flipH="1">
+              <a:off x="5978476" y="3394337"/>
+              <a:ext cx="274098" cy="859933"/>
+            </a:xfrm>
+            <a:prstGeom prst="bentConnector3">
+              <a:avLst>
+                <a:gd name="adj1" fmla="val 50000"/>
+              </a:avLst>
+            </a:prstGeom>
+            <a:ln w="57150">
+              <a:solidFill>
+                <a:schemeClr val="bg1"/>
+              </a:solidFill>
+            </a:ln>
+          </p:spPr>
+          <p:style>
+            <a:lnRef idx="1">
+              <a:schemeClr val="accent1"/>
+            </a:lnRef>
+            <a:fillRef idx="0">
+              <a:schemeClr val="accent1"/>
+            </a:fillRef>
+            <a:effectRef idx="0">
+              <a:schemeClr val="accent1"/>
+            </a:effectRef>
+            <a:fontRef idx="minor">
+              <a:schemeClr val="tx1"/>
+            </a:fontRef>
+          </p:style>
+        </p:cxnSp>
+        <p:cxnSp>
+          <p:nvCxnSpPr>
+            <p:cNvPr id="55" name="Łącznik: łamany 54">
+              <a:extLst>
+                <a:ext uri="{FF2B5EF4-FFF2-40B4-BE49-F238E27FC236}">
+                  <a16:creationId xmlns:a16="http://schemas.microsoft.com/office/drawing/2014/main" id="{0B4C0AE9-45AE-4C6E-B597-CCC2E1AD7542}"/>
+                </a:ext>
+              </a:extLst>
+            </p:cNvPr>
+            <p:cNvCxnSpPr>
+              <a:cxnSpLocks/>
+              <a:stCxn id="11" idx="1"/>
+              <a:endCxn id="23" idx="1"/>
+            </p:cNvCxnSpPr>
+            <p:nvPr/>
+          </p:nvCxnSpPr>
+          <p:spPr>
+            <a:xfrm rot="10800000" flipH="1" flipV="1">
+              <a:off x="5506653" y="3523821"/>
+              <a:ext cx="299957" cy="592245"/>
+            </a:xfrm>
+            <a:prstGeom prst="bentConnector3">
+              <a:avLst>
+                <a:gd name="adj1" fmla="val -76211"/>
+              </a:avLst>
+            </a:prstGeom>
+            <a:ln w="57150">
+              <a:solidFill>
+                <a:schemeClr val="bg1"/>
+              </a:solidFill>
+            </a:ln>
+          </p:spPr>
+          <p:style>
+            <a:lnRef idx="1">
+              <a:schemeClr val="accent1"/>
+            </a:lnRef>
+            <a:fillRef idx="0">
+              <a:schemeClr val="accent1"/>
+            </a:fillRef>
+            <a:effectRef idx="0">
+              <a:schemeClr val="accent1"/>
+            </a:effectRef>
+            <a:fontRef idx="minor">
+              <a:schemeClr val="tx1"/>
+            </a:fontRef>
+          </p:style>
+        </p:cxnSp>
+        <p:cxnSp>
+          <p:nvCxnSpPr>
+            <p:cNvPr id="58" name="Łącznik: łamany 57">
+              <a:extLst>
+                <a:ext uri="{FF2B5EF4-FFF2-40B4-BE49-F238E27FC236}">
+                  <a16:creationId xmlns:a16="http://schemas.microsoft.com/office/drawing/2014/main" id="{6FE00341-877E-4D00-90E2-1B84EE2C1394}"/>
+                </a:ext>
+              </a:extLst>
+            </p:cNvPr>
+            <p:cNvCxnSpPr>
+              <a:cxnSpLocks/>
+              <a:stCxn id="28" idx="3"/>
+              <a:endCxn id="27" idx="3"/>
+            </p:cNvCxnSpPr>
+            <p:nvPr/>
+          </p:nvCxnSpPr>
+          <p:spPr>
+            <a:xfrm flipH="1">
+              <a:off x="6398113" y="3286929"/>
+              <a:ext cx="256779" cy="1488471"/>
+            </a:xfrm>
+            <a:prstGeom prst="bentConnector3">
+              <a:avLst>
+                <a:gd name="adj1" fmla="val -89026"/>
+              </a:avLst>
+            </a:prstGeom>
+            <a:ln w="57150">
+              <a:solidFill>
+                <a:schemeClr val="bg1"/>
+              </a:solidFill>
+            </a:ln>
+          </p:spPr>
+          <p:style>
+            <a:lnRef idx="1">
+              <a:schemeClr val="accent1"/>
+            </a:lnRef>
+            <a:fillRef idx="0">
+              <a:schemeClr val="accent1"/>
+            </a:fillRef>
+            <a:effectRef idx="0">
+              <a:schemeClr val="accent1"/>
+            </a:effectRef>
+            <a:fontRef idx="minor">
+              <a:schemeClr val="tx1"/>
+            </a:fontRef>
+          </p:style>
+        </p:cxnSp>
+        <p:cxnSp>
+          <p:nvCxnSpPr>
+            <p:cNvPr id="61" name="Łącznik: łamany 60">
+              <a:extLst>
+                <a:ext uri="{FF2B5EF4-FFF2-40B4-BE49-F238E27FC236}">
+                  <a16:creationId xmlns:a16="http://schemas.microsoft.com/office/drawing/2014/main" id="{1092D761-9DC7-45E2-908E-83069D7E877F}"/>
+                </a:ext>
+              </a:extLst>
+            </p:cNvPr>
+            <p:cNvCxnSpPr>
+              <a:cxnSpLocks/>
+              <a:stCxn id="23" idx="2"/>
+              <a:endCxn id="25" idx="0"/>
+            </p:cNvCxnSpPr>
+            <p:nvPr/>
+          </p:nvCxnSpPr>
+          <p:spPr>
+            <a:xfrm rot="5400000">
+              <a:off x="5641144" y="4179098"/>
+              <a:ext cx="243970" cy="444774"/>
+            </a:xfrm>
+            <a:prstGeom prst="bentConnector3">
+              <a:avLst>
+                <a:gd name="adj1" fmla="val 50000"/>
+              </a:avLst>
+            </a:prstGeom>
+            <a:ln w="57150">
+              <a:solidFill>
+                <a:schemeClr val="bg1"/>
+              </a:solidFill>
+            </a:ln>
+          </p:spPr>
+          <p:style>
+            <a:lnRef idx="1">
+              <a:schemeClr val="accent1"/>
+            </a:lnRef>
+            <a:fillRef idx="0">
+              <a:schemeClr val="accent1"/>
+            </a:fillRef>
+            <a:effectRef idx="0">
+              <a:schemeClr val="accent1"/>
+            </a:effectRef>
+            <a:fontRef idx="minor">
+              <a:schemeClr val="tx1"/>
+            </a:fontRef>
+          </p:style>
+        </p:cxnSp>
+        <p:cxnSp>
+          <p:nvCxnSpPr>
+            <p:cNvPr id="64" name="Łącznik: łamany 63">
+              <a:extLst>
+                <a:ext uri="{FF2B5EF4-FFF2-40B4-BE49-F238E27FC236}">
+                  <a16:creationId xmlns:a16="http://schemas.microsoft.com/office/drawing/2014/main" id="{55F3784A-0E6C-4D4D-8C0D-4087414F9F3B}"/>
+                </a:ext>
+              </a:extLst>
+            </p:cNvPr>
+            <p:cNvCxnSpPr>
+              <a:cxnSpLocks/>
+              <a:endCxn id="27" idx="0"/>
+            </p:cNvCxnSpPr>
+            <p:nvPr/>
+          </p:nvCxnSpPr>
+          <p:spPr>
+            <a:xfrm rot="5400000">
+              <a:off x="6211361" y="4257613"/>
+              <a:ext cx="362203" cy="346505"/>
+            </a:xfrm>
+            <a:prstGeom prst="bentConnector3">
+              <a:avLst>
+                <a:gd name="adj1" fmla="val 50000"/>
+              </a:avLst>
+            </a:prstGeom>
+            <a:ln w="57150">
+              <a:solidFill>
+                <a:schemeClr val="bg1"/>
+              </a:solidFill>
+            </a:ln>
+          </p:spPr>
+          <p:style>
+            <a:lnRef idx="1">
+              <a:schemeClr val="accent1"/>
+            </a:lnRef>
+            <a:fillRef idx="0">
+              <a:schemeClr val="accent1"/>
+            </a:fillRef>
+            <a:effectRef idx="0">
+              <a:schemeClr val="accent1"/>
+            </a:effectRef>
+            <a:fontRef idx="minor">
+              <a:schemeClr val="tx1"/>
+            </a:fontRef>
+          </p:style>
+        </p:cxnSp>
+        <p:cxnSp>
+          <p:nvCxnSpPr>
+            <p:cNvPr id="66" name="Łącznik: łamany 65">
+              <a:extLst>
+                <a:ext uri="{FF2B5EF4-FFF2-40B4-BE49-F238E27FC236}">
+                  <a16:creationId xmlns:a16="http://schemas.microsoft.com/office/drawing/2014/main" id="{1675A33E-E672-498F-94E3-628B854475EB}"/>
+                </a:ext>
+              </a:extLst>
+            </p:cNvPr>
+            <p:cNvCxnSpPr>
+              <a:cxnSpLocks/>
+              <a:stCxn id="27" idx="2"/>
+              <a:endCxn id="29" idx="0"/>
+            </p:cNvCxnSpPr>
+            <p:nvPr/>
+          </p:nvCxnSpPr>
+          <p:spPr>
+            <a:xfrm rot="5400000">
+              <a:off x="5877185" y="4894315"/>
+              <a:ext cx="297507" cy="386543"/>
+            </a:xfrm>
+            <a:prstGeom prst="bentConnector3">
+              <a:avLst>
+                <a:gd name="adj1" fmla="val 50000"/>
+              </a:avLst>
+            </a:prstGeom>
+            <a:ln w="57150">
+              <a:solidFill>
+                <a:schemeClr val="bg1"/>
+              </a:solidFill>
+            </a:ln>
+          </p:spPr>
+          <p:style>
+            <a:lnRef idx="1">
+              <a:schemeClr val="accent1"/>
+            </a:lnRef>
+            <a:fillRef idx="0">
+              <a:schemeClr val="accent1"/>
+            </a:fillRef>
+            <a:effectRef idx="0">
+              <a:schemeClr val="accent1"/>
+            </a:effectRef>
+            <a:fontRef idx="minor">
+              <a:schemeClr val="tx1"/>
+            </a:fontRef>
+          </p:style>
+        </p:cxnSp>
+        <p:cxnSp>
+          <p:nvCxnSpPr>
+            <p:cNvPr id="69" name="Łącznik: łamany 68">
+              <a:extLst>
+                <a:ext uri="{FF2B5EF4-FFF2-40B4-BE49-F238E27FC236}">
+                  <a16:creationId xmlns:a16="http://schemas.microsoft.com/office/drawing/2014/main" id="{7D664025-F0A4-467E-9D67-E6D142AD57B9}"/>
+                </a:ext>
+              </a:extLst>
+            </p:cNvPr>
+            <p:cNvCxnSpPr>
+              <a:cxnSpLocks/>
+              <a:stCxn id="29" idx="1"/>
+              <a:endCxn id="25" idx="2"/>
+            </p:cNvCxnSpPr>
+            <p:nvPr/>
+          </p:nvCxnSpPr>
+          <p:spPr>
+            <a:xfrm rot="10800000">
+              <a:off x="5540743" y="4850337"/>
+              <a:ext cx="113019" cy="549437"/>
+            </a:xfrm>
+            <a:prstGeom prst="bentConnector2">
+              <a:avLst/>
+            </a:prstGeom>
+            <a:ln w="57150">
+              <a:solidFill>
+                <a:schemeClr val="bg1"/>
+              </a:solidFill>
+            </a:ln>
+          </p:spPr>
+          <p:style>
+            <a:lnRef idx="1">
+              <a:schemeClr val="accent1"/>
+            </a:lnRef>
+            <a:fillRef idx="0">
+              <a:schemeClr val="accent1"/>
+            </a:fillRef>
+            <a:effectRef idx="0">
+              <a:schemeClr val="accent1"/>
+            </a:effectRef>
+            <a:fontRef idx="minor">
+              <a:schemeClr val="tx1"/>
+            </a:fontRef>
+          </p:style>
+        </p:cxnSp>
+        <p:cxnSp>
+          <p:nvCxnSpPr>
+            <p:cNvPr id="74" name="Łącznik: łamany 73">
+              <a:extLst>
+                <a:ext uri="{FF2B5EF4-FFF2-40B4-BE49-F238E27FC236}">
+                  <a16:creationId xmlns:a16="http://schemas.microsoft.com/office/drawing/2014/main" id="{04282CDF-182D-4A4C-B138-0EC116A1A25B}"/>
+                </a:ext>
+              </a:extLst>
+            </p:cNvPr>
+            <p:cNvCxnSpPr>
+              <a:cxnSpLocks/>
+              <a:stCxn id="30" idx="2"/>
+              <a:endCxn id="27" idx="2"/>
+            </p:cNvCxnSpPr>
+            <p:nvPr/>
+          </p:nvCxnSpPr>
+          <p:spPr>
+            <a:xfrm rot="5400000" flipH="1">
+              <a:off x="6206176" y="4951866"/>
+              <a:ext cx="404232" cy="378166"/>
+            </a:xfrm>
+            <a:prstGeom prst="bentConnector3">
+              <a:avLst>
+                <a:gd name="adj1" fmla="val -56552"/>
+              </a:avLst>
+            </a:prstGeom>
+            <a:ln w="57150">
+              <a:solidFill>
+                <a:schemeClr val="bg1"/>
+              </a:solidFill>
+            </a:ln>
+          </p:spPr>
+          <p:style>
+            <a:lnRef idx="1">
+              <a:schemeClr val="accent1"/>
+            </a:lnRef>
+            <a:fillRef idx="0">
+              <a:schemeClr val="accent1"/>
+            </a:fillRef>
+            <a:effectRef idx="0">
+              <a:schemeClr val="accent1"/>
+            </a:effectRef>
+            <a:fontRef idx="minor">
+              <a:schemeClr val="tx1"/>
+            </a:fontRef>
+          </p:style>
+        </p:cxnSp>
+      </p:grpSp>
+      <p:grpSp>
+        <p:nvGrpSpPr>
+          <p:cNvPr id="129" name="Grupa 128">
+            <a:extLst>
+              <a:ext uri="{FF2B5EF4-FFF2-40B4-BE49-F238E27FC236}">
+                <a16:creationId xmlns:a16="http://schemas.microsoft.com/office/drawing/2014/main" id="{59C49FBD-3B59-4D38-A472-0855098CDD1F}"/>
+              </a:ext>
+            </a:extLst>
+          </p:cNvPr>
+          <p:cNvGrpSpPr/>
+          <p:nvPr/>
+        </p:nvGrpSpPr>
+        <p:grpSpPr>
+          <a:xfrm>
+            <a:off x="7807668" y="3432184"/>
+            <a:ext cx="1694317" cy="1716432"/>
+            <a:chOff x="7782131" y="3091423"/>
+            <a:chExt cx="1694317" cy="1716432"/>
+          </a:xfrm>
+        </p:grpSpPr>
+        <p:sp>
+          <p:nvSpPr>
+            <p:cNvPr id="31" name="Prostokąt 30">
+              <a:extLst>
+                <a:ext uri="{FF2B5EF4-FFF2-40B4-BE49-F238E27FC236}">
+                  <a16:creationId xmlns:a16="http://schemas.microsoft.com/office/drawing/2014/main" id="{287E55E9-8784-4E51-AE9E-BC7A450007EC}"/>
+                </a:ext>
+              </a:extLst>
+            </p:cNvPr>
+            <p:cNvSpPr/>
+            <p:nvPr/>
+          </p:nvSpPr>
+          <p:spPr>
+            <a:xfrm>
+              <a:off x="7961035" y="3123496"/>
+              <a:ext cx="357809" cy="326866"/>
+            </a:xfrm>
+            <a:prstGeom prst="rect">
+              <a:avLst/>
+            </a:prstGeom>
+            <a:solidFill>
+              <a:schemeClr val="bg1"/>
+            </a:solidFill>
+            <a:ln>
+              <a:solidFill>
+                <a:srgbClr val="11CFD9"/>
+              </a:solidFill>
+            </a:ln>
+          </p:spPr>
+          <p:style>
+            <a:lnRef idx="2">
+              <a:schemeClr val="accent1">
+                <a:shade val="50000"/>
+              </a:schemeClr>
+            </a:lnRef>
+            <a:fillRef idx="1">
+              <a:schemeClr val="accent1"/>
+            </a:fillRef>
+            <a:effectRef idx="0">
+              <a:schemeClr val="accent1"/>
+            </a:effectRef>
+            <a:fontRef idx="minor">
+              <a:schemeClr val="lt1"/>
+            </a:fontRef>
+          </p:style>
+          <p:txBody>
+            <a:bodyPr rtlCol="0" anchor="ctr"/>
+            <a:lstStyle/>
+            <a:p>
+              <a:pPr algn="ctr"/>
+              <a:endParaRPr lang="pl-PL"/>
+            </a:p>
+          </p:txBody>
+        </p:sp>
+        <p:sp>
+          <p:nvSpPr>
+            <p:cNvPr id="32" name="Prostokąt 31">
+              <a:extLst>
+                <a:ext uri="{FF2B5EF4-FFF2-40B4-BE49-F238E27FC236}">
+                  <a16:creationId xmlns:a16="http://schemas.microsoft.com/office/drawing/2014/main" id="{3AA4BBC5-1938-477F-AEA7-0FCE2CFF4845}"/>
+                </a:ext>
+              </a:extLst>
+            </p:cNvPr>
+            <p:cNvSpPr/>
+            <p:nvPr/>
+          </p:nvSpPr>
+          <p:spPr>
+            <a:xfrm>
+              <a:off x="8450385" y="3815156"/>
+              <a:ext cx="357809" cy="326866"/>
+            </a:xfrm>
+            <a:prstGeom prst="rect">
+              <a:avLst/>
+            </a:prstGeom>
+            <a:solidFill>
+              <a:schemeClr val="bg1"/>
+            </a:solidFill>
+            <a:ln>
+              <a:solidFill>
+                <a:srgbClr val="11CFD9"/>
+              </a:solidFill>
+            </a:ln>
+          </p:spPr>
+          <p:style>
+            <a:lnRef idx="2">
+              <a:schemeClr val="accent1">
+                <a:shade val="50000"/>
+              </a:schemeClr>
+            </a:lnRef>
+            <a:fillRef idx="1">
+              <a:schemeClr val="accent1"/>
+            </a:fillRef>
+            <a:effectRef idx="0">
+              <a:schemeClr val="accent1"/>
+            </a:effectRef>
+            <a:fontRef idx="minor">
+              <a:schemeClr val="lt1"/>
+            </a:fontRef>
+          </p:style>
+          <p:txBody>
+            <a:bodyPr rtlCol="0" anchor="ctr"/>
+            <a:lstStyle/>
+            <a:p>
+              <a:pPr algn="ctr"/>
+              <a:endParaRPr lang="pl-PL"/>
+            </a:p>
+          </p:txBody>
+        </p:sp>
+        <p:sp>
+          <p:nvSpPr>
+            <p:cNvPr id="33" name="Prostokąt 32">
+              <a:extLst>
+                <a:ext uri="{FF2B5EF4-FFF2-40B4-BE49-F238E27FC236}">
+                  <a16:creationId xmlns:a16="http://schemas.microsoft.com/office/drawing/2014/main" id="{1B741EF8-F59F-49B1-859F-05C69DDB9C6A}"/>
+                </a:ext>
+              </a:extLst>
+            </p:cNvPr>
+            <p:cNvSpPr/>
+            <p:nvPr/>
+          </p:nvSpPr>
+          <p:spPr>
+            <a:xfrm>
+              <a:off x="7782131" y="3797920"/>
+              <a:ext cx="357809" cy="326866"/>
+            </a:xfrm>
+            <a:prstGeom prst="rect">
+              <a:avLst/>
+            </a:prstGeom>
+            <a:solidFill>
+              <a:schemeClr val="bg1"/>
+            </a:solidFill>
+            <a:ln>
+              <a:solidFill>
+                <a:srgbClr val="11CFD9"/>
+              </a:solidFill>
+            </a:ln>
+          </p:spPr>
+          <p:style>
+            <a:lnRef idx="2">
+              <a:schemeClr val="accent1">
+                <a:shade val="50000"/>
+              </a:schemeClr>
+            </a:lnRef>
+            <a:fillRef idx="1">
+              <a:schemeClr val="accent1"/>
+            </a:fillRef>
+            <a:effectRef idx="0">
+              <a:schemeClr val="accent1"/>
+            </a:effectRef>
+            <a:fontRef idx="minor">
+              <a:schemeClr val="lt1"/>
+            </a:fontRef>
+          </p:style>
+          <p:txBody>
+            <a:bodyPr rtlCol="0" anchor="ctr"/>
+            <a:lstStyle/>
+            <a:p>
+              <a:pPr algn="ctr"/>
+              <a:endParaRPr lang="pl-PL"/>
+            </a:p>
+          </p:txBody>
+        </p:sp>
+        <p:sp>
+          <p:nvSpPr>
+            <p:cNvPr id="34" name="Prostokąt 33">
+              <a:extLst>
+                <a:ext uri="{FF2B5EF4-FFF2-40B4-BE49-F238E27FC236}">
+                  <a16:creationId xmlns:a16="http://schemas.microsoft.com/office/drawing/2014/main" id="{DFFB5F88-D9DA-42D7-AE1E-AF78C8B6D066}"/>
+                </a:ext>
+              </a:extLst>
+            </p:cNvPr>
+            <p:cNvSpPr/>
+            <p:nvPr/>
+          </p:nvSpPr>
+          <p:spPr>
+            <a:xfrm>
+              <a:off x="9118639" y="3755295"/>
+              <a:ext cx="357809" cy="326866"/>
+            </a:xfrm>
+            <a:prstGeom prst="rect">
+              <a:avLst/>
+            </a:prstGeom>
+            <a:solidFill>
+              <a:schemeClr val="bg1"/>
+            </a:solidFill>
+            <a:ln>
+              <a:solidFill>
+                <a:srgbClr val="11CFD9"/>
+              </a:solidFill>
+            </a:ln>
+          </p:spPr>
+          <p:style>
+            <a:lnRef idx="2">
+              <a:schemeClr val="accent1">
+                <a:shade val="50000"/>
+              </a:schemeClr>
+            </a:lnRef>
+            <a:fillRef idx="1">
+              <a:schemeClr val="accent1"/>
+            </a:fillRef>
+            <a:effectRef idx="0">
+              <a:schemeClr val="accent1"/>
+            </a:effectRef>
+            <a:fontRef idx="minor">
+              <a:schemeClr val="lt1"/>
+            </a:fontRef>
+          </p:style>
+          <p:txBody>
+            <a:bodyPr rtlCol="0" anchor="ctr"/>
+            <a:lstStyle/>
+            <a:p>
+              <a:pPr algn="ctr"/>
+              <a:endParaRPr lang="pl-PL"/>
+            </a:p>
+          </p:txBody>
+        </p:sp>
+        <p:sp>
+          <p:nvSpPr>
+            <p:cNvPr id="35" name="Prostokąt 34">
+              <a:extLst>
+                <a:ext uri="{FF2B5EF4-FFF2-40B4-BE49-F238E27FC236}">
+                  <a16:creationId xmlns:a16="http://schemas.microsoft.com/office/drawing/2014/main" id="{B193EC4E-1A62-4886-8395-19688FB087F3}"/>
+                </a:ext>
+              </a:extLst>
+            </p:cNvPr>
+            <p:cNvSpPr/>
+            <p:nvPr/>
+          </p:nvSpPr>
+          <p:spPr>
+            <a:xfrm>
+              <a:off x="8808194" y="4480989"/>
+              <a:ext cx="357809" cy="326866"/>
+            </a:xfrm>
+            <a:prstGeom prst="rect">
+              <a:avLst/>
+            </a:prstGeom>
+            <a:solidFill>
+              <a:schemeClr val="bg1"/>
+            </a:solidFill>
+            <a:ln>
+              <a:solidFill>
+                <a:srgbClr val="11CFD9"/>
+              </a:solidFill>
+            </a:ln>
+          </p:spPr>
+          <p:style>
+            <a:lnRef idx="2">
+              <a:schemeClr val="accent1">
+                <a:shade val="50000"/>
+              </a:schemeClr>
+            </a:lnRef>
+            <a:fillRef idx="1">
+              <a:schemeClr val="accent1"/>
+            </a:fillRef>
+            <a:effectRef idx="0">
+              <a:schemeClr val="accent1"/>
+            </a:effectRef>
+            <a:fontRef idx="minor">
+              <a:schemeClr val="lt1"/>
+            </a:fontRef>
+          </p:style>
+          <p:txBody>
+            <a:bodyPr rtlCol="0" anchor="ctr"/>
+            <a:lstStyle/>
+            <a:p>
+              <a:pPr algn="ctr"/>
+              <a:endParaRPr lang="pl-PL"/>
+            </a:p>
+          </p:txBody>
+        </p:sp>
+        <p:sp>
+          <p:nvSpPr>
+            <p:cNvPr id="36" name="Prostokąt 35">
+              <a:extLst>
+                <a:ext uri="{FF2B5EF4-FFF2-40B4-BE49-F238E27FC236}">
+                  <a16:creationId xmlns:a16="http://schemas.microsoft.com/office/drawing/2014/main" id="{868EBA6F-6F79-4BE4-8200-7BD78844E801}"/>
+                </a:ext>
+              </a:extLst>
+            </p:cNvPr>
+            <p:cNvSpPr/>
+            <p:nvPr/>
+          </p:nvSpPr>
+          <p:spPr>
+            <a:xfrm>
+              <a:off x="8738822" y="3091423"/>
+              <a:ext cx="357809" cy="326866"/>
+            </a:xfrm>
+            <a:prstGeom prst="rect">
+              <a:avLst/>
+            </a:prstGeom>
+            <a:solidFill>
+              <a:schemeClr val="bg1"/>
+            </a:solidFill>
+            <a:ln>
+              <a:solidFill>
+                <a:srgbClr val="11CFD9"/>
+              </a:solidFill>
+            </a:ln>
+          </p:spPr>
+          <p:style>
+            <a:lnRef idx="2">
+              <a:schemeClr val="accent1">
+                <a:shade val="50000"/>
+              </a:schemeClr>
+            </a:lnRef>
+            <a:fillRef idx="1">
+              <a:schemeClr val="accent1"/>
+            </a:fillRef>
+            <a:effectRef idx="0">
+              <a:schemeClr val="accent1"/>
+            </a:effectRef>
+            <a:fontRef idx="minor">
+              <a:schemeClr val="lt1"/>
+            </a:fontRef>
+          </p:style>
+          <p:txBody>
+            <a:bodyPr rtlCol="0" anchor="ctr"/>
+            <a:lstStyle/>
+            <a:p>
+              <a:pPr algn="ctr"/>
+              <a:endParaRPr lang="pl-PL"/>
+            </a:p>
+          </p:txBody>
+        </p:sp>
+        <p:sp>
+          <p:nvSpPr>
+            <p:cNvPr id="37" name="Prostokąt 36">
+              <a:extLst>
+                <a:ext uri="{FF2B5EF4-FFF2-40B4-BE49-F238E27FC236}">
+                  <a16:creationId xmlns:a16="http://schemas.microsoft.com/office/drawing/2014/main" id="{B0FD7F81-660F-4F49-B72B-E7D653915AE4}"/>
+                </a:ext>
+              </a:extLst>
+            </p:cNvPr>
+            <p:cNvSpPr/>
+            <p:nvPr/>
+          </p:nvSpPr>
+          <p:spPr>
+            <a:xfrm>
+              <a:off x="8017525" y="4441341"/>
+              <a:ext cx="357809" cy="326866"/>
+            </a:xfrm>
+            <a:prstGeom prst="rect">
+              <a:avLst/>
+            </a:prstGeom>
+            <a:solidFill>
+              <a:schemeClr val="bg1"/>
+            </a:solidFill>
+            <a:ln>
+              <a:solidFill>
+                <a:srgbClr val="11CFD9"/>
+              </a:solidFill>
+            </a:ln>
+          </p:spPr>
+          <p:style>
+            <a:lnRef idx="2">
+              <a:schemeClr val="accent1">
+                <a:shade val="50000"/>
+              </a:schemeClr>
+            </a:lnRef>
+            <a:fillRef idx="1">
+              <a:schemeClr val="accent1"/>
+            </a:fillRef>
+            <a:effectRef idx="0">
+              <a:schemeClr val="accent1"/>
+            </a:effectRef>
+            <a:fontRef idx="minor">
+              <a:schemeClr val="lt1"/>
+            </a:fontRef>
+          </p:style>
+          <p:txBody>
+            <a:bodyPr rtlCol="0" anchor="ctr"/>
+            <a:lstStyle/>
+            <a:p>
+              <a:pPr algn="ctr"/>
+              <a:endParaRPr lang="pl-PL"/>
+            </a:p>
+          </p:txBody>
+        </p:sp>
+        <p:cxnSp>
+          <p:nvCxnSpPr>
+            <p:cNvPr id="81" name="Łącznik prosty 80">
+              <a:extLst>
+                <a:ext uri="{FF2B5EF4-FFF2-40B4-BE49-F238E27FC236}">
+                  <a16:creationId xmlns:a16="http://schemas.microsoft.com/office/drawing/2014/main" id="{11973E30-817F-4660-B29C-1F2B96C589B5}"/>
+                </a:ext>
+              </a:extLst>
+            </p:cNvPr>
+            <p:cNvCxnSpPr>
+              <a:stCxn id="32" idx="2"/>
+              <a:endCxn id="35" idx="0"/>
+            </p:cNvCxnSpPr>
+            <p:nvPr/>
+          </p:nvCxnSpPr>
+          <p:spPr>
+            <a:xfrm>
+              <a:off x="8629290" y="4142022"/>
+              <a:ext cx="357809" cy="338967"/>
+            </a:xfrm>
+            <a:prstGeom prst="line">
+              <a:avLst/>
+            </a:prstGeom>
+            <a:ln w="57150">
+              <a:solidFill>
+                <a:schemeClr val="bg1"/>
+              </a:solidFill>
+            </a:ln>
+          </p:spPr>
+          <p:style>
+            <a:lnRef idx="1">
+              <a:schemeClr val="accent1"/>
+            </a:lnRef>
+            <a:fillRef idx="0">
+              <a:schemeClr val="accent1"/>
+            </a:fillRef>
+            <a:effectRef idx="0">
+              <a:schemeClr val="accent1"/>
+            </a:effectRef>
+            <a:fontRef idx="minor">
+              <a:schemeClr val="tx1"/>
+            </a:fontRef>
+          </p:style>
+        </p:cxnSp>
+        <p:cxnSp>
+          <p:nvCxnSpPr>
+            <p:cNvPr id="82" name="Łącznik prosty 81">
+              <a:extLst>
+                <a:ext uri="{FF2B5EF4-FFF2-40B4-BE49-F238E27FC236}">
+                  <a16:creationId xmlns:a16="http://schemas.microsoft.com/office/drawing/2014/main" id="{95F49F2F-6348-49C0-BEE3-11624BD81B8E}"/>
+                </a:ext>
+              </a:extLst>
+            </p:cNvPr>
+            <p:cNvCxnSpPr>
+              <a:cxnSpLocks/>
+              <a:stCxn id="32" idx="1"/>
+              <a:endCxn id="33" idx="3"/>
+            </p:cNvCxnSpPr>
+            <p:nvPr/>
+          </p:nvCxnSpPr>
+          <p:spPr>
+            <a:xfrm flipH="1" flipV="1">
+              <a:off x="8139940" y="3961353"/>
+              <a:ext cx="310445" cy="17236"/>
+            </a:xfrm>
+            <a:prstGeom prst="line">
+              <a:avLst/>
+            </a:prstGeom>
+            <a:ln w="57150">
+              <a:solidFill>
+                <a:schemeClr val="bg1"/>
+              </a:solidFill>
+            </a:ln>
+          </p:spPr>
+          <p:style>
+            <a:lnRef idx="1">
+              <a:schemeClr val="accent1"/>
+            </a:lnRef>
+            <a:fillRef idx="0">
+              <a:schemeClr val="accent1"/>
+            </a:fillRef>
+            <a:effectRef idx="0">
+              <a:schemeClr val="accent1"/>
+            </a:effectRef>
+            <a:fontRef idx="minor">
+              <a:schemeClr val="tx1"/>
+            </a:fontRef>
+          </p:style>
+        </p:cxnSp>
+        <p:cxnSp>
+          <p:nvCxnSpPr>
+            <p:cNvPr id="83" name="Łącznik prosty 82">
+              <a:extLst>
+                <a:ext uri="{FF2B5EF4-FFF2-40B4-BE49-F238E27FC236}">
+                  <a16:creationId xmlns:a16="http://schemas.microsoft.com/office/drawing/2014/main" id="{3E5479E9-1943-4451-A5C0-684C1F5DFAA6}"/>
+                </a:ext>
+              </a:extLst>
+            </p:cNvPr>
+            <p:cNvCxnSpPr>
+              <a:cxnSpLocks/>
+              <a:stCxn id="32" idx="3"/>
+              <a:endCxn id="34" idx="1"/>
+            </p:cNvCxnSpPr>
+            <p:nvPr/>
+          </p:nvCxnSpPr>
+          <p:spPr>
+            <a:xfrm flipV="1">
+              <a:off x="8808194" y="3918728"/>
+              <a:ext cx="310445" cy="59861"/>
+            </a:xfrm>
+            <a:prstGeom prst="line">
+              <a:avLst/>
+            </a:prstGeom>
+            <a:ln w="57150">
+              <a:solidFill>
+                <a:schemeClr val="bg1"/>
+              </a:solidFill>
+            </a:ln>
+          </p:spPr>
+          <p:style>
+            <a:lnRef idx="1">
+              <a:schemeClr val="accent1"/>
+            </a:lnRef>
+            <a:fillRef idx="0">
+              <a:schemeClr val="accent1"/>
+            </a:fillRef>
+            <a:effectRef idx="0">
+              <a:schemeClr val="accent1"/>
+            </a:effectRef>
+            <a:fontRef idx="minor">
+              <a:schemeClr val="tx1"/>
+            </a:fontRef>
+          </p:style>
+        </p:cxnSp>
+        <p:cxnSp>
+          <p:nvCxnSpPr>
+            <p:cNvPr id="84" name="Łącznik prosty 83">
+              <a:extLst>
+                <a:ext uri="{FF2B5EF4-FFF2-40B4-BE49-F238E27FC236}">
+                  <a16:creationId xmlns:a16="http://schemas.microsoft.com/office/drawing/2014/main" id="{5FF4528E-F252-4F3D-8698-2FB4A40123E6}"/>
+                </a:ext>
+              </a:extLst>
+            </p:cNvPr>
+            <p:cNvCxnSpPr>
+              <a:cxnSpLocks/>
+              <a:stCxn id="32" idx="2"/>
+              <a:endCxn id="37" idx="0"/>
+            </p:cNvCxnSpPr>
+            <p:nvPr/>
+          </p:nvCxnSpPr>
+          <p:spPr>
+            <a:xfrm flipH="1">
+              <a:off x="8196430" y="4142022"/>
+              <a:ext cx="432860" cy="299319"/>
+            </a:xfrm>
+            <a:prstGeom prst="line">
+              <a:avLst/>
+            </a:prstGeom>
+            <a:ln w="57150">
+              <a:solidFill>
+                <a:schemeClr val="bg1"/>
+              </a:solidFill>
+            </a:ln>
+          </p:spPr>
+          <p:style>
+            <a:lnRef idx="1">
+              <a:schemeClr val="accent1"/>
+            </a:lnRef>
+            <a:fillRef idx="0">
+              <a:schemeClr val="accent1"/>
+            </a:fillRef>
+            <a:effectRef idx="0">
+              <a:schemeClr val="accent1"/>
+            </a:effectRef>
+            <a:fontRef idx="minor">
+              <a:schemeClr val="tx1"/>
+            </a:fontRef>
+          </p:style>
+        </p:cxnSp>
+        <p:cxnSp>
+          <p:nvCxnSpPr>
+            <p:cNvPr id="85" name="Łącznik prosty 84">
+              <a:extLst>
+                <a:ext uri="{FF2B5EF4-FFF2-40B4-BE49-F238E27FC236}">
+                  <a16:creationId xmlns:a16="http://schemas.microsoft.com/office/drawing/2014/main" id="{CF9CA816-10D8-42C7-A00F-2DBA61F5416D}"/>
+                </a:ext>
+              </a:extLst>
+            </p:cNvPr>
+            <p:cNvCxnSpPr>
+              <a:cxnSpLocks/>
+              <a:stCxn id="31" idx="2"/>
+              <a:endCxn id="32" idx="0"/>
+            </p:cNvCxnSpPr>
+            <p:nvPr/>
+          </p:nvCxnSpPr>
+          <p:spPr>
+            <a:xfrm>
+              <a:off x="8139940" y="3450362"/>
+              <a:ext cx="489350" cy="364794"/>
+            </a:xfrm>
+            <a:prstGeom prst="line">
+              <a:avLst/>
+            </a:prstGeom>
+            <a:ln w="57150">
+              <a:solidFill>
+                <a:schemeClr val="bg1"/>
+              </a:solidFill>
+            </a:ln>
+          </p:spPr>
+          <p:style>
+            <a:lnRef idx="1">
+              <a:schemeClr val="accent1"/>
+            </a:lnRef>
+            <a:fillRef idx="0">
+              <a:schemeClr val="accent1"/>
+            </a:fillRef>
+            <a:effectRef idx="0">
+              <a:schemeClr val="accent1"/>
+            </a:effectRef>
+            <a:fontRef idx="minor">
+              <a:schemeClr val="tx1"/>
+            </a:fontRef>
+          </p:style>
+        </p:cxnSp>
+        <p:cxnSp>
+          <p:nvCxnSpPr>
+            <p:cNvPr id="94" name="Łącznik prosty 93">
+              <a:extLst>
+                <a:ext uri="{FF2B5EF4-FFF2-40B4-BE49-F238E27FC236}">
+                  <a16:creationId xmlns:a16="http://schemas.microsoft.com/office/drawing/2014/main" id="{07BE5F83-9700-4F5C-94F3-C33520007B6D}"/>
+                </a:ext>
+              </a:extLst>
+            </p:cNvPr>
+            <p:cNvCxnSpPr>
+              <a:cxnSpLocks/>
+              <a:stCxn id="32" idx="0"/>
+              <a:endCxn id="36" idx="2"/>
+            </p:cNvCxnSpPr>
+            <p:nvPr/>
+          </p:nvCxnSpPr>
+          <p:spPr>
+            <a:xfrm flipV="1">
+              <a:off x="8629290" y="3418289"/>
+              <a:ext cx="288437" cy="396867"/>
+            </a:xfrm>
+            <a:prstGeom prst="line">
+              <a:avLst/>
+            </a:prstGeom>
+            <a:ln w="57150">
+              <a:solidFill>
+                <a:schemeClr val="bg1"/>
+              </a:solidFill>
+            </a:ln>
+          </p:spPr>
+          <p:style>
+            <a:lnRef idx="1">
+              <a:schemeClr val="accent1"/>
+            </a:lnRef>
+            <a:fillRef idx="0">
+              <a:schemeClr val="accent1"/>
+            </a:fillRef>
+            <a:effectRef idx="0">
+              <a:schemeClr val="accent1"/>
+            </a:effectRef>
+            <a:fontRef idx="minor">
+              <a:schemeClr val="tx1"/>
+            </a:fontRef>
+          </p:style>
+        </p:cxnSp>
+      </p:grpSp>
+      <p:sp>
+        <p:nvSpPr>
+          <p:cNvPr id="106" name="Prostokąt 105">
+            <a:extLst>
+              <a:ext uri="{FF2B5EF4-FFF2-40B4-BE49-F238E27FC236}">
+                <a16:creationId xmlns:a16="http://schemas.microsoft.com/office/drawing/2014/main" id="{6ECA6AC6-0FA3-47E9-8409-28424C4A7DC3}"/>
+              </a:ext>
+            </a:extLst>
+          </p:cNvPr>
+          <p:cNvSpPr/>
+          <p:nvPr/>
+        </p:nvSpPr>
+        <p:spPr>
+          <a:xfrm>
+            <a:off x="4863271" y="1332386"/>
+            <a:ext cx="2460515" cy="1323439"/>
+          </a:xfrm>
+          <a:prstGeom prst="rect">
             <a:avLst/>
           </a:prstGeom>
           <a:noFill/>
-          <a:ln w="76200">
-            <a:solidFill>
-              <a:schemeClr val="accent1">
-                <a:lumMod val="50000"/>
-              </a:schemeClr>
-            </a:solidFill>
+        </p:spPr>
+        <p:txBody>
+          <a:bodyPr wrap="square" lIns="91440" tIns="45720" rIns="91440" bIns="45720">
+            <a:spAutoFit/>
+          </a:bodyPr>
+          <a:lstStyle/>
+          <a:p>
+            <a:pPr algn="ctr"/>
+            <a:r>
+              <a:rPr lang="pl-PL" sz="4000" b="1" dirty="0">
+                <a:ln w="10160">
+                  <a:solidFill>
+                    <a:schemeClr val="accent5"/>
+                  </a:solidFill>
+                  <a:prstDash val="solid"/>
+                </a:ln>
+                <a:solidFill>
+                  <a:srgbClr val="FFFFFF"/>
+                </a:solidFill>
+                <a:effectLst>
+                  <a:outerShdw blurRad="38100" dist="22860" dir="5400000" algn="tl" rotWithShape="0">
+                    <a:srgbClr val="000000">
+                      <a:alpha val="30000"/>
+                    </a:srgbClr>
+                  </a:outerShdw>
+                </a:effectLst>
+              </a:rPr>
+              <a:t>Integrated layer</a:t>
+            </a:r>
+            <a:endParaRPr lang="pl-PL" sz="4000" b="1" cap="none" spc="0" dirty="0">
+              <a:ln w="10160">
+                <a:solidFill>
+                  <a:schemeClr val="accent5"/>
+                </a:solidFill>
+                <a:prstDash val="solid"/>
+              </a:ln>
+              <a:solidFill>
+                <a:srgbClr val="FFFFFF"/>
+              </a:solidFill>
+              <a:effectLst>
+                <a:outerShdw blurRad="38100" dist="22860" dir="5400000" algn="tl" rotWithShape="0">
+                  <a:srgbClr val="000000">
+                    <a:alpha val="30000"/>
+                  </a:srgbClr>
+                </a:outerShdw>
+              </a:effectLst>
+            </a:endParaRPr>
+          </a:p>
+        </p:txBody>
+      </p:sp>
+      <p:sp>
+        <p:nvSpPr>
+          <p:cNvPr id="109" name="Prostokąt 108">
+            <a:extLst>
+              <a:ext uri="{FF2B5EF4-FFF2-40B4-BE49-F238E27FC236}">
+                <a16:creationId xmlns:a16="http://schemas.microsoft.com/office/drawing/2014/main" id="{F4ACCFB6-DFFD-4CC1-A01E-37B08B3BDCFD}"/>
+              </a:ext>
+            </a:extLst>
+          </p:cNvPr>
+          <p:cNvSpPr/>
+          <p:nvPr/>
+        </p:nvSpPr>
+        <p:spPr>
+          <a:xfrm>
+            <a:off x="390886" y="1332386"/>
+            <a:ext cx="2336726" cy="1323439"/>
+          </a:xfrm>
+          <a:prstGeom prst="rect">
+            <a:avLst/>
+          </a:prstGeom>
+          <a:noFill/>
+        </p:spPr>
+        <p:txBody>
+          <a:bodyPr wrap="square" lIns="91440" tIns="45720" rIns="91440" bIns="45720">
+            <a:spAutoFit/>
+          </a:bodyPr>
+          <a:lstStyle/>
+          <a:p>
+            <a:pPr algn="ctr"/>
+            <a:r>
+              <a:rPr lang="pl-PL" sz="4000" b="1" dirty="0">
+                <a:ln w="10160">
+                  <a:solidFill>
+                    <a:schemeClr val="accent5"/>
+                  </a:solidFill>
+                  <a:prstDash val="solid"/>
+                </a:ln>
+                <a:solidFill>
+                  <a:srgbClr val="FFFFFF"/>
+                </a:solidFill>
+                <a:effectLst>
+                  <a:outerShdw blurRad="38100" dist="22860" dir="5400000" algn="tl" rotWithShape="0">
+                    <a:srgbClr val="000000">
+                      <a:alpha val="30000"/>
+                    </a:srgbClr>
+                  </a:outerShdw>
+                </a:effectLst>
+              </a:rPr>
+              <a:t>Landing area</a:t>
+            </a:r>
+            <a:endParaRPr lang="pl-PL" sz="4000" b="1" cap="none" spc="0" dirty="0">
+              <a:ln w="10160">
+                <a:solidFill>
+                  <a:schemeClr val="accent5"/>
+                </a:solidFill>
+                <a:prstDash val="solid"/>
+              </a:ln>
+              <a:solidFill>
+                <a:srgbClr val="FFFFFF"/>
+              </a:solidFill>
+              <a:effectLst>
+                <a:outerShdw blurRad="38100" dist="22860" dir="5400000" algn="tl" rotWithShape="0">
+                  <a:srgbClr val="000000">
+                    <a:alpha val="30000"/>
+                  </a:srgbClr>
+                </a:outerShdw>
+              </a:effectLst>
+            </a:endParaRPr>
+          </a:p>
+        </p:txBody>
+      </p:sp>
+      <p:sp>
+        <p:nvSpPr>
+          <p:cNvPr id="110" name="Prostokąt 109">
+            <a:extLst>
+              <a:ext uri="{FF2B5EF4-FFF2-40B4-BE49-F238E27FC236}">
+                <a16:creationId xmlns:a16="http://schemas.microsoft.com/office/drawing/2014/main" id="{C813C70A-C6A0-4089-AE52-5CD1B0431AF9}"/>
+              </a:ext>
+            </a:extLst>
+          </p:cNvPr>
+          <p:cNvSpPr/>
+          <p:nvPr/>
+        </p:nvSpPr>
+        <p:spPr>
+          <a:xfrm>
+            <a:off x="7414414" y="1332386"/>
+            <a:ext cx="2460515" cy="1323439"/>
+          </a:xfrm>
+          <a:prstGeom prst="rect">
+            <a:avLst/>
+          </a:prstGeom>
+          <a:noFill/>
+        </p:spPr>
+        <p:txBody>
+          <a:bodyPr wrap="square" lIns="91440" tIns="45720" rIns="91440" bIns="45720">
+            <a:spAutoFit/>
+          </a:bodyPr>
+          <a:lstStyle/>
+          <a:p>
+            <a:pPr algn="ctr"/>
+            <a:r>
+              <a:rPr lang="pl-PL" sz="4000" b="1" dirty="0">
+                <a:ln w="10160">
+                  <a:solidFill>
+                    <a:schemeClr val="accent5"/>
+                  </a:solidFill>
+                  <a:prstDash val="solid"/>
+                </a:ln>
+                <a:solidFill>
+                  <a:srgbClr val="FFFFFF"/>
+                </a:solidFill>
+                <a:effectLst>
+                  <a:outerShdw blurRad="38100" dist="22860" dir="5400000" algn="tl" rotWithShape="0">
+                    <a:srgbClr val="000000">
+                      <a:alpha val="30000"/>
+                    </a:srgbClr>
+                  </a:outerShdw>
+                </a:effectLst>
+              </a:rPr>
+              <a:t>Access layer</a:t>
+            </a:r>
+            <a:endParaRPr lang="pl-PL" sz="4000" b="1" cap="none" spc="0" dirty="0">
+              <a:ln w="10160">
+                <a:solidFill>
+                  <a:schemeClr val="accent5"/>
+                </a:solidFill>
+                <a:prstDash val="solid"/>
+              </a:ln>
+              <a:solidFill>
+                <a:srgbClr val="FFFFFF"/>
+              </a:solidFill>
+              <a:effectLst>
+                <a:outerShdw blurRad="38100" dist="22860" dir="5400000" algn="tl" rotWithShape="0">
+                  <a:srgbClr val="000000">
+                    <a:alpha val="30000"/>
+                  </a:srgbClr>
+                </a:outerShdw>
+              </a:effectLst>
+            </a:endParaRPr>
+          </a:p>
+        </p:txBody>
+      </p:sp>
+      <p:sp>
+        <p:nvSpPr>
+          <p:cNvPr id="111" name="Prostokąt 110">
+            <a:extLst>
+              <a:ext uri="{FF2B5EF4-FFF2-40B4-BE49-F238E27FC236}">
+                <a16:creationId xmlns:a16="http://schemas.microsoft.com/office/drawing/2014/main" id="{B7223AE2-058B-4F03-92E0-39A223981F0E}"/>
+              </a:ext>
+            </a:extLst>
+          </p:cNvPr>
+          <p:cNvSpPr/>
+          <p:nvPr/>
+        </p:nvSpPr>
+        <p:spPr>
+          <a:xfrm>
+            <a:off x="9786077" y="1332386"/>
+            <a:ext cx="2460515" cy="1323439"/>
+          </a:xfrm>
+          <a:prstGeom prst="rect">
+            <a:avLst/>
+          </a:prstGeom>
+          <a:noFill/>
+        </p:spPr>
+        <p:txBody>
+          <a:bodyPr wrap="square" lIns="91440" tIns="45720" rIns="91440" bIns="45720">
+            <a:spAutoFit/>
+          </a:bodyPr>
+          <a:lstStyle/>
+          <a:p>
+            <a:pPr algn="ctr"/>
+            <a:r>
+              <a:rPr lang="pl-PL" sz="4000" b="1" dirty="0">
+                <a:ln w="10160">
+                  <a:solidFill>
+                    <a:schemeClr val="accent5"/>
+                  </a:solidFill>
+                  <a:prstDash val="solid"/>
+                </a:ln>
+                <a:solidFill>
+                  <a:srgbClr val="FFFFFF"/>
+                </a:solidFill>
+                <a:effectLst>
+                  <a:outerShdw blurRad="38100" dist="22860" dir="5400000" algn="tl" rotWithShape="0">
+                    <a:srgbClr val="000000">
+                      <a:alpha val="30000"/>
+                    </a:srgbClr>
+                  </a:outerShdw>
+                </a:effectLst>
+              </a:rPr>
+              <a:t>Data marts</a:t>
+            </a:r>
+            <a:endParaRPr lang="pl-PL" sz="4000" b="1" cap="none" spc="0" dirty="0">
+              <a:ln w="10160">
+                <a:solidFill>
+                  <a:schemeClr val="accent5"/>
+                </a:solidFill>
+                <a:prstDash val="solid"/>
+              </a:ln>
+              <a:solidFill>
+                <a:srgbClr val="FFFFFF"/>
+              </a:solidFill>
+              <a:effectLst>
+                <a:outerShdw blurRad="38100" dist="22860" dir="5400000" algn="tl" rotWithShape="0">
+                  <a:srgbClr val="000000">
+                    <a:alpha val="30000"/>
+                  </a:srgbClr>
+                </a:outerShdw>
+              </a:effectLst>
+            </a:endParaRPr>
+          </a:p>
+        </p:txBody>
+      </p:sp>
+      <p:sp>
+        <p:nvSpPr>
+          <p:cNvPr id="112" name="Prostokąt 111">
+            <a:extLst>
+              <a:ext uri="{FF2B5EF4-FFF2-40B4-BE49-F238E27FC236}">
+                <a16:creationId xmlns:a16="http://schemas.microsoft.com/office/drawing/2014/main" id="{D3F4ECD7-3B4F-4CE1-A85D-9C7BDE69825B}"/>
+              </a:ext>
+            </a:extLst>
+          </p:cNvPr>
+          <p:cNvSpPr/>
+          <p:nvPr/>
+        </p:nvSpPr>
+        <p:spPr>
+          <a:xfrm>
+            <a:off x="2565184" y="1332386"/>
+            <a:ext cx="2460515" cy="1323439"/>
+          </a:xfrm>
+          <a:prstGeom prst="rect">
+            <a:avLst/>
+          </a:prstGeom>
+          <a:noFill/>
+        </p:spPr>
+        <p:txBody>
+          <a:bodyPr wrap="square" lIns="91440" tIns="45720" rIns="91440" bIns="45720">
+            <a:spAutoFit/>
+          </a:bodyPr>
+          <a:lstStyle/>
+          <a:p>
+            <a:pPr algn="ctr"/>
+            <a:r>
+              <a:rPr lang="pl-PL" sz="4000" b="1" dirty="0">
+                <a:ln w="10160">
+                  <a:solidFill>
+                    <a:schemeClr val="accent5"/>
+                  </a:solidFill>
+                  <a:prstDash val="solid"/>
+                </a:ln>
+                <a:solidFill>
+                  <a:srgbClr val="FFFFFF"/>
+                </a:solidFill>
+                <a:effectLst>
+                  <a:outerShdw blurRad="38100" dist="22860" dir="5400000" algn="tl" rotWithShape="0">
+                    <a:srgbClr val="000000">
+                      <a:alpha val="30000"/>
+                    </a:srgbClr>
+                  </a:outerShdw>
+                </a:effectLst>
+              </a:rPr>
+              <a:t>Stage layer</a:t>
+            </a:r>
+            <a:endParaRPr lang="pl-PL" sz="4000" b="1" cap="none" spc="0" dirty="0">
+              <a:ln w="10160">
+                <a:solidFill>
+                  <a:schemeClr val="accent5"/>
+                </a:solidFill>
+                <a:prstDash val="solid"/>
+              </a:ln>
+              <a:solidFill>
+                <a:srgbClr val="FFFFFF"/>
+              </a:solidFill>
+              <a:effectLst>
+                <a:outerShdw blurRad="38100" dist="22860" dir="5400000" algn="tl" rotWithShape="0">
+                  <a:srgbClr val="000000">
+                    <a:alpha val="30000"/>
+                  </a:srgbClr>
+                </a:outerShdw>
+              </a:effectLst>
+            </a:endParaRPr>
+          </a:p>
+        </p:txBody>
+      </p:sp>
+      <p:grpSp>
+        <p:nvGrpSpPr>
+          <p:cNvPr id="133" name="Grupa 132">
+            <a:extLst>
+              <a:ext uri="{FF2B5EF4-FFF2-40B4-BE49-F238E27FC236}">
+                <a16:creationId xmlns:a16="http://schemas.microsoft.com/office/drawing/2014/main" id="{2F9F27E0-EFE2-445E-A166-C1C90B3B3797}"/>
+              </a:ext>
+            </a:extLst>
+          </p:cNvPr>
+          <p:cNvGrpSpPr/>
+          <p:nvPr/>
+        </p:nvGrpSpPr>
+        <p:grpSpPr>
+          <a:xfrm>
+            <a:off x="1523922" y="3863749"/>
+            <a:ext cx="951773" cy="982102"/>
+            <a:chOff x="1523914" y="3794192"/>
+            <a:chExt cx="951773" cy="982102"/>
+          </a:xfrm>
+        </p:grpSpPr>
+        <p:pic>
+          <p:nvPicPr>
+            <p:cNvPr id="10" name="Grafika 9" descr="Otwarty folder">
+              <a:extLst>
+                <a:ext uri="{FF2B5EF4-FFF2-40B4-BE49-F238E27FC236}">
+                  <a16:creationId xmlns:a16="http://schemas.microsoft.com/office/drawing/2014/main" id="{AFBC10FB-EEEB-4B41-950C-78D45405EB79}"/>
+                </a:ext>
+              </a:extLst>
+            </p:cNvPr>
+            <p:cNvPicPr>
+              <a:picLocks noChangeAspect="1"/>
+            </p:cNvPicPr>
+            <p:nvPr/>
+          </p:nvPicPr>
+          <p:blipFill>
+            <a:blip r:embed="rId19">
+              <a:extLst>
+                <a:ext uri="{28A0092B-C50C-407E-A947-70E740481C1C}">
+                  <a14:useLocalDpi xmlns:a14="http://schemas.microsoft.com/office/drawing/2010/main" val="0"/>
+                </a:ext>
+                <a:ext uri="{96DAC541-7B7A-43D3-8B79-37D633B846F1}">
+                  <asvg:svgBlip xmlns:asvg="http://schemas.microsoft.com/office/drawing/2016/SVG/main" r:embed="rId20"/>
+                </a:ext>
+              </a:extLst>
+            </a:blip>
+            <a:stretch>
+              <a:fillRect/>
+            </a:stretch>
+          </p:blipFill>
+          <p:spPr>
+            <a:xfrm>
+              <a:off x="1561287" y="3861894"/>
+              <a:ext cx="914400" cy="914400"/>
+            </a:xfrm>
+            <a:prstGeom prst="rect">
+              <a:avLst/>
+            </a:prstGeom>
+          </p:spPr>
+        </p:pic>
+        <p:pic>
+          <p:nvPicPr>
+            <p:cNvPr id="132" name="Grafika 131" descr="Otwarty folder">
+              <a:extLst>
+                <a:ext uri="{FF2B5EF4-FFF2-40B4-BE49-F238E27FC236}">
+                  <a16:creationId xmlns:a16="http://schemas.microsoft.com/office/drawing/2014/main" id="{14B98A63-CBE1-4641-822C-7A918CCD34C3}"/>
+                </a:ext>
+              </a:extLst>
+            </p:cNvPr>
+            <p:cNvPicPr>
+              <a:picLocks noChangeAspect="1"/>
+            </p:cNvPicPr>
+            <p:nvPr/>
+          </p:nvPicPr>
+          <p:blipFill>
+            <a:blip r:embed="rId21">
+              <a:extLst>
+                <a:ext uri="{28A0092B-C50C-407E-A947-70E740481C1C}">
+                  <a14:useLocalDpi xmlns:a14="http://schemas.microsoft.com/office/drawing/2010/main" val="0"/>
+                </a:ext>
+                <a:ext uri="{96DAC541-7B7A-43D3-8B79-37D633B846F1}">
+                  <asvg:svgBlip xmlns:asvg="http://schemas.microsoft.com/office/drawing/2016/SVG/main" r:embed="rId22"/>
+                </a:ext>
+              </a:extLst>
+            </a:blip>
+            <a:stretch>
+              <a:fillRect/>
+            </a:stretch>
+          </p:blipFill>
+          <p:spPr>
+            <a:xfrm>
+              <a:off x="1523914" y="3794192"/>
+              <a:ext cx="914400" cy="914400"/>
+            </a:xfrm>
+            <a:prstGeom prst="rect">
+              <a:avLst/>
+            </a:prstGeom>
+          </p:spPr>
+        </p:pic>
+      </p:grpSp>
+      <p:sp>
+        <p:nvSpPr>
+          <p:cNvPr id="134" name="Strzałka: zakrzywiona w lewo 133">
+            <a:extLst>
+              <a:ext uri="{FF2B5EF4-FFF2-40B4-BE49-F238E27FC236}">
+                <a16:creationId xmlns:a16="http://schemas.microsoft.com/office/drawing/2014/main" id="{6F099261-F1E3-4965-A012-E4E1CD1C406F}"/>
+              </a:ext>
+            </a:extLst>
+          </p:cNvPr>
+          <p:cNvSpPr/>
+          <p:nvPr/>
+        </p:nvSpPr>
+        <p:spPr>
+          <a:xfrm rot="15329600" flipH="1">
+            <a:off x="1627153" y="4074551"/>
+            <a:ext cx="1382633" cy="3986783"/>
+          </a:xfrm>
+          <a:prstGeom prst="curvedLeftArrow">
+            <a:avLst>
+              <a:gd name="adj1" fmla="val 9233"/>
+              <a:gd name="adj2" fmla="val 30776"/>
+              <a:gd name="adj3" fmla="val 12167"/>
+            </a:avLst>
+          </a:prstGeom>
+          <a:solidFill>
+            <a:schemeClr val="bg1"/>
+          </a:solidFill>
+          <a:ln>
+            <a:noFill/>
           </a:ln>
         </p:spPr>
         <p:style>
@@ -3711,10 +6186,317 @@
           <a:lstStyle/>
           <a:p>
             <a:pPr algn="ctr"/>
-            <a:endParaRPr lang="pl-PL"/>
+            <a:endParaRPr lang="pl-PL">
+              <a:solidFill>
+                <a:schemeClr val="tx1"/>
+              </a:solidFill>
+            </a:endParaRPr>
           </a:p>
         </p:txBody>
       </p:sp>
+      <p:sp>
+        <p:nvSpPr>
+          <p:cNvPr id="135" name="Strzałka: zakrzywiona w lewo 134">
+            <a:extLst>
+              <a:ext uri="{FF2B5EF4-FFF2-40B4-BE49-F238E27FC236}">
+                <a16:creationId xmlns:a16="http://schemas.microsoft.com/office/drawing/2014/main" id="{DDDC603E-E875-4C61-B546-93C81D339DDA}"/>
+              </a:ext>
+            </a:extLst>
+          </p:cNvPr>
+          <p:cNvSpPr/>
+          <p:nvPr/>
+        </p:nvSpPr>
+        <p:spPr>
+          <a:xfrm rot="15329600">
+            <a:off x="3569995" y="2020892"/>
+            <a:ext cx="928838" cy="2344504"/>
+          </a:xfrm>
+          <a:prstGeom prst="curvedLeftArrow">
+            <a:avLst>
+              <a:gd name="adj1" fmla="val 17800"/>
+              <a:gd name="adj2" fmla="val 30776"/>
+              <a:gd name="adj3" fmla="val 25705"/>
+            </a:avLst>
+          </a:prstGeom>
+          <a:solidFill>
+            <a:schemeClr val="bg1"/>
+          </a:solidFill>
+          <a:ln>
+            <a:noFill/>
+          </a:ln>
+        </p:spPr>
+        <p:style>
+          <a:lnRef idx="2">
+            <a:schemeClr val="accent1">
+              <a:shade val="50000"/>
+            </a:schemeClr>
+          </a:lnRef>
+          <a:fillRef idx="1">
+            <a:schemeClr val="accent1"/>
+          </a:fillRef>
+          <a:effectRef idx="0">
+            <a:schemeClr val="accent1"/>
+          </a:effectRef>
+          <a:fontRef idx="minor">
+            <a:schemeClr val="lt1"/>
+          </a:fontRef>
+        </p:style>
+        <p:txBody>
+          <a:bodyPr rtlCol="0" anchor="ctr"/>
+          <a:lstStyle/>
+          <a:p>
+            <a:pPr algn="ctr"/>
+            <a:endParaRPr lang="pl-PL">
+              <a:solidFill>
+                <a:schemeClr val="tx1"/>
+              </a:solidFill>
+            </a:endParaRPr>
+          </a:p>
+        </p:txBody>
+      </p:sp>
+      <p:sp>
+        <p:nvSpPr>
+          <p:cNvPr id="136" name="Strzałka: zakrzywiona w lewo 135">
+            <a:extLst>
+              <a:ext uri="{FF2B5EF4-FFF2-40B4-BE49-F238E27FC236}">
+                <a16:creationId xmlns:a16="http://schemas.microsoft.com/office/drawing/2014/main" id="{8AA5A3A1-8581-4EF3-BCDB-64A2F9C5B017}"/>
+              </a:ext>
+            </a:extLst>
+          </p:cNvPr>
+          <p:cNvSpPr/>
+          <p:nvPr/>
+        </p:nvSpPr>
+        <p:spPr>
+          <a:xfrm rot="15329600" flipH="1">
+            <a:off x="7222307" y="5039346"/>
+            <a:ext cx="1017052" cy="2344504"/>
+          </a:xfrm>
+          <a:prstGeom prst="curvedLeftArrow">
+            <a:avLst>
+              <a:gd name="adj1" fmla="val 17800"/>
+              <a:gd name="adj2" fmla="val 30776"/>
+              <a:gd name="adj3" fmla="val 25705"/>
+            </a:avLst>
+          </a:prstGeom>
+          <a:solidFill>
+            <a:schemeClr val="bg1"/>
+          </a:solidFill>
+          <a:ln>
+            <a:noFill/>
+          </a:ln>
+        </p:spPr>
+        <p:style>
+          <a:lnRef idx="2">
+            <a:schemeClr val="accent1">
+              <a:shade val="50000"/>
+            </a:schemeClr>
+          </a:lnRef>
+          <a:fillRef idx="1">
+            <a:schemeClr val="accent1"/>
+          </a:fillRef>
+          <a:effectRef idx="0">
+            <a:schemeClr val="accent1"/>
+          </a:effectRef>
+          <a:fontRef idx="minor">
+            <a:schemeClr val="lt1"/>
+          </a:fontRef>
+        </p:style>
+        <p:txBody>
+          <a:bodyPr rtlCol="0" anchor="ctr"/>
+          <a:lstStyle/>
+          <a:p>
+            <a:pPr algn="ctr"/>
+            <a:endParaRPr lang="pl-PL">
+              <a:solidFill>
+                <a:schemeClr val="tx1"/>
+              </a:solidFill>
+            </a:endParaRPr>
+          </a:p>
+        </p:txBody>
+      </p:sp>
+      <p:grpSp>
+        <p:nvGrpSpPr>
+          <p:cNvPr id="141" name="Grupa 140">
+            <a:extLst>
+              <a:ext uri="{FF2B5EF4-FFF2-40B4-BE49-F238E27FC236}">
+                <a16:creationId xmlns:a16="http://schemas.microsoft.com/office/drawing/2014/main" id="{5373A467-9F6F-4DF6-8645-E2112ACC5F86}"/>
+              </a:ext>
+            </a:extLst>
+          </p:cNvPr>
+          <p:cNvGrpSpPr/>
+          <p:nvPr/>
+        </p:nvGrpSpPr>
+        <p:grpSpPr>
+          <a:xfrm>
+            <a:off x="9688335" y="3368191"/>
+            <a:ext cx="764428" cy="1925814"/>
+            <a:chOff x="9552558" y="3327131"/>
+            <a:chExt cx="975708" cy="1925814"/>
+          </a:xfrm>
+        </p:grpSpPr>
+        <p:sp>
+          <p:nvSpPr>
+            <p:cNvPr id="138" name="Strzałka: w górę 137">
+              <a:extLst>
+                <a:ext uri="{FF2B5EF4-FFF2-40B4-BE49-F238E27FC236}">
+                  <a16:creationId xmlns:a16="http://schemas.microsoft.com/office/drawing/2014/main" id="{36BD046B-17F3-4DAA-84B8-A42A719E8442}"/>
+                </a:ext>
+              </a:extLst>
+            </p:cNvPr>
+            <p:cNvSpPr/>
+            <p:nvPr/>
+          </p:nvSpPr>
+          <p:spPr>
+            <a:xfrm rot="3650100">
+              <a:off x="9878765" y="3035825"/>
+              <a:ext cx="335689" cy="918301"/>
+            </a:xfrm>
+            <a:prstGeom prst="upArrow">
+              <a:avLst/>
+            </a:prstGeom>
+            <a:solidFill>
+              <a:schemeClr val="bg1"/>
+            </a:solidFill>
+            <a:ln>
+              <a:solidFill>
+                <a:srgbClr val="11CFD9"/>
+              </a:solidFill>
+            </a:ln>
+          </p:spPr>
+          <p:style>
+            <a:lnRef idx="2">
+              <a:schemeClr val="accent1">
+                <a:shade val="50000"/>
+              </a:schemeClr>
+            </a:lnRef>
+            <a:fillRef idx="1">
+              <a:schemeClr val="accent1"/>
+            </a:fillRef>
+            <a:effectRef idx="0">
+              <a:schemeClr val="accent1"/>
+            </a:effectRef>
+            <a:fontRef idx="minor">
+              <a:schemeClr val="lt1"/>
+            </a:fontRef>
+          </p:style>
+          <p:txBody>
+            <a:bodyPr rtlCol="0" anchor="ctr"/>
+            <a:lstStyle/>
+            <a:p>
+              <a:pPr algn="ctr"/>
+              <a:endParaRPr lang="pl-PL"/>
+            </a:p>
+          </p:txBody>
+        </p:sp>
+        <p:sp>
+          <p:nvSpPr>
+            <p:cNvPr id="139" name="Strzałka: w górę 138">
+              <a:extLst>
+                <a:ext uri="{FF2B5EF4-FFF2-40B4-BE49-F238E27FC236}">
+                  <a16:creationId xmlns:a16="http://schemas.microsoft.com/office/drawing/2014/main" id="{3E8CCD7C-31F1-4A0D-B3A7-1B7EFDCAE10F}"/>
+                </a:ext>
+              </a:extLst>
+            </p:cNvPr>
+            <p:cNvSpPr/>
+            <p:nvPr/>
+          </p:nvSpPr>
+          <p:spPr>
+            <a:xfrm rot="5400000">
+              <a:off x="9901271" y="3804231"/>
+              <a:ext cx="335689" cy="918301"/>
+            </a:xfrm>
+            <a:prstGeom prst="upArrow">
+              <a:avLst/>
+            </a:prstGeom>
+            <a:solidFill>
+              <a:schemeClr val="bg1"/>
+            </a:solidFill>
+            <a:ln>
+              <a:solidFill>
+                <a:srgbClr val="11CFD9"/>
+              </a:solidFill>
+            </a:ln>
+          </p:spPr>
+          <p:style>
+            <a:lnRef idx="2">
+              <a:schemeClr val="accent1">
+                <a:shade val="50000"/>
+              </a:schemeClr>
+            </a:lnRef>
+            <a:fillRef idx="1">
+              <a:schemeClr val="accent1"/>
+            </a:fillRef>
+            <a:effectRef idx="0">
+              <a:schemeClr val="accent1"/>
+            </a:effectRef>
+            <a:fontRef idx="minor">
+              <a:schemeClr val="lt1"/>
+            </a:fontRef>
+          </p:style>
+          <p:txBody>
+            <a:bodyPr rtlCol="0" anchor="ctr"/>
+            <a:lstStyle/>
+            <a:p>
+              <a:pPr algn="ctr"/>
+              <a:endParaRPr lang="pl-PL"/>
+            </a:p>
+          </p:txBody>
+        </p:sp>
+        <p:sp>
+          <p:nvSpPr>
+            <p:cNvPr id="140" name="Strzałka: w górę 139">
+              <a:extLst>
+                <a:ext uri="{FF2B5EF4-FFF2-40B4-BE49-F238E27FC236}">
+                  <a16:creationId xmlns:a16="http://schemas.microsoft.com/office/drawing/2014/main" id="{CA126C16-AE3B-4D3E-B532-23163AB334C0}"/>
+                </a:ext>
+              </a:extLst>
+            </p:cNvPr>
+            <p:cNvSpPr/>
+            <p:nvPr/>
+          </p:nvSpPr>
+          <p:spPr>
+            <a:xfrm rot="7761374">
+              <a:off x="9843864" y="4625950"/>
+              <a:ext cx="335689" cy="918301"/>
+            </a:xfrm>
+            <a:prstGeom prst="upArrow">
+              <a:avLst/>
+            </a:prstGeom>
+            <a:solidFill>
+              <a:schemeClr val="bg1"/>
+            </a:solidFill>
+            <a:ln>
+              <a:solidFill>
+                <a:srgbClr val="11CFD9"/>
+              </a:solidFill>
+            </a:ln>
+          </p:spPr>
+          <p:style>
+            <a:lnRef idx="2">
+              <a:schemeClr val="accent1">
+                <a:shade val="50000"/>
+              </a:schemeClr>
+            </a:lnRef>
+            <a:fillRef idx="1">
+              <a:schemeClr val="accent1"/>
+            </a:fillRef>
+            <a:effectRef idx="0">
+              <a:schemeClr val="accent1"/>
+            </a:effectRef>
+            <a:fontRef idx="minor">
+              <a:schemeClr val="lt1"/>
+            </a:fontRef>
+          </p:style>
+          <p:txBody>
+            <a:bodyPr rtlCol="0" anchor="ctr"/>
+            <a:lstStyle/>
+            <a:p>
+              <a:pPr algn="ctr"/>
+              <a:endParaRPr lang="pl-PL"/>
+            </a:p>
+          </p:txBody>
+        </p:sp>
+      </p:grpSp>
     </p:spTree>
     <p:extLst>
       <p:ext uri="{BB962C8B-B14F-4D97-AF65-F5344CB8AC3E}">

</xml_diff>

<commit_message>
fix the picture proven_design
</commit_message>
<xml_diff>
--- a/themes/hugo-elate-theme/static/images/Pictures for blog.pptx
+++ b/themes/hugo-elate-theme/static/images/Pictures for blog.pptx
@@ -6267,9 +6267,9 @@
           <p:nvPr/>
         </p:nvSpPr>
         <p:spPr>
-          <a:xfrm rot="15329600" flipH="1">
-            <a:off x="7222307" y="5039346"/>
-            <a:ext cx="1017052" cy="2344504"/>
+          <a:xfrm rot="15616987" flipH="1">
+            <a:off x="6310029" y="4612877"/>
+            <a:ext cx="1017052" cy="2953139"/>
           </a:xfrm>
           <a:prstGeom prst="curvedLeftArrow">
             <a:avLst>

</xml_diff>

<commit_message>
added picture for business
</commit_message>
<xml_diff>
--- a/themes/hugo-elate-theme/static/images/Pictures for blog.pptx
+++ b/themes/hugo-elate-theme/static/images/Pictures for blog.pptx
@@ -6,8 +6,9 @@
   </p:sldMasterIdLst>
   <p:sldIdLst>
     <p:sldId id="257" r:id="rId2"/>
-    <p:sldId id="258" r:id="rId3"/>
-    <p:sldId id="256" r:id="rId4"/>
+    <p:sldId id="259" r:id="rId3"/>
+    <p:sldId id="258" r:id="rId4"/>
+    <p:sldId id="256" r:id="rId5"/>
   </p:sldIdLst>
   <p:sldSz cx="12192000" cy="6858000"/>
   <p:notesSz cx="6858000" cy="9144000"/>
@@ -265,7 +266,7 @@
           <a:p>
             <a:fld id="{A42A12F9-EA54-49E1-A3FD-186D9B25B348}" type="datetimeFigureOut">
               <a:rPr lang="pl-PL" smtClean="0"/>
-              <a:t>29.06.2019</a:t>
+              <a:t>02.07.2019</a:t>
             </a:fld>
             <a:endParaRPr lang="pl-PL"/>
           </a:p>
@@ -463,7 +464,7 @@
           <a:p>
             <a:fld id="{A42A12F9-EA54-49E1-A3FD-186D9B25B348}" type="datetimeFigureOut">
               <a:rPr lang="pl-PL" smtClean="0"/>
-              <a:t>29.06.2019</a:t>
+              <a:t>02.07.2019</a:t>
             </a:fld>
             <a:endParaRPr lang="pl-PL"/>
           </a:p>
@@ -671,7 +672,7 @@
           <a:p>
             <a:fld id="{A42A12F9-EA54-49E1-A3FD-186D9B25B348}" type="datetimeFigureOut">
               <a:rPr lang="pl-PL" smtClean="0"/>
-              <a:t>29.06.2019</a:t>
+              <a:t>02.07.2019</a:t>
             </a:fld>
             <a:endParaRPr lang="pl-PL"/>
           </a:p>
@@ -869,7 +870,7 @@
           <a:p>
             <a:fld id="{A42A12F9-EA54-49E1-A3FD-186D9B25B348}" type="datetimeFigureOut">
               <a:rPr lang="pl-PL" smtClean="0"/>
-              <a:t>29.06.2019</a:t>
+              <a:t>02.07.2019</a:t>
             </a:fld>
             <a:endParaRPr lang="pl-PL"/>
           </a:p>
@@ -1144,7 +1145,7 @@
           <a:p>
             <a:fld id="{A42A12F9-EA54-49E1-A3FD-186D9B25B348}" type="datetimeFigureOut">
               <a:rPr lang="pl-PL" smtClean="0"/>
-              <a:t>29.06.2019</a:t>
+              <a:t>02.07.2019</a:t>
             </a:fld>
             <a:endParaRPr lang="pl-PL"/>
           </a:p>
@@ -1409,7 +1410,7 @@
           <a:p>
             <a:fld id="{A42A12F9-EA54-49E1-A3FD-186D9B25B348}" type="datetimeFigureOut">
               <a:rPr lang="pl-PL" smtClean="0"/>
-              <a:t>29.06.2019</a:t>
+              <a:t>02.07.2019</a:t>
             </a:fld>
             <a:endParaRPr lang="pl-PL"/>
           </a:p>
@@ -1821,7 +1822,7 @@
           <a:p>
             <a:fld id="{A42A12F9-EA54-49E1-A3FD-186D9B25B348}" type="datetimeFigureOut">
               <a:rPr lang="pl-PL" smtClean="0"/>
-              <a:t>29.06.2019</a:t>
+              <a:t>02.07.2019</a:t>
             </a:fld>
             <a:endParaRPr lang="pl-PL"/>
           </a:p>
@@ -1962,7 +1963,7 @@
           <a:p>
             <a:fld id="{A42A12F9-EA54-49E1-A3FD-186D9B25B348}" type="datetimeFigureOut">
               <a:rPr lang="pl-PL" smtClean="0"/>
-              <a:t>29.06.2019</a:t>
+              <a:t>02.07.2019</a:t>
             </a:fld>
             <a:endParaRPr lang="pl-PL"/>
           </a:p>
@@ -2075,7 +2076,7 @@
           <a:p>
             <a:fld id="{A42A12F9-EA54-49E1-A3FD-186D9B25B348}" type="datetimeFigureOut">
               <a:rPr lang="pl-PL" smtClean="0"/>
-              <a:t>29.06.2019</a:t>
+              <a:t>02.07.2019</a:t>
             </a:fld>
             <a:endParaRPr lang="pl-PL"/>
           </a:p>
@@ -2386,7 +2387,7 @@
           <a:p>
             <a:fld id="{A42A12F9-EA54-49E1-A3FD-186D9B25B348}" type="datetimeFigureOut">
               <a:rPr lang="pl-PL" smtClean="0"/>
-              <a:t>29.06.2019</a:t>
+              <a:t>02.07.2019</a:t>
             </a:fld>
             <a:endParaRPr lang="pl-PL"/>
           </a:p>
@@ -2674,7 +2675,7 @@
           <a:p>
             <a:fld id="{A42A12F9-EA54-49E1-A3FD-186D9B25B348}" type="datetimeFigureOut">
               <a:rPr lang="pl-PL" smtClean="0"/>
-              <a:t>29.06.2019</a:t>
+              <a:t>02.07.2019</a:t>
             </a:fld>
             <a:endParaRPr lang="pl-PL"/>
           </a:p>
@@ -2915,7 +2916,7 @@
           <a:p>
             <a:fld id="{A42A12F9-EA54-49E1-A3FD-186D9B25B348}" type="datetimeFigureOut">
               <a:rPr lang="pl-PL" smtClean="0"/>
-              <a:t>29.06.2019</a:t>
+              <a:t>02.07.2019</a:t>
             </a:fld>
             <a:endParaRPr lang="pl-PL"/>
           </a:p>
@@ -3466,6 +3467,738 @@
           </a:prstGeom>
         </p:spPr>
       </p:pic>
+      <p:grpSp>
+        <p:nvGrpSpPr>
+          <p:cNvPr id="15" name="Grupa 14">
+            <a:extLst>
+              <a:ext uri="{FF2B5EF4-FFF2-40B4-BE49-F238E27FC236}">
+                <a16:creationId xmlns:a16="http://schemas.microsoft.com/office/drawing/2014/main" id="{E6368EE1-4515-432C-8043-AAA31E47CD19}"/>
+              </a:ext>
+            </a:extLst>
+          </p:cNvPr>
+          <p:cNvGrpSpPr/>
+          <p:nvPr/>
+        </p:nvGrpSpPr>
+        <p:grpSpPr>
+          <a:xfrm>
+            <a:off x="882424" y="2974238"/>
+            <a:ext cx="2503280" cy="2337063"/>
+            <a:chOff x="901148" y="2166492"/>
+            <a:chExt cx="2503280" cy="2337063"/>
+          </a:xfrm>
+        </p:grpSpPr>
+        <p:pic>
+          <p:nvPicPr>
+            <p:cNvPr id="3" name="Grafika 2" descr="Koła zębate">
+              <a:extLst>
+                <a:ext uri="{FF2B5EF4-FFF2-40B4-BE49-F238E27FC236}">
+                  <a16:creationId xmlns:a16="http://schemas.microsoft.com/office/drawing/2014/main" id="{94B09A1F-458C-46E9-B416-502D546E35C4}"/>
+                </a:ext>
+              </a:extLst>
+            </p:cNvPr>
+            <p:cNvPicPr>
+              <a:picLocks noChangeAspect="1"/>
+            </p:cNvPicPr>
+            <p:nvPr/>
+          </p:nvPicPr>
+          <p:blipFill>
+            <a:blip r:embed="rId3">
+              <a:extLst>
+                <a:ext uri="{28A0092B-C50C-407E-A947-70E740481C1C}">
+                  <a14:useLocalDpi xmlns:a14="http://schemas.microsoft.com/office/drawing/2010/main" val="0"/>
+                </a:ext>
+                <a:ext uri="{96DAC541-7B7A-43D3-8B79-37D633B846F1}">
+                  <asvg:svgBlip xmlns:asvg="http://schemas.microsoft.com/office/drawing/2016/SVG/main" r:embed="rId4"/>
+                </a:ext>
+              </a:extLst>
+            </a:blip>
+            <a:stretch>
+              <a:fillRect/>
+            </a:stretch>
+          </p:blipFill>
+          <p:spPr>
+            <a:xfrm>
+              <a:off x="1846386" y="2945513"/>
+              <a:ext cx="1558042" cy="1558042"/>
+            </a:xfrm>
+            <a:prstGeom prst="rect">
+              <a:avLst/>
+            </a:prstGeom>
+          </p:spPr>
+        </p:pic>
+        <p:pic>
+          <p:nvPicPr>
+            <p:cNvPr id="6" name="Grafika 5" descr="Pojedyncze koło zębate">
+              <a:extLst>
+                <a:ext uri="{FF2B5EF4-FFF2-40B4-BE49-F238E27FC236}">
+                  <a16:creationId xmlns:a16="http://schemas.microsoft.com/office/drawing/2014/main" id="{C5809225-676D-43FD-ACA7-F35351E42C82}"/>
+                </a:ext>
+              </a:extLst>
+            </p:cNvPr>
+            <p:cNvPicPr>
+              <a:picLocks noChangeAspect="1"/>
+            </p:cNvPicPr>
+            <p:nvPr/>
+          </p:nvPicPr>
+          <p:blipFill>
+            <a:blip r:embed="rId5">
+              <a:extLst>
+                <a:ext uri="{28A0092B-C50C-407E-A947-70E740481C1C}">
+                  <a14:useLocalDpi xmlns:a14="http://schemas.microsoft.com/office/drawing/2010/main" val="0"/>
+                </a:ext>
+                <a:ext uri="{96DAC541-7B7A-43D3-8B79-37D633B846F1}">
+                  <asvg:svgBlip xmlns:asvg="http://schemas.microsoft.com/office/drawing/2016/SVG/main" r:embed="rId6"/>
+                </a:ext>
+              </a:extLst>
+            </a:blip>
+            <a:stretch>
+              <a:fillRect/>
+            </a:stretch>
+          </p:blipFill>
+          <p:spPr>
+            <a:xfrm>
+              <a:off x="901148" y="2166492"/>
+              <a:ext cx="1558042" cy="1558042"/>
+            </a:xfrm>
+            <a:prstGeom prst="rect">
+              <a:avLst/>
+            </a:prstGeom>
+          </p:spPr>
+        </p:pic>
+      </p:grpSp>
+      <p:pic>
+        <p:nvPicPr>
+          <p:cNvPr id="10" name="Grafika 9" descr="Uścisk dłoni">
+            <a:extLst>
+              <a:ext uri="{FF2B5EF4-FFF2-40B4-BE49-F238E27FC236}">
+                <a16:creationId xmlns:a16="http://schemas.microsoft.com/office/drawing/2014/main" id="{43E8A39C-E342-4A1A-895D-358E46B367B1}"/>
+              </a:ext>
+            </a:extLst>
+          </p:cNvPr>
+          <p:cNvPicPr>
+            <a:picLocks noChangeAspect="1"/>
+          </p:cNvPicPr>
+          <p:nvPr/>
+        </p:nvPicPr>
+        <p:blipFill>
+          <a:blip r:embed="rId7">
+            <a:extLst>
+              <a:ext uri="{28A0092B-C50C-407E-A947-70E740481C1C}">
+                <a14:useLocalDpi xmlns:a14="http://schemas.microsoft.com/office/drawing/2010/main" val="0"/>
+              </a:ext>
+              <a:ext uri="{96DAC541-7B7A-43D3-8B79-37D633B846F1}">
+                <asvg:svgBlip xmlns:asvg="http://schemas.microsoft.com/office/drawing/2016/SVG/main" r:embed="rId8"/>
+              </a:ext>
+            </a:extLst>
+          </a:blip>
+          <a:stretch>
+            <a:fillRect/>
+          </a:stretch>
+        </p:blipFill>
+        <p:spPr>
+          <a:xfrm>
+            <a:off x="3805085" y="700299"/>
+            <a:ext cx="5134070" cy="5134070"/>
+          </a:xfrm>
+          <a:prstGeom prst="rect">
+            <a:avLst/>
+          </a:prstGeom>
+        </p:spPr>
+      </p:pic>
+      <p:grpSp>
+        <p:nvGrpSpPr>
+          <p:cNvPr id="16" name="Grupa 15">
+            <a:extLst>
+              <a:ext uri="{FF2B5EF4-FFF2-40B4-BE49-F238E27FC236}">
+                <a16:creationId xmlns:a16="http://schemas.microsoft.com/office/drawing/2014/main" id="{B79AE4CA-E867-44F2-9070-7D48A6C6EBD5}"/>
+              </a:ext>
+            </a:extLst>
+          </p:cNvPr>
+          <p:cNvGrpSpPr/>
+          <p:nvPr/>
+        </p:nvGrpSpPr>
+        <p:grpSpPr>
+          <a:xfrm>
+            <a:off x="8959242" y="3070653"/>
+            <a:ext cx="2941986" cy="2240648"/>
+            <a:chOff x="9315357" y="2584728"/>
+            <a:chExt cx="2941986" cy="2240648"/>
+          </a:xfrm>
+        </p:grpSpPr>
+        <p:pic>
+          <p:nvPicPr>
+            <p:cNvPr id="12" name="Grafika 11" descr="Pracownik biurowy">
+              <a:extLst>
+                <a:ext uri="{FF2B5EF4-FFF2-40B4-BE49-F238E27FC236}">
+                  <a16:creationId xmlns:a16="http://schemas.microsoft.com/office/drawing/2014/main" id="{7FF245DF-6704-4B7A-A1D6-62E8C4A789AF}"/>
+                </a:ext>
+              </a:extLst>
+            </p:cNvPr>
+            <p:cNvPicPr>
+              <a:picLocks noChangeAspect="1"/>
+            </p:cNvPicPr>
+            <p:nvPr/>
+          </p:nvPicPr>
+          <p:blipFill>
+            <a:blip r:embed="rId9">
+              <a:extLst>
+                <a:ext uri="{28A0092B-C50C-407E-A947-70E740481C1C}">
+                  <a14:useLocalDpi xmlns:a14="http://schemas.microsoft.com/office/drawing/2010/main" val="0"/>
+                </a:ext>
+                <a:ext uri="{96DAC541-7B7A-43D3-8B79-37D633B846F1}">
+                  <asvg:svgBlip xmlns:asvg="http://schemas.microsoft.com/office/drawing/2016/SVG/main" r:embed="rId10"/>
+                </a:ext>
+              </a:extLst>
+            </a:blip>
+            <a:stretch>
+              <a:fillRect/>
+            </a:stretch>
+          </p:blipFill>
+          <p:spPr>
+            <a:xfrm>
+              <a:off x="9315357" y="2584728"/>
+              <a:ext cx="1365212" cy="1365212"/>
+            </a:xfrm>
+            <a:prstGeom prst="rect">
+              <a:avLst/>
+            </a:prstGeom>
+          </p:spPr>
+        </p:pic>
+        <p:pic>
+          <p:nvPicPr>
+            <p:cNvPr id="13" name="Grafika 12" descr="Pracownik biurowy">
+              <a:extLst>
+                <a:ext uri="{FF2B5EF4-FFF2-40B4-BE49-F238E27FC236}">
+                  <a16:creationId xmlns:a16="http://schemas.microsoft.com/office/drawing/2014/main" id="{71A47239-6F38-4D6B-A727-D45C3DEB557E}"/>
+                </a:ext>
+              </a:extLst>
+            </p:cNvPr>
+            <p:cNvPicPr>
+              <a:picLocks noChangeAspect="1"/>
+            </p:cNvPicPr>
+            <p:nvPr/>
+          </p:nvPicPr>
+          <p:blipFill>
+            <a:blip r:embed="rId9">
+              <a:extLst>
+                <a:ext uri="{28A0092B-C50C-407E-A947-70E740481C1C}">
+                  <a14:useLocalDpi xmlns:a14="http://schemas.microsoft.com/office/drawing/2010/main" val="0"/>
+                </a:ext>
+                <a:ext uri="{96DAC541-7B7A-43D3-8B79-37D633B846F1}">
+                  <asvg:svgBlip xmlns:asvg="http://schemas.microsoft.com/office/drawing/2016/SVG/main" r:embed="rId10"/>
+                </a:ext>
+              </a:extLst>
+            </a:blip>
+            <a:stretch>
+              <a:fillRect/>
+            </a:stretch>
+          </p:blipFill>
+          <p:spPr>
+            <a:xfrm>
+              <a:off x="10103744" y="3460164"/>
+              <a:ext cx="1365212" cy="1365212"/>
+            </a:xfrm>
+            <a:prstGeom prst="rect">
+              <a:avLst/>
+            </a:prstGeom>
+          </p:spPr>
+        </p:pic>
+        <p:pic>
+          <p:nvPicPr>
+            <p:cNvPr id="14" name="Grafika 13" descr="Pracownik biurowy">
+              <a:extLst>
+                <a:ext uri="{FF2B5EF4-FFF2-40B4-BE49-F238E27FC236}">
+                  <a16:creationId xmlns:a16="http://schemas.microsoft.com/office/drawing/2014/main" id="{803158BE-5E55-4CE5-996A-DE4F5A66B730}"/>
+                </a:ext>
+              </a:extLst>
+            </p:cNvPr>
+            <p:cNvPicPr>
+              <a:picLocks noChangeAspect="1"/>
+            </p:cNvPicPr>
+            <p:nvPr/>
+          </p:nvPicPr>
+          <p:blipFill>
+            <a:blip r:embed="rId9">
+              <a:extLst>
+                <a:ext uri="{28A0092B-C50C-407E-A947-70E740481C1C}">
+                  <a14:useLocalDpi xmlns:a14="http://schemas.microsoft.com/office/drawing/2010/main" val="0"/>
+                </a:ext>
+                <a:ext uri="{96DAC541-7B7A-43D3-8B79-37D633B846F1}">
+                  <asvg:svgBlip xmlns:asvg="http://schemas.microsoft.com/office/drawing/2016/SVG/main" r:embed="rId10"/>
+                </a:ext>
+              </a:extLst>
+            </a:blip>
+            <a:stretch>
+              <a:fillRect/>
+            </a:stretch>
+          </p:blipFill>
+          <p:spPr>
+            <a:xfrm>
+              <a:off x="10892131" y="2900955"/>
+              <a:ext cx="1365212" cy="1365212"/>
+            </a:xfrm>
+            <a:prstGeom prst="rect">
+              <a:avLst/>
+            </a:prstGeom>
+          </p:spPr>
+        </p:pic>
+      </p:grpSp>
+      <p:grpSp>
+        <p:nvGrpSpPr>
+          <p:cNvPr id="17" name="Grupa 16">
+            <a:extLst>
+              <a:ext uri="{FF2B5EF4-FFF2-40B4-BE49-F238E27FC236}">
+                <a16:creationId xmlns:a16="http://schemas.microsoft.com/office/drawing/2014/main" id="{5375CA3A-B624-48D7-A463-FCC3F236962B}"/>
+              </a:ext>
+            </a:extLst>
+          </p:cNvPr>
+          <p:cNvGrpSpPr/>
+          <p:nvPr/>
+        </p:nvGrpSpPr>
+        <p:grpSpPr>
+          <a:xfrm>
+            <a:off x="8853461" y="3027838"/>
+            <a:ext cx="2941986" cy="2240648"/>
+            <a:chOff x="9315357" y="2584728"/>
+            <a:chExt cx="2941986" cy="2240648"/>
+          </a:xfrm>
+          <a:solidFill>
+            <a:schemeClr val="bg1"/>
+          </a:solidFill>
+        </p:grpSpPr>
+        <p:pic>
+          <p:nvPicPr>
+            <p:cNvPr id="18" name="Grafika 17" descr="Pracownik biurowy">
+              <a:extLst>
+                <a:ext uri="{FF2B5EF4-FFF2-40B4-BE49-F238E27FC236}">
+                  <a16:creationId xmlns:a16="http://schemas.microsoft.com/office/drawing/2014/main" id="{62D6BFC0-61ED-460A-952A-5366CA02274B}"/>
+                </a:ext>
+              </a:extLst>
+            </p:cNvPr>
+            <p:cNvPicPr>
+              <a:picLocks noChangeAspect="1"/>
+            </p:cNvPicPr>
+            <p:nvPr/>
+          </p:nvPicPr>
+          <p:blipFill>
+            <a:blip r:embed="rId11">
+              <a:extLst>
+                <a:ext uri="{28A0092B-C50C-407E-A947-70E740481C1C}">
+                  <a14:useLocalDpi xmlns:a14="http://schemas.microsoft.com/office/drawing/2010/main" val="0"/>
+                </a:ext>
+                <a:ext uri="{96DAC541-7B7A-43D3-8B79-37D633B846F1}">
+                  <asvg:svgBlip xmlns:asvg="http://schemas.microsoft.com/office/drawing/2016/SVG/main" r:embed="rId12"/>
+                </a:ext>
+              </a:extLst>
+            </a:blip>
+            <a:stretch>
+              <a:fillRect/>
+            </a:stretch>
+          </p:blipFill>
+          <p:spPr>
+            <a:xfrm>
+              <a:off x="9315357" y="2584728"/>
+              <a:ext cx="1365212" cy="1365212"/>
+            </a:xfrm>
+            <a:prstGeom prst="rect">
+              <a:avLst/>
+            </a:prstGeom>
+          </p:spPr>
+        </p:pic>
+        <p:pic>
+          <p:nvPicPr>
+            <p:cNvPr id="19" name="Grafika 18" descr="Pracownik biurowy">
+              <a:extLst>
+                <a:ext uri="{FF2B5EF4-FFF2-40B4-BE49-F238E27FC236}">
+                  <a16:creationId xmlns:a16="http://schemas.microsoft.com/office/drawing/2014/main" id="{F319ECBD-05AD-4FF7-AAF2-00C5983D90FE}"/>
+                </a:ext>
+              </a:extLst>
+            </p:cNvPr>
+            <p:cNvPicPr>
+              <a:picLocks noChangeAspect="1"/>
+            </p:cNvPicPr>
+            <p:nvPr/>
+          </p:nvPicPr>
+          <p:blipFill>
+            <a:blip r:embed="rId11">
+              <a:extLst>
+                <a:ext uri="{28A0092B-C50C-407E-A947-70E740481C1C}">
+                  <a14:useLocalDpi xmlns:a14="http://schemas.microsoft.com/office/drawing/2010/main" val="0"/>
+                </a:ext>
+                <a:ext uri="{96DAC541-7B7A-43D3-8B79-37D633B846F1}">
+                  <asvg:svgBlip xmlns:asvg="http://schemas.microsoft.com/office/drawing/2016/SVG/main" r:embed="rId12"/>
+                </a:ext>
+              </a:extLst>
+            </a:blip>
+            <a:stretch>
+              <a:fillRect/>
+            </a:stretch>
+          </p:blipFill>
+          <p:spPr>
+            <a:xfrm>
+              <a:off x="10103744" y="3460164"/>
+              <a:ext cx="1365212" cy="1365212"/>
+            </a:xfrm>
+            <a:prstGeom prst="rect">
+              <a:avLst/>
+            </a:prstGeom>
+          </p:spPr>
+        </p:pic>
+        <p:pic>
+          <p:nvPicPr>
+            <p:cNvPr id="20" name="Grafika 19" descr="Pracownik biurowy">
+              <a:extLst>
+                <a:ext uri="{FF2B5EF4-FFF2-40B4-BE49-F238E27FC236}">
+                  <a16:creationId xmlns:a16="http://schemas.microsoft.com/office/drawing/2014/main" id="{07285869-8BDD-4DD3-9A06-21DE9ACE8EBF}"/>
+                </a:ext>
+              </a:extLst>
+            </p:cNvPr>
+            <p:cNvPicPr>
+              <a:picLocks noChangeAspect="1"/>
+            </p:cNvPicPr>
+            <p:nvPr/>
+          </p:nvPicPr>
+          <p:blipFill>
+            <a:blip r:embed="rId11">
+              <a:extLst>
+                <a:ext uri="{28A0092B-C50C-407E-A947-70E740481C1C}">
+                  <a14:useLocalDpi xmlns:a14="http://schemas.microsoft.com/office/drawing/2010/main" val="0"/>
+                </a:ext>
+                <a:ext uri="{96DAC541-7B7A-43D3-8B79-37D633B846F1}">
+                  <asvg:svgBlip xmlns:asvg="http://schemas.microsoft.com/office/drawing/2016/SVG/main" r:embed="rId12"/>
+                </a:ext>
+              </a:extLst>
+            </a:blip>
+            <a:stretch>
+              <a:fillRect/>
+            </a:stretch>
+          </p:blipFill>
+          <p:spPr>
+            <a:xfrm>
+              <a:off x="10892131" y="2900955"/>
+              <a:ext cx="1365212" cy="1365212"/>
+            </a:xfrm>
+            <a:prstGeom prst="rect">
+              <a:avLst/>
+            </a:prstGeom>
+          </p:spPr>
+        </p:pic>
+      </p:grpSp>
+      <p:pic>
+        <p:nvPicPr>
+          <p:cNvPr id="21" name="Grafika 20" descr="Uścisk dłoni">
+            <a:extLst>
+              <a:ext uri="{FF2B5EF4-FFF2-40B4-BE49-F238E27FC236}">
+                <a16:creationId xmlns:a16="http://schemas.microsoft.com/office/drawing/2014/main" id="{8F69160B-4308-4826-94D4-890480B82D1B}"/>
+              </a:ext>
+            </a:extLst>
+          </p:cNvPr>
+          <p:cNvPicPr>
+            <a:picLocks noChangeAspect="1"/>
+          </p:cNvPicPr>
+          <p:nvPr/>
+        </p:nvPicPr>
+        <p:blipFill>
+          <a:blip r:embed="rId13">
+            <a:extLst>
+              <a:ext uri="{28A0092B-C50C-407E-A947-70E740481C1C}">
+                <a14:useLocalDpi xmlns:a14="http://schemas.microsoft.com/office/drawing/2010/main" val="0"/>
+              </a:ext>
+              <a:ext uri="{96DAC541-7B7A-43D3-8B79-37D633B846F1}">
+                <asvg:svgBlip xmlns:asvg="http://schemas.microsoft.com/office/drawing/2016/SVG/main" r:embed="rId14"/>
+              </a:ext>
+            </a:extLst>
+          </a:blip>
+          <a:stretch>
+            <a:fillRect/>
+          </a:stretch>
+        </p:blipFill>
+        <p:spPr>
+          <a:xfrm>
+            <a:off x="3784998" y="600908"/>
+            <a:ext cx="5134070" cy="5134070"/>
+          </a:xfrm>
+          <a:prstGeom prst="rect">
+            <a:avLst/>
+          </a:prstGeom>
+        </p:spPr>
+      </p:pic>
+      <p:grpSp>
+        <p:nvGrpSpPr>
+          <p:cNvPr id="22" name="Grupa 21">
+            <a:extLst>
+              <a:ext uri="{FF2B5EF4-FFF2-40B4-BE49-F238E27FC236}">
+                <a16:creationId xmlns:a16="http://schemas.microsoft.com/office/drawing/2014/main" id="{1FA60A96-DD3B-4249-A8FD-06889D1000F7}"/>
+              </a:ext>
+            </a:extLst>
+          </p:cNvPr>
+          <p:cNvGrpSpPr/>
+          <p:nvPr/>
+        </p:nvGrpSpPr>
+        <p:grpSpPr>
+          <a:xfrm>
+            <a:off x="861707" y="2858139"/>
+            <a:ext cx="2503280" cy="2337063"/>
+            <a:chOff x="901148" y="2166492"/>
+            <a:chExt cx="2503280" cy="2337063"/>
+          </a:xfrm>
+          <a:solidFill>
+            <a:schemeClr val="bg1"/>
+          </a:solidFill>
+        </p:grpSpPr>
+        <p:pic>
+          <p:nvPicPr>
+            <p:cNvPr id="23" name="Grafika 22" descr="Koła zębate">
+              <a:extLst>
+                <a:ext uri="{FF2B5EF4-FFF2-40B4-BE49-F238E27FC236}">
+                  <a16:creationId xmlns:a16="http://schemas.microsoft.com/office/drawing/2014/main" id="{F7D551CB-0B57-4934-9549-B11C5DFA865F}"/>
+                </a:ext>
+              </a:extLst>
+            </p:cNvPr>
+            <p:cNvPicPr>
+              <a:picLocks noChangeAspect="1"/>
+            </p:cNvPicPr>
+            <p:nvPr/>
+          </p:nvPicPr>
+          <p:blipFill>
+            <a:blip r:embed="rId15">
+              <a:extLst>
+                <a:ext uri="{28A0092B-C50C-407E-A947-70E740481C1C}">
+                  <a14:useLocalDpi xmlns:a14="http://schemas.microsoft.com/office/drawing/2010/main" val="0"/>
+                </a:ext>
+                <a:ext uri="{96DAC541-7B7A-43D3-8B79-37D633B846F1}">
+                  <asvg:svgBlip xmlns:asvg="http://schemas.microsoft.com/office/drawing/2016/SVG/main" r:embed="rId16"/>
+                </a:ext>
+              </a:extLst>
+            </a:blip>
+            <a:stretch>
+              <a:fillRect/>
+            </a:stretch>
+          </p:blipFill>
+          <p:spPr>
+            <a:xfrm>
+              <a:off x="1846386" y="2945513"/>
+              <a:ext cx="1558042" cy="1558042"/>
+            </a:xfrm>
+            <a:prstGeom prst="rect">
+              <a:avLst/>
+            </a:prstGeom>
+          </p:spPr>
+        </p:pic>
+        <p:pic>
+          <p:nvPicPr>
+            <p:cNvPr id="24" name="Grafika 23" descr="Pojedyncze koło zębate">
+              <a:extLst>
+                <a:ext uri="{FF2B5EF4-FFF2-40B4-BE49-F238E27FC236}">
+                  <a16:creationId xmlns:a16="http://schemas.microsoft.com/office/drawing/2014/main" id="{5AB7828F-3C3D-4C2E-9258-4BE0996DA181}"/>
+                </a:ext>
+              </a:extLst>
+            </p:cNvPr>
+            <p:cNvPicPr>
+              <a:picLocks noChangeAspect="1"/>
+            </p:cNvPicPr>
+            <p:nvPr/>
+          </p:nvPicPr>
+          <p:blipFill>
+            <a:blip r:embed="rId17">
+              <a:extLst>
+                <a:ext uri="{28A0092B-C50C-407E-A947-70E740481C1C}">
+                  <a14:useLocalDpi xmlns:a14="http://schemas.microsoft.com/office/drawing/2010/main" val="0"/>
+                </a:ext>
+                <a:ext uri="{96DAC541-7B7A-43D3-8B79-37D633B846F1}">
+                  <asvg:svgBlip xmlns:asvg="http://schemas.microsoft.com/office/drawing/2016/SVG/main" r:embed="rId18"/>
+                </a:ext>
+              </a:extLst>
+            </a:blip>
+            <a:stretch>
+              <a:fillRect/>
+            </a:stretch>
+          </p:blipFill>
+          <p:spPr>
+            <a:xfrm>
+              <a:off x="901148" y="2166492"/>
+              <a:ext cx="1558042" cy="1558042"/>
+            </a:xfrm>
+            <a:prstGeom prst="rect">
+              <a:avLst/>
+            </a:prstGeom>
+          </p:spPr>
+        </p:pic>
+      </p:grpSp>
+      <p:sp>
+        <p:nvSpPr>
+          <p:cNvPr id="25" name="Prostokąt 24">
+            <a:extLst>
+              <a:ext uri="{FF2B5EF4-FFF2-40B4-BE49-F238E27FC236}">
+                <a16:creationId xmlns:a16="http://schemas.microsoft.com/office/drawing/2014/main" id="{7552D539-ACA4-436B-B2ED-44A4CAA474F2}"/>
+              </a:ext>
+            </a:extLst>
+          </p:cNvPr>
+          <p:cNvSpPr/>
+          <p:nvPr/>
+        </p:nvSpPr>
+        <p:spPr>
+          <a:xfrm>
+            <a:off x="4909620" y="4907511"/>
+            <a:ext cx="2925000" cy="1754326"/>
+          </a:xfrm>
+          <a:prstGeom prst="rect">
+            <a:avLst/>
+          </a:prstGeom>
+          <a:noFill/>
+        </p:spPr>
+        <p:txBody>
+          <a:bodyPr wrap="square" lIns="91440" tIns="45720" rIns="91440" bIns="45720">
+            <a:spAutoFit/>
+          </a:bodyPr>
+          <a:lstStyle/>
+          <a:p>
+            <a:pPr algn="ctr"/>
+            <a:r>
+              <a:rPr lang="pl-PL" sz="5400" b="1" dirty="0">
+                <a:ln w="10160">
+                  <a:solidFill>
+                    <a:schemeClr val="accent5"/>
+                  </a:solidFill>
+                  <a:prstDash val="solid"/>
+                </a:ln>
+                <a:solidFill>
+                  <a:srgbClr val="FFFFFF"/>
+                </a:solidFill>
+                <a:effectLst>
+                  <a:outerShdw blurRad="38100" dist="22860" dir="5400000" algn="tl" rotWithShape="0">
+                    <a:srgbClr val="000000">
+                      <a:alpha val="30000"/>
+                    </a:srgbClr>
+                  </a:outerShdw>
+                </a:effectLst>
+              </a:rPr>
+              <a:t>Business </a:t>
+            </a:r>
+            <a:r>
+              <a:rPr lang="pl-PL" sz="5400" b="1" dirty="0" err="1">
+                <a:ln w="10160">
+                  <a:solidFill>
+                    <a:schemeClr val="accent5"/>
+                  </a:solidFill>
+                  <a:prstDash val="solid"/>
+                </a:ln>
+                <a:solidFill>
+                  <a:srgbClr val="FFFFFF"/>
+                </a:solidFill>
+                <a:effectLst>
+                  <a:outerShdw blurRad="38100" dist="22860" dir="5400000" algn="tl" rotWithShape="0">
+                    <a:srgbClr val="000000">
+                      <a:alpha val="30000"/>
+                    </a:srgbClr>
+                  </a:outerShdw>
+                </a:effectLst>
+              </a:rPr>
+              <a:t>first</a:t>
+            </a:r>
+            <a:endParaRPr lang="pl-PL" sz="5400" b="1" cap="none" spc="0" dirty="0">
+              <a:ln w="10160">
+                <a:solidFill>
+                  <a:schemeClr val="accent5"/>
+                </a:solidFill>
+                <a:prstDash val="solid"/>
+              </a:ln>
+              <a:solidFill>
+                <a:srgbClr val="FFFFFF"/>
+              </a:solidFill>
+              <a:effectLst>
+                <a:outerShdw blurRad="38100" dist="22860" dir="5400000" algn="tl" rotWithShape="0">
+                  <a:srgbClr val="000000">
+                    <a:alpha val="30000"/>
+                  </a:srgbClr>
+                </a:outerShdw>
+              </a:effectLst>
+            </a:endParaRPr>
+          </a:p>
+        </p:txBody>
+      </p:sp>
+    </p:spTree>
+    <p:extLst>
+      <p:ext uri="{BB962C8B-B14F-4D97-AF65-F5344CB8AC3E}">
+        <p14:creationId xmlns:p14="http://schemas.microsoft.com/office/powerpoint/2010/main" val="2630656502"/>
+      </p:ext>
+    </p:extLst>
+  </p:cSld>
+  <p:clrMapOvr>
+    <a:masterClrMapping/>
+  </p:clrMapOvr>
+</p:sld>
+</file>
+
+<file path=ppt/slides/slide3.xml><?xml version="1.0" encoding="utf-8"?>
+<p:sld xmlns:a="http://schemas.openxmlformats.org/drawingml/2006/main" xmlns:r="http://schemas.openxmlformats.org/officeDocument/2006/relationships" xmlns:p="http://schemas.openxmlformats.org/presentationml/2006/main">
+  <p:cSld>
+    <p:bg>
+      <p:bgPr>
+        <a:gradFill>
+          <a:gsLst>
+            <a:gs pos="54000">
+              <a:srgbClr val="07A1D7"/>
+            </a:gs>
+            <a:gs pos="100000">
+              <a:srgbClr val="11CFD9"/>
+            </a:gs>
+          </a:gsLst>
+          <a:lin ang="5400000" scaled="1"/>
+        </a:gradFill>
+        <a:effectLst/>
+      </p:bgPr>
+    </p:bg>
+    <p:spTree>
+      <p:nvGrpSpPr>
+        <p:cNvPr id="1" name=""/>
+        <p:cNvGrpSpPr/>
+        <p:nvPr/>
+      </p:nvGrpSpPr>
+      <p:grpSpPr>
+        <a:xfrm>
+          <a:off x="0" y="0"/>
+          <a:ext cx="0" cy="0"/>
+          <a:chOff x="0" y="0"/>
+          <a:chExt cx="0" cy="0"/>
+        </a:xfrm>
+      </p:grpSpPr>
+      <p:pic>
+        <p:nvPicPr>
+          <p:cNvPr id="5" name="Obraz 4">
+            <a:extLst>
+              <a:ext uri="{FF2B5EF4-FFF2-40B4-BE49-F238E27FC236}">
+                <a16:creationId xmlns:a16="http://schemas.microsoft.com/office/drawing/2014/main" id="{FA2B5562-A690-428E-8278-450D1EECD2E4}"/>
+              </a:ext>
+            </a:extLst>
+          </p:cNvPr>
+          <p:cNvPicPr>
+            <a:picLocks noChangeAspect="1"/>
+          </p:cNvPicPr>
+          <p:nvPr/>
+        </p:nvPicPr>
+        <p:blipFill>
+          <a:blip r:embed="rId2">
+            <a:extLst>
+              <a:ext uri="{28A0092B-C50C-407E-A947-70E740481C1C}">
+                <a14:useLocalDpi xmlns:a14="http://schemas.microsoft.com/office/drawing/2010/main" val="0"/>
+              </a:ext>
+            </a:extLst>
+          </a:blip>
+          <a:stretch>
+            <a:fillRect/>
+          </a:stretch>
+        </p:blipFill>
+        <p:spPr>
+          <a:xfrm>
+            <a:off x="153944" y="139485"/>
+            <a:ext cx="2471463" cy="1425844"/>
+          </a:xfrm>
+          <a:prstGeom prst="rect">
+            <a:avLst/>
+          </a:prstGeom>
+        </p:spPr>
+      </p:pic>
       <p:pic>
         <p:nvPicPr>
           <p:cNvPr id="3" name="Grafika 2" descr="Tabela">
@@ -6510,7 +7243,7 @@
 </p:sld>
 </file>
 
-<file path=ppt/slides/slide3.xml><?xml version="1.0" encoding="utf-8"?>
+<file path=ppt/slides/slide4.xml><?xml version="1.0" encoding="utf-8"?>
 <p:sld xmlns:a="http://schemas.openxmlformats.org/drawingml/2006/main" xmlns:r="http://schemas.openxmlformats.org/officeDocument/2006/relationships" xmlns:p="http://schemas.openxmlformats.org/presentationml/2006/main">
   <p:cSld>
     <p:bg>

</xml_diff>

<commit_message>
new picture for naming conventions
</commit_message>
<xml_diff>
--- a/themes/hugo-elate-theme/static/images/Pictures for blog.pptx
+++ b/themes/hugo-elate-theme/static/images/Pictures for blog.pptx
@@ -6,10 +6,11 @@
   </p:sldMasterIdLst>
   <p:sldIdLst>
     <p:sldId id="257" r:id="rId2"/>
-    <p:sldId id="260" r:id="rId3"/>
-    <p:sldId id="259" r:id="rId4"/>
-    <p:sldId id="258" r:id="rId5"/>
-    <p:sldId id="256" r:id="rId6"/>
+    <p:sldId id="261" r:id="rId3"/>
+    <p:sldId id="260" r:id="rId4"/>
+    <p:sldId id="259" r:id="rId5"/>
+    <p:sldId id="258" r:id="rId6"/>
+    <p:sldId id="256" r:id="rId7"/>
   </p:sldIdLst>
   <p:sldSz cx="12192000" cy="6858000"/>
   <p:notesSz cx="6858000" cy="9144000"/>
@@ -267,7 +268,7 @@
           <a:p>
             <a:fld id="{A42A12F9-EA54-49E1-A3FD-186D9B25B348}" type="datetimeFigureOut">
               <a:rPr lang="pl-PL" smtClean="0"/>
-              <a:t>08.07.2019</a:t>
+              <a:t>22.07.2019</a:t>
             </a:fld>
             <a:endParaRPr lang="pl-PL"/>
           </a:p>
@@ -465,7 +466,7 @@
           <a:p>
             <a:fld id="{A42A12F9-EA54-49E1-A3FD-186D9B25B348}" type="datetimeFigureOut">
               <a:rPr lang="pl-PL" smtClean="0"/>
-              <a:t>08.07.2019</a:t>
+              <a:t>22.07.2019</a:t>
             </a:fld>
             <a:endParaRPr lang="pl-PL"/>
           </a:p>
@@ -673,7 +674,7 @@
           <a:p>
             <a:fld id="{A42A12F9-EA54-49E1-A3FD-186D9B25B348}" type="datetimeFigureOut">
               <a:rPr lang="pl-PL" smtClean="0"/>
-              <a:t>08.07.2019</a:t>
+              <a:t>22.07.2019</a:t>
             </a:fld>
             <a:endParaRPr lang="pl-PL"/>
           </a:p>
@@ -871,7 +872,7 @@
           <a:p>
             <a:fld id="{A42A12F9-EA54-49E1-A3FD-186D9B25B348}" type="datetimeFigureOut">
               <a:rPr lang="pl-PL" smtClean="0"/>
-              <a:t>08.07.2019</a:t>
+              <a:t>22.07.2019</a:t>
             </a:fld>
             <a:endParaRPr lang="pl-PL"/>
           </a:p>
@@ -1146,7 +1147,7 @@
           <a:p>
             <a:fld id="{A42A12F9-EA54-49E1-A3FD-186D9B25B348}" type="datetimeFigureOut">
               <a:rPr lang="pl-PL" smtClean="0"/>
-              <a:t>08.07.2019</a:t>
+              <a:t>22.07.2019</a:t>
             </a:fld>
             <a:endParaRPr lang="pl-PL"/>
           </a:p>
@@ -1411,7 +1412,7 @@
           <a:p>
             <a:fld id="{A42A12F9-EA54-49E1-A3FD-186D9B25B348}" type="datetimeFigureOut">
               <a:rPr lang="pl-PL" smtClean="0"/>
-              <a:t>08.07.2019</a:t>
+              <a:t>22.07.2019</a:t>
             </a:fld>
             <a:endParaRPr lang="pl-PL"/>
           </a:p>
@@ -1823,7 +1824,7 @@
           <a:p>
             <a:fld id="{A42A12F9-EA54-49E1-A3FD-186D9B25B348}" type="datetimeFigureOut">
               <a:rPr lang="pl-PL" smtClean="0"/>
-              <a:t>08.07.2019</a:t>
+              <a:t>22.07.2019</a:t>
             </a:fld>
             <a:endParaRPr lang="pl-PL"/>
           </a:p>
@@ -1964,7 +1965,7 @@
           <a:p>
             <a:fld id="{A42A12F9-EA54-49E1-A3FD-186D9B25B348}" type="datetimeFigureOut">
               <a:rPr lang="pl-PL" smtClean="0"/>
-              <a:t>08.07.2019</a:t>
+              <a:t>22.07.2019</a:t>
             </a:fld>
             <a:endParaRPr lang="pl-PL"/>
           </a:p>
@@ -2077,7 +2078,7 @@
           <a:p>
             <a:fld id="{A42A12F9-EA54-49E1-A3FD-186D9B25B348}" type="datetimeFigureOut">
               <a:rPr lang="pl-PL" smtClean="0"/>
-              <a:t>08.07.2019</a:t>
+              <a:t>22.07.2019</a:t>
             </a:fld>
             <a:endParaRPr lang="pl-PL"/>
           </a:p>
@@ -2388,7 +2389,7 @@
           <a:p>
             <a:fld id="{A42A12F9-EA54-49E1-A3FD-186D9B25B348}" type="datetimeFigureOut">
               <a:rPr lang="pl-PL" smtClean="0"/>
-              <a:t>08.07.2019</a:t>
+              <a:t>22.07.2019</a:t>
             </a:fld>
             <a:endParaRPr lang="pl-PL"/>
           </a:p>
@@ -2676,7 +2677,7 @@
           <a:p>
             <a:fld id="{A42A12F9-EA54-49E1-A3FD-186D9B25B348}" type="datetimeFigureOut">
               <a:rPr lang="pl-PL" smtClean="0"/>
-              <a:t>08.07.2019</a:t>
+              <a:t>22.07.2019</a:t>
             </a:fld>
             <a:endParaRPr lang="pl-PL"/>
           </a:p>
@@ -2917,7 +2918,7 @@
           <a:p>
             <a:fld id="{A42A12F9-EA54-49E1-A3FD-186D9B25B348}" type="datetimeFigureOut">
               <a:rPr lang="pl-PL" smtClean="0"/>
-              <a:t>08.07.2019</a:t>
+              <a:t>22.07.2019</a:t>
             </a:fld>
             <a:endParaRPr lang="pl-PL"/>
           </a:p>
@@ -3434,6 +3435,716 @@
       </p:grpSpPr>
       <p:pic>
         <p:nvPicPr>
+          <p:cNvPr id="91" name="Grafika 90" descr="Dymek">
+            <a:extLst>
+              <a:ext uri="{FF2B5EF4-FFF2-40B4-BE49-F238E27FC236}">
+                <a16:creationId xmlns:a16="http://schemas.microsoft.com/office/drawing/2014/main" id="{904DE078-E5DC-4304-AED5-189219F35CC6}"/>
+              </a:ext>
+            </a:extLst>
+          </p:cNvPr>
+          <p:cNvPicPr>
+            <a:picLocks noChangeAspect="1"/>
+          </p:cNvPicPr>
+          <p:nvPr/>
+        </p:nvPicPr>
+        <p:blipFill>
+          <a:blip r:embed="rId2">
+            <a:extLst>
+              <a:ext uri="{28A0092B-C50C-407E-A947-70E740481C1C}">
+                <a14:useLocalDpi xmlns:a14="http://schemas.microsoft.com/office/drawing/2010/main" val="0"/>
+              </a:ext>
+              <a:ext uri="{96DAC541-7B7A-43D3-8B79-37D633B846F1}">
+                <asvg:svgBlip xmlns:asvg="http://schemas.microsoft.com/office/drawing/2016/SVG/main" r:embed="rId3"/>
+              </a:ext>
+            </a:extLst>
+          </a:blip>
+          <a:stretch>
+            <a:fillRect/>
+          </a:stretch>
+        </p:blipFill>
+        <p:spPr>
+          <a:xfrm rot="20042833" flipH="1">
+            <a:off x="2772277" y="1983121"/>
+            <a:ext cx="2571363" cy="2860662"/>
+          </a:xfrm>
+          <a:prstGeom prst="rect">
+            <a:avLst/>
+          </a:prstGeom>
+        </p:spPr>
+      </p:pic>
+      <p:pic>
+        <p:nvPicPr>
+          <p:cNvPr id="90" name="Grafika 89" descr="Dymek">
+            <a:extLst>
+              <a:ext uri="{FF2B5EF4-FFF2-40B4-BE49-F238E27FC236}">
+                <a16:creationId xmlns:a16="http://schemas.microsoft.com/office/drawing/2014/main" id="{41ECFA3D-98A3-4822-A78F-9EF53EE6DB9A}"/>
+              </a:ext>
+            </a:extLst>
+          </p:cNvPr>
+          <p:cNvPicPr>
+            <a:picLocks noChangeAspect="1"/>
+          </p:cNvPicPr>
+          <p:nvPr/>
+        </p:nvPicPr>
+        <p:blipFill>
+          <a:blip r:embed="rId2">
+            <a:extLst>
+              <a:ext uri="{28A0092B-C50C-407E-A947-70E740481C1C}">
+                <a14:useLocalDpi xmlns:a14="http://schemas.microsoft.com/office/drawing/2010/main" val="0"/>
+              </a:ext>
+              <a:ext uri="{96DAC541-7B7A-43D3-8B79-37D633B846F1}">
+                <asvg:svgBlip xmlns:asvg="http://schemas.microsoft.com/office/drawing/2016/SVG/main" r:embed="rId3"/>
+              </a:ext>
+            </a:extLst>
+          </a:blip>
+          <a:stretch>
+            <a:fillRect/>
+          </a:stretch>
+        </p:blipFill>
+        <p:spPr>
+          <a:xfrm>
+            <a:off x="6961794" y="1584211"/>
+            <a:ext cx="2860662" cy="2860662"/>
+          </a:xfrm>
+          <a:prstGeom prst="rect">
+            <a:avLst/>
+          </a:prstGeom>
+        </p:spPr>
+      </p:pic>
+      <p:pic>
+        <p:nvPicPr>
+          <p:cNvPr id="89" name="Grafika 88" descr="Dymek">
+            <a:extLst>
+              <a:ext uri="{FF2B5EF4-FFF2-40B4-BE49-F238E27FC236}">
+                <a16:creationId xmlns:a16="http://schemas.microsoft.com/office/drawing/2014/main" id="{4A1E1178-CD56-46BD-A335-DC2C115E5ED8}"/>
+              </a:ext>
+            </a:extLst>
+          </p:cNvPr>
+          <p:cNvPicPr>
+            <a:picLocks noChangeAspect="1"/>
+          </p:cNvPicPr>
+          <p:nvPr/>
+        </p:nvPicPr>
+        <p:blipFill>
+          <a:blip r:embed="rId2">
+            <a:extLst>
+              <a:ext uri="{28A0092B-C50C-407E-A947-70E740481C1C}">
+                <a14:useLocalDpi xmlns:a14="http://schemas.microsoft.com/office/drawing/2010/main" val="0"/>
+              </a:ext>
+              <a:ext uri="{96DAC541-7B7A-43D3-8B79-37D633B846F1}">
+                <asvg:svgBlip xmlns:asvg="http://schemas.microsoft.com/office/drawing/2016/SVG/main" r:embed="rId3"/>
+              </a:ext>
+            </a:extLst>
+          </a:blip>
+          <a:stretch>
+            <a:fillRect/>
+          </a:stretch>
+        </p:blipFill>
+        <p:spPr>
+          <a:xfrm rot="1057560" flipH="1">
+            <a:off x="4463542" y="618045"/>
+            <a:ext cx="2571363" cy="2860662"/>
+          </a:xfrm>
+          <a:prstGeom prst="rect">
+            <a:avLst/>
+          </a:prstGeom>
+        </p:spPr>
+      </p:pic>
+      <p:pic>
+        <p:nvPicPr>
+          <p:cNvPr id="88" name="Grafika 87" descr="Użytkownik">
+            <a:extLst>
+              <a:ext uri="{FF2B5EF4-FFF2-40B4-BE49-F238E27FC236}">
+                <a16:creationId xmlns:a16="http://schemas.microsoft.com/office/drawing/2014/main" id="{69AA939B-6482-4F12-A791-AF459D7005F1}"/>
+              </a:ext>
+            </a:extLst>
+          </p:cNvPr>
+          <p:cNvPicPr>
+            <a:picLocks noChangeAspect="1"/>
+          </p:cNvPicPr>
+          <p:nvPr/>
+        </p:nvPicPr>
+        <p:blipFill>
+          <a:blip r:embed="rId4">
+            <a:extLst>
+              <a:ext uri="{28A0092B-C50C-407E-A947-70E740481C1C}">
+                <a14:useLocalDpi xmlns:a14="http://schemas.microsoft.com/office/drawing/2010/main" val="0"/>
+              </a:ext>
+              <a:ext uri="{96DAC541-7B7A-43D3-8B79-37D633B846F1}">
+                <asvg:svgBlip xmlns:asvg="http://schemas.microsoft.com/office/drawing/2016/SVG/main" r:embed="rId5"/>
+              </a:ext>
+            </a:extLst>
+          </a:blip>
+          <a:stretch>
+            <a:fillRect/>
+          </a:stretch>
+        </p:blipFill>
+        <p:spPr>
+          <a:xfrm>
+            <a:off x="5413867" y="3396690"/>
+            <a:ext cx="2049239" cy="2049239"/>
+          </a:xfrm>
+          <a:prstGeom prst="rect">
+            <a:avLst/>
+          </a:prstGeom>
+        </p:spPr>
+      </p:pic>
+      <p:pic>
+        <p:nvPicPr>
+          <p:cNvPr id="5" name="Obraz 4">
+            <a:extLst>
+              <a:ext uri="{FF2B5EF4-FFF2-40B4-BE49-F238E27FC236}">
+                <a16:creationId xmlns:a16="http://schemas.microsoft.com/office/drawing/2014/main" id="{FA2B5562-A690-428E-8278-450D1EECD2E4}"/>
+              </a:ext>
+            </a:extLst>
+          </p:cNvPr>
+          <p:cNvPicPr>
+            <a:picLocks noChangeAspect="1"/>
+          </p:cNvPicPr>
+          <p:nvPr/>
+        </p:nvPicPr>
+        <p:blipFill>
+          <a:blip r:embed="rId6">
+            <a:extLst>
+              <a:ext uri="{28A0092B-C50C-407E-A947-70E740481C1C}">
+                <a14:useLocalDpi xmlns:a14="http://schemas.microsoft.com/office/drawing/2010/main" val="0"/>
+              </a:ext>
+            </a:extLst>
+          </a:blip>
+          <a:stretch>
+            <a:fillRect/>
+          </a:stretch>
+        </p:blipFill>
+        <p:spPr>
+          <a:xfrm>
+            <a:off x="153944" y="139485"/>
+            <a:ext cx="2471463" cy="1425844"/>
+          </a:xfrm>
+          <a:prstGeom prst="rect">
+            <a:avLst/>
+          </a:prstGeom>
+        </p:spPr>
+      </p:pic>
+      <p:grpSp>
+        <p:nvGrpSpPr>
+          <p:cNvPr id="46" name="Grupa 45">
+            <a:extLst>
+              <a:ext uri="{FF2B5EF4-FFF2-40B4-BE49-F238E27FC236}">
+                <a16:creationId xmlns:a16="http://schemas.microsoft.com/office/drawing/2014/main" id="{4FA5A4E0-4C79-4D6B-A643-5220C2D4D4DB}"/>
+              </a:ext>
+            </a:extLst>
+          </p:cNvPr>
+          <p:cNvGrpSpPr/>
+          <p:nvPr/>
+        </p:nvGrpSpPr>
+        <p:grpSpPr>
+          <a:xfrm>
+            <a:off x="6927617" y="1446853"/>
+            <a:ext cx="2860662" cy="2860662"/>
+            <a:chOff x="6878570" y="1477769"/>
+            <a:chExt cx="2860662" cy="2860662"/>
+          </a:xfrm>
+        </p:grpSpPr>
+        <p:pic>
+          <p:nvPicPr>
+            <p:cNvPr id="20" name="Grafika 19" descr="Dymek">
+              <a:extLst>
+                <a:ext uri="{FF2B5EF4-FFF2-40B4-BE49-F238E27FC236}">
+                  <a16:creationId xmlns:a16="http://schemas.microsoft.com/office/drawing/2014/main" id="{2E6430A6-3795-462D-B3C0-19202F4E438B}"/>
+                </a:ext>
+              </a:extLst>
+            </p:cNvPr>
+            <p:cNvPicPr>
+              <a:picLocks noChangeAspect="1"/>
+            </p:cNvPicPr>
+            <p:nvPr/>
+          </p:nvPicPr>
+          <p:blipFill>
+            <a:blip r:embed="rId7">
+              <a:extLst>
+                <a:ext uri="{28A0092B-C50C-407E-A947-70E740481C1C}">
+                  <a14:useLocalDpi xmlns:a14="http://schemas.microsoft.com/office/drawing/2010/main" val="0"/>
+                </a:ext>
+                <a:ext uri="{96DAC541-7B7A-43D3-8B79-37D633B846F1}">
+                  <asvg:svgBlip xmlns:asvg="http://schemas.microsoft.com/office/drawing/2016/SVG/main" r:embed="rId8"/>
+                </a:ext>
+              </a:extLst>
+            </a:blip>
+            <a:stretch>
+              <a:fillRect/>
+            </a:stretch>
+          </p:blipFill>
+          <p:spPr>
+            <a:xfrm>
+              <a:off x="6878570" y="1477769"/>
+              <a:ext cx="2860662" cy="2860662"/>
+            </a:xfrm>
+            <a:prstGeom prst="rect">
+              <a:avLst/>
+            </a:prstGeom>
+          </p:spPr>
+        </p:pic>
+        <p:sp>
+          <p:nvSpPr>
+            <p:cNvPr id="67" name="Prostokąt 66">
+              <a:extLst>
+                <a:ext uri="{FF2B5EF4-FFF2-40B4-BE49-F238E27FC236}">
+                  <a16:creationId xmlns:a16="http://schemas.microsoft.com/office/drawing/2014/main" id="{2DC70FE3-63D1-4367-8281-EB50710F5519}"/>
+                </a:ext>
+              </a:extLst>
+            </p:cNvPr>
+            <p:cNvSpPr/>
+            <p:nvPr/>
+          </p:nvSpPr>
+          <p:spPr>
+            <a:xfrm>
+              <a:off x="7009467" y="2416836"/>
+              <a:ext cx="2460515" cy="400110"/>
+            </a:xfrm>
+            <a:prstGeom prst="rect">
+              <a:avLst/>
+            </a:prstGeom>
+            <a:noFill/>
+          </p:spPr>
+          <p:txBody>
+            <a:bodyPr wrap="square" lIns="91440" tIns="45720" rIns="91440" bIns="45720">
+              <a:spAutoFit/>
+            </a:bodyPr>
+            <a:lstStyle/>
+            <a:p>
+              <a:pPr algn="ctr"/>
+              <a:r>
+                <a:rPr lang="pl-PL" sz="2000" b="1" dirty="0">
+                  <a:ln w="0"/>
+                  <a:effectLst>
+                    <a:outerShdw blurRad="38100" dist="19050" dir="2700000" algn="tl" rotWithShape="0">
+                      <a:schemeClr val="dk1">
+                        <a:alpha val="40000"/>
+                      </a:schemeClr>
+                    </a:outerShdw>
+                  </a:effectLst>
+                </a:rPr>
+                <a:t>V_SAP_NEW_HIRES</a:t>
+              </a:r>
+            </a:p>
+          </p:txBody>
+        </p:sp>
+      </p:grpSp>
+      <p:pic>
+        <p:nvPicPr>
+          <p:cNvPr id="45" name="Grafika 44" descr="Użytkownik">
+            <a:extLst>
+              <a:ext uri="{FF2B5EF4-FFF2-40B4-BE49-F238E27FC236}">
+                <a16:creationId xmlns:a16="http://schemas.microsoft.com/office/drawing/2014/main" id="{812EC455-0476-4F86-ABE5-8A46C95526F5}"/>
+              </a:ext>
+            </a:extLst>
+          </p:cNvPr>
+          <p:cNvPicPr>
+            <a:picLocks noChangeAspect="1"/>
+          </p:cNvPicPr>
+          <p:nvPr/>
+        </p:nvPicPr>
+        <p:blipFill>
+          <a:blip r:embed="rId9">
+            <a:extLst>
+              <a:ext uri="{28A0092B-C50C-407E-A947-70E740481C1C}">
+                <a14:useLocalDpi xmlns:a14="http://schemas.microsoft.com/office/drawing/2010/main" val="0"/>
+              </a:ext>
+              <a:ext uri="{96DAC541-7B7A-43D3-8B79-37D633B846F1}">
+                <asvg:svgBlip xmlns:asvg="http://schemas.microsoft.com/office/drawing/2016/SVG/main" r:embed="rId10"/>
+              </a:ext>
+            </a:extLst>
+          </a:blip>
+          <a:stretch>
+            <a:fillRect/>
+          </a:stretch>
+        </p:blipFill>
+        <p:spPr>
+          <a:xfrm>
+            <a:off x="5329832" y="3296234"/>
+            <a:ext cx="2049239" cy="2049239"/>
+          </a:xfrm>
+          <a:prstGeom prst="rect">
+            <a:avLst/>
+          </a:prstGeom>
+        </p:spPr>
+      </p:pic>
+      <p:pic>
+        <p:nvPicPr>
+          <p:cNvPr id="79" name="Grafika 78" descr="Dymek">
+            <a:extLst>
+              <a:ext uri="{FF2B5EF4-FFF2-40B4-BE49-F238E27FC236}">
+                <a16:creationId xmlns:a16="http://schemas.microsoft.com/office/drawing/2014/main" id="{F0CBF611-6E11-42E0-AFD5-6619C031A2D9}"/>
+              </a:ext>
+            </a:extLst>
+          </p:cNvPr>
+          <p:cNvPicPr>
+            <a:picLocks noChangeAspect="1"/>
+          </p:cNvPicPr>
+          <p:nvPr/>
+        </p:nvPicPr>
+        <p:blipFill>
+          <a:blip r:embed="rId7">
+            <a:extLst>
+              <a:ext uri="{28A0092B-C50C-407E-A947-70E740481C1C}">
+                <a14:useLocalDpi xmlns:a14="http://schemas.microsoft.com/office/drawing/2010/main" val="0"/>
+              </a:ext>
+              <a:ext uri="{96DAC541-7B7A-43D3-8B79-37D633B846F1}">
+                <asvg:svgBlip xmlns:asvg="http://schemas.microsoft.com/office/drawing/2016/SVG/main" r:embed="rId8"/>
+              </a:ext>
+            </a:extLst>
+          </a:blip>
+          <a:stretch>
+            <a:fillRect/>
+          </a:stretch>
+        </p:blipFill>
+        <p:spPr>
+          <a:xfrm rot="1057560" flipH="1">
+            <a:off x="4363943" y="524586"/>
+            <a:ext cx="2571363" cy="2860662"/>
+          </a:xfrm>
+          <a:prstGeom prst="rect">
+            <a:avLst/>
+          </a:prstGeom>
+        </p:spPr>
+      </p:pic>
+      <p:sp>
+        <p:nvSpPr>
+          <p:cNvPr id="80" name="Prostokąt 79">
+            <a:extLst>
+              <a:ext uri="{FF2B5EF4-FFF2-40B4-BE49-F238E27FC236}">
+                <a16:creationId xmlns:a16="http://schemas.microsoft.com/office/drawing/2014/main" id="{C9688AEB-691C-457D-8B90-04C5A1DA54B9}"/>
+              </a:ext>
+            </a:extLst>
+          </p:cNvPr>
+          <p:cNvSpPr/>
+          <p:nvPr/>
+        </p:nvSpPr>
+        <p:spPr>
+          <a:xfrm rot="887879">
+            <a:off x="4457284" y="1425384"/>
+            <a:ext cx="2460515" cy="400110"/>
+          </a:xfrm>
+          <a:prstGeom prst="rect">
+            <a:avLst/>
+          </a:prstGeom>
+          <a:noFill/>
+        </p:spPr>
+        <p:txBody>
+          <a:bodyPr wrap="square" lIns="91440" tIns="45720" rIns="91440" bIns="45720">
+            <a:spAutoFit/>
+          </a:bodyPr>
+          <a:lstStyle/>
+          <a:p>
+            <a:pPr algn="ctr"/>
+            <a:r>
+              <a:rPr lang="pl-PL" sz="2000" b="1" dirty="0">
+                <a:ln w="0"/>
+                <a:effectLst>
+                  <a:outerShdw blurRad="38100" dist="19050" dir="2700000" algn="tl" rotWithShape="0">
+                    <a:schemeClr val="dk1">
+                      <a:alpha val="40000"/>
+                    </a:schemeClr>
+                  </a:outerShdw>
+                </a:effectLst>
+              </a:rPr>
+              <a:t>K024_AGMT_KEY</a:t>
+            </a:r>
+          </a:p>
+        </p:txBody>
+      </p:sp>
+      <p:pic>
+        <p:nvPicPr>
+          <p:cNvPr id="86" name="Grafika 85" descr="Dymek">
+            <a:extLst>
+              <a:ext uri="{FF2B5EF4-FFF2-40B4-BE49-F238E27FC236}">
+                <a16:creationId xmlns:a16="http://schemas.microsoft.com/office/drawing/2014/main" id="{62E90D0F-F159-4042-B5D4-28154E60D16A}"/>
+              </a:ext>
+            </a:extLst>
+          </p:cNvPr>
+          <p:cNvPicPr>
+            <a:picLocks noChangeAspect="1"/>
+          </p:cNvPicPr>
+          <p:nvPr/>
+        </p:nvPicPr>
+        <p:blipFill>
+          <a:blip r:embed="rId7">
+            <a:extLst>
+              <a:ext uri="{28A0092B-C50C-407E-A947-70E740481C1C}">
+                <a14:useLocalDpi xmlns:a14="http://schemas.microsoft.com/office/drawing/2010/main" val="0"/>
+              </a:ext>
+              <a:ext uri="{96DAC541-7B7A-43D3-8B79-37D633B846F1}">
+                <asvg:svgBlip xmlns:asvg="http://schemas.microsoft.com/office/drawing/2016/SVG/main" r:embed="rId8"/>
+              </a:ext>
+            </a:extLst>
+          </a:blip>
+          <a:stretch>
+            <a:fillRect/>
+          </a:stretch>
+        </p:blipFill>
+        <p:spPr>
+          <a:xfrm rot="20042833" flipH="1">
+            <a:off x="2670079" y="1877451"/>
+            <a:ext cx="2571363" cy="2860662"/>
+          </a:xfrm>
+          <a:prstGeom prst="rect">
+            <a:avLst/>
+          </a:prstGeom>
+        </p:spPr>
+      </p:pic>
+      <p:sp>
+        <p:nvSpPr>
+          <p:cNvPr id="87" name="Prostokąt 86">
+            <a:extLst>
+              <a:ext uri="{FF2B5EF4-FFF2-40B4-BE49-F238E27FC236}">
+                <a16:creationId xmlns:a16="http://schemas.microsoft.com/office/drawing/2014/main" id="{3C620BAB-4BCB-4020-AECB-E0795BC7B51C}"/>
+              </a:ext>
+            </a:extLst>
+          </p:cNvPr>
+          <p:cNvSpPr/>
+          <p:nvPr/>
+        </p:nvSpPr>
+        <p:spPr>
+          <a:xfrm rot="19932552">
+            <a:off x="2570397" y="2903091"/>
+            <a:ext cx="2460515" cy="400110"/>
+          </a:xfrm>
+          <a:prstGeom prst="rect">
+            <a:avLst/>
+          </a:prstGeom>
+          <a:noFill/>
+        </p:spPr>
+        <p:txBody>
+          <a:bodyPr wrap="square" lIns="91440" tIns="45720" rIns="91440" bIns="45720">
+            <a:spAutoFit/>
+          </a:bodyPr>
+          <a:lstStyle/>
+          <a:p>
+            <a:pPr algn="ctr"/>
+            <a:r>
+              <a:rPr lang="pl-PL" sz="2000" b="1" dirty="0">
+                <a:ln w="0"/>
+                <a:effectLst>
+                  <a:outerShdw blurRad="38100" dist="19050" dir="2700000" algn="tl" rotWithShape="0">
+                    <a:schemeClr val="dk1">
+                      <a:alpha val="40000"/>
+                    </a:schemeClr>
+                  </a:outerShdw>
+                </a:effectLst>
+              </a:rPr>
+              <a:t>DIM</a:t>
+            </a:r>
+            <a:r>
+              <a:rPr lang="pl-PL" sz="2000" dirty="0">
+                <a:ln w="0"/>
+                <a:effectLst>
+                  <a:outerShdw blurRad="38100" dist="19050" dir="2700000" algn="tl" rotWithShape="0">
+                    <a:schemeClr val="dk1">
+                      <a:alpha val="40000"/>
+                    </a:schemeClr>
+                  </a:outerShdw>
+                </a:effectLst>
+              </a:rPr>
+              <a:t>_</a:t>
+            </a:r>
+            <a:r>
+              <a:rPr lang="pl-PL" sz="2000" b="1" dirty="0">
+                <a:ln w="0"/>
+                <a:effectLst>
+                  <a:outerShdw blurRad="38100" dist="19050" dir="2700000" algn="tl" rotWithShape="0">
+                    <a:schemeClr val="dk1">
+                      <a:alpha val="40000"/>
+                    </a:schemeClr>
+                  </a:outerShdw>
+                </a:effectLst>
+              </a:rPr>
+              <a:t>LOCATION</a:t>
+            </a:r>
+          </a:p>
+        </p:txBody>
+      </p:sp>
+      <p:sp>
+        <p:nvSpPr>
+          <p:cNvPr id="92" name="Prostokąt 91">
+            <a:extLst>
+              <a:ext uri="{FF2B5EF4-FFF2-40B4-BE49-F238E27FC236}">
+                <a16:creationId xmlns:a16="http://schemas.microsoft.com/office/drawing/2014/main" id="{DE2F2B82-697B-4C4A-A68A-69A9407B62F6}"/>
+              </a:ext>
+            </a:extLst>
+          </p:cNvPr>
+          <p:cNvSpPr/>
+          <p:nvPr/>
+        </p:nvSpPr>
+        <p:spPr>
+          <a:xfrm>
+            <a:off x="1883645" y="5246582"/>
+            <a:ext cx="8941612" cy="1015663"/>
+          </a:xfrm>
+          <a:prstGeom prst="rect">
+            <a:avLst/>
+          </a:prstGeom>
+          <a:noFill/>
+        </p:spPr>
+        <p:txBody>
+          <a:bodyPr wrap="square" lIns="91440" tIns="45720" rIns="91440" bIns="45720">
+            <a:spAutoFit/>
+          </a:bodyPr>
+          <a:lstStyle/>
+          <a:p>
+            <a:pPr algn="ctr"/>
+            <a:r>
+              <a:rPr lang="pl-PL" sz="6000" b="1" dirty="0" err="1">
+                <a:ln w="10160">
+                  <a:solidFill>
+                    <a:schemeClr val="accent5"/>
+                  </a:solidFill>
+                  <a:prstDash val="solid"/>
+                </a:ln>
+                <a:solidFill>
+                  <a:srgbClr val="FFFFFF"/>
+                </a:solidFill>
+                <a:effectLst>
+                  <a:outerShdw blurRad="38100" dist="22860" dir="5400000" algn="tl" rotWithShape="0">
+                    <a:srgbClr val="000000">
+                      <a:alpha val="30000"/>
+                    </a:srgbClr>
+                  </a:outerShdw>
+                </a:effectLst>
+              </a:rPr>
+              <a:t>Naming</a:t>
+            </a:r>
+            <a:r>
+              <a:rPr lang="pl-PL" sz="6000" b="1" dirty="0">
+                <a:ln w="10160">
+                  <a:solidFill>
+                    <a:schemeClr val="accent5"/>
+                  </a:solidFill>
+                  <a:prstDash val="solid"/>
+                </a:ln>
+                <a:solidFill>
+                  <a:srgbClr val="FFFFFF"/>
+                </a:solidFill>
+                <a:effectLst>
+                  <a:outerShdw blurRad="38100" dist="22860" dir="5400000" algn="tl" rotWithShape="0">
+                    <a:srgbClr val="000000">
+                      <a:alpha val="30000"/>
+                    </a:srgbClr>
+                  </a:outerShdw>
+                </a:effectLst>
+              </a:rPr>
+              <a:t> </a:t>
+            </a:r>
+            <a:r>
+              <a:rPr lang="pl-PL" sz="6000" b="1" dirty="0" err="1">
+                <a:ln w="10160">
+                  <a:solidFill>
+                    <a:schemeClr val="accent5"/>
+                  </a:solidFill>
+                  <a:prstDash val="solid"/>
+                </a:ln>
+                <a:solidFill>
+                  <a:srgbClr val="FFFFFF"/>
+                </a:solidFill>
+                <a:effectLst>
+                  <a:outerShdw blurRad="38100" dist="22860" dir="5400000" algn="tl" rotWithShape="0">
+                    <a:srgbClr val="000000">
+                      <a:alpha val="30000"/>
+                    </a:srgbClr>
+                  </a:outerShdw>
+                </a:effectLst>
+              </a:rPr>
+              <a:t>standards</a:t>
+            </a:r>
+            <a:r>
+              <a:rPr lang="pl-PL" sz="6000" b="1" dirty="0">
+                <a:ln w="10160">
+                  <a:solidFill>
+                    <a:schemeClr val="accent5"/>
+                  </a:solidFill>
+                  <a:prstDash val="solid"/>
+                </a:ln>
+                <a:solidFill>
+                  <a:srgbClr val="FFFFFF"/>
+                </a:solidFill>
+                <a:effectLst>
+                  <a:outerShdw blurRad="38100" dist="22860" dir="5400000" algn="tl" rotWithShape="0">
+                    <a:srgbClr val="000000">
+                      <a:alpha val="30000"/>
+                    </a:srgbClr>
+                  </a:outerShdw>
+                </a:effectLst>
+              </a:rPr>
+              <a:t> in DWH</a:t>
+            </a:r>
+            <a:endParaRPr lang="pl-PL" sz="6000" b="1" cap="none" spc="0" dirty="0">
+              <a:ln w="10160">
+                <a:solidFill>
+                  <a:schemeClr val="accent5"/>
+                </a:solidFill>
+                <a:prstDash val="solid"/>
+              </a:ln>
+              <a:solidFill>
+                <a:srgbClr val="FFFFFF"/>
+              </a:solidFill>
+              <a:effectLst>
+                <a:outerShdw blurRad="38100" dist="22860" dir="5400000" algn="tl" rotWithShape="0">
+                  <a:srgbClr val="000000">
+                    <a:alpha val="30000"/>
+                  </a:srgbClr>
+                </a:outerShdw>
+              </a:effectLst>
+            </a:endParaRPr>
+          </a:p>
+        </p:txBody>
+      </p:sp>
+    </p:spTree>
+    <p:extLst>
+      <p:ext uri="{BB962C8B-B14F-4D97-AF65-F5344CB8AC3E}">
+        <p14:creationId xmlns:p14="http://schemas.microsoft.com/office/powerpoint/2010/main" val="1773695073"/>
+      </p:ext>
+    </p:extLst>
+  </p:cSld>
+  <p:clrMapOvr>
+    <a:masterClrMapping/>
+  </p:clrMapOvr>
+</p:sld>
+</file>
+
+<file path=ppt/slides/slide3.xml><?xml version="1.0" encoding="utf-8"?>
+<p:sld xmlns:a="http://schemas.openxmlformats.org/drawingml/2006/main" xmlns:r="http://schemas.openxmlformats.org/officeDocument/2006/relationships" xmlns:p="http://schemas.openxmlformats.org/presentationml/2006/main">
+  <p:cSld>
+    <p:bg>
+      <p:bgPr>
+        <a:gradFill>
+          <a:gsLst>
+            <a:gs pos="54000">
+              <a:srgbClr val="07A1D7"/>
+            </a:gs>
+            <a:gs pos="100000">
+              <a:srgbClr val="11CFD9"/>
+            </a:gs>
+          </a:gsLst>
+          <a:lin ang="5400000" scaled="1"/>
+        </a:gradFill>
+        <a:effectLst/>
+      </p:bgPr>
+    </p:bg>
+    <p:spTree>
+      <p:nvGrpSpPr>
+        <p:cNvPr id="1" name=""/>
+        <p:cNvGrpSpPr/>
+        <p:nvPr/>
+      </p:nvGrpSpPr>
+      <p:grpSpPr>
+        <a:xfrm>
+          <a:off x="0" y="0"/>
+          <a:ext cx="0" cy="0"/>
+          <a:chOff x="0" y="0"/>
+          <a:chExt cx="0" cy="0"/>
+        </a:xfrm>
+      </p:grpSpPr>
+      <p:pic>
+        <p:nvPicPr>
           <p:cNvPr id="5" name="Obraz 4">
             <a:extLst>
               <a:ext uri="{FF2B5EF4-FFF2-40B4-BE49-F238E27FC236}">
@@ -5368,7 +6079,7 @@
 </p:sld>
 </file>
 
-<file path=ppt/slides/slide3.xml><?xml version="1.0" encoding="utf-8"?>
+<file path=ppt/slides/slide4.xml><?xml version="1.0" encoding="utf-8"?>
 <p:sld xmlns:a="http://schemas.openxmlformats.org/drawingml/2006/main" xmlns:r="http://schemas.openxmlformats.org/officeDocument/2006/relationships" xmlns:p="http://schemas.openxmlformats.org/presentationml/2006/main">
   <p:cSld>
     <p:bg>
@@ -6030,7 +6741,7 @@
         </p:nvSpPr>
         <p:spPr>
           <a:xfrm>
-            <a:off x="4909620" y="4907511"/>
+            <a:off x="4909620" y="4752092"/>
             <a:ext cx="2925000" cy="1754326"/>
           </a:xfrm>
           <a:prstGeom prst="rect">
@@ -6121,7 +6832,7 @@
 </p:sld>
 </file>
 
-<file path=ppt/slides/slide4.xml><?xml version="1.0" encoding="utf-8"?>
+<file path=ppt/slides/slide5.xml><?xml version="1.0" encoding="utf-8"?>
 <p:sld xmlns:a="http://schemas.openxmlformats.org/drawingml/2006/main" xmlns:r="http://schemas.openxmlformats.org/officeDocument/2006/relationships" xmlns:p="http://schemas.openxmlformats.org/presentationml/2006/main">
   <p:cSld>
     <p:bg>
@@ -9234,7 +9945,7 @@
 </p:sld>
 </file>
 
-<file path=ppt/slides/slide5.xml><?xml version="1.0" encoding="utf-8"?>
+<file path=ppt/slides/slide6.xml><?xml version="1.0" encoding="utf-8"?>
 <p:sld xmlns:a="http://schemas.openxmlformats.org/drawingml/2006/main" xmlns:r="http://schemas.openxmlformats.org/officeDocument/2006/relationships" xmlns:p="http://schemas.openxmlformats.org/presentationml/2006/main">
   <p:cSld>
     <p:bg>

</xml_diff>

<commit_message>
modified pic for hierarchies
</commit_message>
<xml_diff>
--- a/themes/hugo-elate-theme/static/images/Pictures for blog.pptx
+++ b/themes/hugo-elate-theme/static/images/Pictures for blog.pptx
@@ -2,17 +2,23 @@
 <file path=ppt/presentation.xml><?xml version="1.0" encoding="utf-8"?>
 <p:presentation xmlns:a="http://schemas.openxmlformats.org/drawingml/2006/main" xmlns:r="http://schemas.openxmlformats.org/officeDocument/2006/relationships" xmlns:p="http://schemas.openxmlformats.org/presentationml/2006/main" saveSubsetFonts="1">
   <p:sldMasterIdLst>
-    <p:sldMasterId id="2147483648" r:id="rId1"/>
+    <p:sldMasterId id="2147483648" r:id="rId2"/>
   </p:sldMasterIdLst>
+  <p:notesMasterIdLst>
+    <p:notesMasterId r:id="rId11"/>
+  </p:notesMasterIdLst>
+  <p:handoutMasterIdLst>
+    <p:handoutMasterId r:id="rId12"/>
+  </p:handoutMasterIdLst>
   <p:sldIdLst>
-    <p:sldId id="257" r:id="rId2"/>
-    <p:sldId id="263" r:id="rId3"/>
-    <p:sldId id="262" r:id="rId4"/>
-    <p:sldId id="261" r:id="rId5"/>
-    <p:sldId id="260" r:id="rId6"/>
-    <p:sldId id="259" r:id="rId7"/>
-    <p:sldId id="258" r:id="rId8"/>
-    <p:sldId id="256" r:id="rId9"/>
+    <p:sldId id="257" r:id="rId3"/>
+    <p:sldId id="263" r:id="rId4"/>
+    <p:sldId id="262" r:id="rId5"/>
+    <p:sldId id="261" r:id="rId6"/>
+    <p:sldId id="260" r:id="rId7"/>
+    <p:sldId id="259" r:id="rId8"/>
+    <p:sldId id="258" r:id="rId9"/>
+    <p:sldId id="256" r:id="rId10"/>
   </p:sldIdLst>
   <p:sldSz cx="12192000" cy="6858000"/>
   <p:notesSz cx="6858000" cy="9144000"/>
@@ -119,8 +125,1519 @@
 </p:presentation>
 </file>
 
-<file path=ppt/revisionInfo.xml><?xml version="1.0" encoding="utf-8"?>
-<p1510:revInfo xmlns:a="http://schemas.openxmlformats.org/drawingml/2006/main" xmlns:r="http://schemas.openxmlformats.org/officeDocument/2006/relationships" xmlns:p1510="http://schemas.microsoft.com/office/powerpoint/2015/10/main"/>
+<file path=ppt/handoutMasters/handoutMaster1.xml><?xml version="1.0" encoding="utf-8"?>
+<p:handoutMaster xmlns:a="http://schemas.openxmlformats.org/drawingml/2006/main" xmlns:r="http://schemas.openxmlformats.org/officeDocument/2006/relationships" xmlns:p="http://schemas.openxmlformats.org/presentationml/2006/main">
+  <p:cSld>
+    <p:bg>
+      <p:bgRef idx="1001">
+        <a:schemeClr val="bg1"/>
+      </p:bgRef>
+    </p:bg>
+    <p:spTree>
+      <p:nvGrpSpPr>
+        <p:cNvPr id="1" name=""/>
+        <p:cNvGrpSpPr/>
+        <p:nvPr/>
+      </p:nvGrpSpPr>
+      <p:grpSpPr>
+        <a:xfrm>
+          <a:off x="0" y="0"/>
+          <a:ext cx="0" cy="0"/>
+          <a:chOff x="0" y="0"/>
+          <a:chExt cx="0" cy="0"/>
+        </a:xfrm>
+      </p:grpSpPr>
+      <p:sp>
+        <p:nvSpPr>
+          <p:cNvPr id="2" name="Header Placeholder 1">
+            <a:extLst>
+              <a:ext uri="{FF2B5EF4-FFF2-40B4-BE49-F238E27FC236}">
+                <a16:creationId xmlns:a16="http://schemas.microsoft.com/office/drawing/2014/main" id="{9473FDFF-EAE7-4F89-9172-A500DA698A36}"/>
+              </a:ext>
+            </a:extLst>
+          </p:cNvPr>
+          <p:cNvSpPr>
+            <a:spLocks noGrp="1"/>
+          </p:cNvSpPr>
+          <p:nvPr>
+            <p:ph type="hdr" sz="quarter"/>
+          </p:nvPr>
+        </p:nvSpPr>
+        <p:spPr>
+          <a:xfrm>
+            <a:off x="0" y="0"/>
+            <a:ext cx="2971800" cy="458788"/>
+          </a:xfrm>
+          <a:prstGeom prst="rect">
+            <a:avLst/>
+          </a:prstGeom>
+        </p:spPr>
+        <p:txBody>
+          <a:bodyPr vert="horz" lIns="91440" tIns="45720" rIns="91440" bIns="45720" rtlCol="0"/>
+          <a:lstStyle>
+            <a:lvl1pPr algn="l">
+              <a:defRPr sz="1200"/>
+            </a:lvl1pPr>
+          </a:lstStyle>
+          <a:p>
+            <a:endParaRPr lang="en-US"/>
+          </a:p>
+        </p:txBody>
+      </p:sp>
+      <p:sp>
+        <p:nvSpPr>
+          <p:cNvPr id="3" name="Date Placeholder 2">
+            <a:extLst>
+              <a:ext uri="{FF2B5EF4-FFF2-40B4-BE49-F238E27FC236}">
+                <a16:creationId xmlns:a16="http://schemas.microsoft.com/office/drawing/2014/main" id="{281FCDCF-0E29-4EB9-BE68-C9D59412E583}"/>
+              </a:ext>
+            </a:extLst>
+          </p:cNvPr>
+          <p:cNvSpPr>
+            <a:spLocks noGrp="1"/>
+          </p:cNvSpPr>
+          <p:nvPr>
+            <p:ph type="dt" sz="quarter" idx="1"/>
+          </p:nvPr>
+        </p:nvSpPr>
+        <p:spPr>
+          <a:xfrm>
+            <a:off x="3884613" y="0"/>
+            <a:ext cx="2971800" cy="458788"/>
+          </a:xfrm>
+          <a:prstGeom prst="rect">
+            <a:avLst/>
+          </a:prstGeom>
+        </p:spPr>
+        <p:txBody>
+          <a:bodyPr vert="horz" lIns="91440" tIns="45720" rIns="91440" bIns="45720" rtlCol="0"/>
+          <a:lstStyle>
+            <a:lvl1pPr algn="r">
+              <a:defRPr sz="1200"/>
+            </a:lvl1pPr>
+          </a:lstStyle>
+          <a:p>
+            <a:fld id="{85F6B539-82EF-4B0A-81D6-A7AC15FDDE32}" type="datetimeFigureOut">
+              <a:rPr lang="en-US" smtClean="0"/>
+              <a:t>8/14/2019</a:t>
+            </a:fld>
+            <a:endParaRPr lang="en-US"/>
+          </a:p>
+        </p:txBody>
+      </p:sp>
+      <p:sp>
+        <p:nvSpPr>
+          <p:cNvPr id="4" name="Footer Placeholder 3">
+            <a:extLst>
+              <a:ext uri="{FF2B5EF4-FFF2-40B4-BE49-F238E27FC236}">
+                <a16:creationId xmlns:a16="http://schemas.microsoft.com/office/drawing/2014/main" id="{E6EB5F93-38F7-4003-BB16-15D378D0A6C5}"/>
+              </a:ext>
+            </a:extLst>
+          </p:cNvPr>
+          <p:cNvSpPr>
+            <a:spLocks noGrp="1"/>
+          </p:cNvSpPr>
+          <p:nvPr>
+            <p:ph type="ftr" sz="quarter" idx="2"/>
+          </p:nvPr>
+        </p:nvSpPr>
+        <p:spPr>
+          <a:xfrm>
+            <a:off x="0" y="8685213"/>
+            <a:ext cx="2971800" cy="458787"/>
+          </a:xfrm>
+          <a:prstGeom prst="rect">
+            <a:avLst/>
+          </a:prstGeom>
+        </p:spPr>
+        <p:txBody>
+          <a:bodyPr vert="horz" lIns="91440" tIns="45720" rIns="91440" bIns="45720" rtlCol="0" anchor="b"/>
+          <a:lstStyle>
+            <a:lvl1pPr algn="l">
+              <a:defRPr sz="1200"/>
+            </a:lvl1pPr>
+          </a:lstStyle>
+          <a:p>
+            <a:endParaRPr lang="en-US"/>
+          </a:p>
+        </p:txBody>
+      </p:sp>
+      <p:sp>
+        <p:nvSpPr>
+          <p:cNvPr id="5" name="Slide Number Placeholder 4">
+            <a:extLst>
+              <a:ext uri="{FF2B5EF4-FFF2-40B4-BE49-F238E27FC236}">
+                <a16:creationId xmlns:a16="http://schemas.microsoft.com/office/drawing/2014/main" id="{2380F4B3-95A4-4D39-A596-E8A711E0941B}"/>
+              </a:ext>
+            </a:extLst>
+          </p:cNvPr>
+          <p:cNvSpPr>
+            <a:spLocks noGrp="1"/>
+          </p:cNvSpPr>
+          <p:nvPr>
+            <p:ph type="sldNum" sz="quarter" idx="3"/>
+          </p:nvPr>
+        </p:nvSpPr>
+        <p:spPr>
+          <a:xfrm>
+            <a:off x="3884613" y="8685213"/>
+            <a:ext cx="2971800" cy="458787"/>
+          </a:xfrm>
+          <a:prstGeom prst="rect">
+            <a:avLst/>
+          </a:prstGeom>
+        </p:spPr>
+        <p:txBody>
+          <a:bodyPr vert="horz" lIns="91440" tIns="45720" rIns="91440" bIns="45720" rtlCol="0" anchor="b"/>
+          <a:lstStyle>
+            <a:lvl1pPr algn="r">
+              <a:defRPr sz="1200"/>
+            </a:lvl1pPr>
+          </a:lstStyle>
+          <a:p>
+            <a:fld id="{F4E67517-869C-422C-8E5A-3EA762C1A748}" type="slidenum">
+              <a:rPr lang="en-US" smtClean="0"/>
+              <a:t>‹#›</a:t>
+            </a:fld>
+            <a:endParaRPr lang="en-US"/>
+          </a:p>
+        </p:txBody>
+      </p:sp>
+    </p:spTree>
+    <p:extLst>
+      <p:ext uri="{BB962C8B-B14F-4D97-AF65-F5344CB8AC3E}">
+        <p14:creationId xmlns:p14="http://schemas.microsoft.com/office/powerpoint/2010/main" val="2203673456"/>
+      </p:ext>
+    </p:extLst>
+  </p:cSld>
+  <p:clrMap bg1="lt1" tx1="dk1" bg2="lt2" tx2="dk2" accent1="accent1" accent2="accent2" accent3="accent3" accent4="accent4" accent5="accent5" accent6="accent6" hlink="hlink" folHlink="folHlink"/>
+</p:handoutMaster>
+</file>
+
+<file path=ppt/notesMasters/notesMaster1.xml><?xml version="1.0" encoding="utf-8"?>
+<p:notesMaster xmlns:a="http://schemas.openxmlformats.org/drawingml/2006/main" xmlns:r="http://schemas.openxmlformats.org/officeDocument/2006/relationships" xmlns:p="http://schemas.openxmlformats.org/presentationml/2006/main">
+  <p:cSld>
+    <p:bg>
+      <p:bgRef idx="1001">
+        <a:schemeClr val="bg1"/>
+      </p:bgRef>
+    </p:bg>
+    <p:spTree>
+      <p:nvGrpSpPr>
+        <p:cNvPr id="1" name=""/>
+        <p:cNvGrpSpPr/>
+        <p:nvPr/>
+      </p:nvGrpSpPr>
+      <p:grpSpPr>
+        <a:xfrm>
+          <a:off x="0" y="0"/>
+          <a:ext cx="0" cy="0"/>
+          <a:chOff x="0" y="0"/>
+          <a:chExt cx="0" cy="0"/>
+        </a:xfrm>
+      </p:grpSpPr>
+      <p:sp>
+        <p:nvSpPr>
+          <p:cNvPr id="2" name="Header Placeholder 1"/>
+          <p:cNvSpPr>
+            <a:spLocks noGrp="1"/>
+          </p:cNvSpPr>
+          <p:nvPr>
+            <p:ph type="hdr" sz="quarter"/>
+          </p:nvPr>
+        </p:nvSpPr>
+        <p:spPr>
+          <a:xfrm>
+            <a:off x="0" y="0"/>
+            <a:ext cx="2971800" cy="458788"/>
+          </a:xfrm>
+          <a:prstGeom prst="rect">
+            <a:avLst/>
+          </a:prstGeom>
+        </p:spPr>
+        <p:txBody>
+          <a:bodyPr vert="horz" lIns="91440" tIns="45720" rIns="91440" bIns="45720" rtlCol="0"/>
+          <a:lstStyle>
+            <a:lvl1pPr algn="l">
+              <a:defRPr sz="1200"/>
+            </a:lvl1pPr>
+          </a:lstStyle>
+          <a:p>
+            <a:endParaRPr lang="en-US"/>
+          </a:p>
+        </p:txBody>
+      </p:sp>
+      <p:sp>
+        <p:nvSpPr>
+          <p:cNvPr id="3" name="Date Placeholder 2"/>
+          <p:cNvSpPr>
+            <a:spLocks noGrp="1"/>
+          </p:cNvSpPr>
+          <p:nvPr>
+            <p:ph type="dt" idx="1"/>
+          </p:nvPr>
+        </p:nvSpPr>
+        <p:spPr>
+          <a:xfrm>
+            <a:off x="3884613" y="0"/>
+            <a:ext cx="2971800" cy="458788"/>
+          </a:xfrm>
+          <a:prstGeom prst="rect">
+            <a:avLst/>
+          </a:prstGeom>
+        </p:spPr>
+        <p:txBody>
+          <a:bodyPr vert="horz" lIns="91440" tIns="45720" rIns="91440" bIns="45720" rtlCol="0"/>
+          <a:lstStyle>
+            <a:lvl1pPr algn="r">
+              <a:defRPr sz="1200"/>
+            </a:lvl1pPr>
+          </a:lstStyle>
+          <a:p>
+            <a:fld id="{DF849A96-36CF-49A5-9A4F-E58C3FF49857}" type="datetimeFigureOut">
+              <a:rPr lang="en-US" smtClean="0"/>
+              <a:t>8/14/2019</a:t>
+            </a:fld>
+            <a:endParaRPr lang="en-US"/>
+          </a:p>
+        </p:txBody>
+      </p:sp>
+      <p:sp>
+        <p:nvSpPr>
+          <p:cNvPr id="4" name="Slide Image Placeholder 3"/>
+          <p:cNvSpPr>
+            <a:spLocks noGrp="1" noRot="1" noChangeAspect="1"/>
+          </p:cNvSpPr>
+          <p:nvPr>
+            <p:ph type="sldImg" idx="2"/>
+          </p:nvPr>
+        </p:nvSpPr>
+        <p:spPr>
+          <a:xfrm>
+            <a:off x="685800" y="1143000"/>
+            <a:ext cx="5486400" cy="3086100"/>
+          </a:xfrm>
+          <a:prstGeom prst="rect">
+            <a:avLst/>
+          </a:prstGeom>
+          <a:noFill/>
+          <a:ln w="12700">
+            <a:solidFill>
+              <a:prstClr val="black"/>
+            </a:solidFill>
+          </a:ln>
+        </p:spPr>
+        <p:txBody>
+          <a:bodyPr vert="horz" lIns="91440" tIns="45720" rIns="91440" bIns="45720" rtlCol="0" anchor="ctr"/>
+          <a:lstStyle/>
+          <a:p>
+            <a:endParaRPr lang="en-US"/>
+          </a:p>
+        </p:txBody>
+      </p:sp>
+      <p:sp>
+        <p:nvSpPr>
+          <p:cNvPr id="5" name="Notes Placeholder 4"/>
+          <p:cNvSpPr>
+            <a:spLocks noGrp="1"/>
+          </p:cNvSpPr>
+          <p:nvPr>
+            <p:ph type="body" sz="quarter" idx="3"/>
+          </p:nvPr>
+        </p:nvSpPr>
+        <p:spPr>
+          <a:xfrm>
+            <a:off x="685800" y="4400550"/>
+            <a:ext cx="5486400" cy="3600450"/>
+          </a:xfrm>
+          <a:prstGeom prst="rect">
+            <a:avLst/>
+          </a:prstGeom>
+        </p:spPr>
+        <p:txBody>
+          <a:bodyPr vert="horz" lIns="91440" tIns="45720" rIns="91440" bIns="45720" rtlCol="0"/>
+          <a:lstStyle/>
+          <a:p>
+            <a:pPr lvl="0"/>
+            <a:r>
+              <a:rPr lang="en-US"/>
+              <a:t>Edit Master text styles</a:t>
+            </a:r>
+          </a:p>
+          <a:p>
+            <a:pPr lvl="1"/>
+            <a:r>
+              <a:rPr lang="en-US"/>
+              <a:t>Second level</a:t>
+            </a:r>
+          </a:p>
+          <a:p>
+            <a:pPr lvl="2"/>
+            <a:r>
+              <a:rPr lang="en-US"/>
+              <a:t>Third level</a:t>
+            </a:r>
+          </a:p>
+          <a:p>
+            <a:pPr lvl="3"/>
+            <a:r>
+              <a:rPr lang="en-US"/>
+              <a:t>Fourth level</a:t>
+            </a:r>
+          </a:p>
+          <a:p>
+            <a:pPr lvl="4"/>
+            <a:r>
+              <a:rPr lang="en-US"/>
+              <a:t>Fifth level</a:t>
+            </a:r>
+          </a:p>
+        </p:txBody>
+      </p:sp>
+      <p:sp>
+        <p:nvSpPr>
+          <p:cNvPr id="6" name="Footer Placeholder 5"/>
+          <p:cNvSpPr>
+            <a:spLocks noGrp="1"/>
+          </p:cNvSpPr>
+          <p:nvPr>
+            <p:ph type="ftr" sz="quarter" idx="4"/>
+          </p:nvPr>
+        </p:nvSpPr>
+        <p:spPr>
+          <a:xfrm>
+            <a:off x="0" y="8685213"/>
+            <a:ext cx="2971800" cy="458787"/>
+          </a:xfrm>
+          <a:prstGeom prst="rect">
+            <a:avLst/>
+          </a:prstGeom>
+        </p:spPr>
+        <p:txBody>
+          <a:bodyPr vert="horz" lIns="91440" tIns="45720" rIns="91440" bIns="45720" rtlCol="0" anchor="b"/>
+          <a:lstStyle>
+            <a:lvl1pPr algn="l">
+              <a:defRPr sz="1200"/>
+            </a:lvl1pPr>
+          </a:lstStyle>
+          <a:p>
+            <a:endParaRPr lang="en-US"/>
+          </a:p>
+        </p:txBody>
+      </p:sp>
+      <p:sp>
+        <p:nvSpPr>
+          <p:cNvPr id="7" name="Slide Number Placeholder 6"/>
+          <p:cNvSpPr>
+            <a:spLocks noGrp="1"/>
+          </p:cNvSpPr>
+          <p:nvPr>
+            <p:ph type="sldNum" sz="quarter" idx="5"/>
+          </p:nvPr>
+        </p:nvSpPr>
+        <p:spPr>
+          <a:xfrm>
+            <a:off x="3884613" y="8685213"/>
+            <a:ext cx="2971800" cy="458787"/>
+          </a:xfrm>
+          <a:prstGeom prst="rect">
+            <a:avLst/>
+          </a:prstGeom>
+        </p:spPr>
+        <p:txBody>
+          <a:bodyPr vert="horz" lIns="91440" tIns="45720" rIns="91440" bIns="45720" rtlCol="0" anchor="b"/>
+          <a:lstStyle>
+            <a:lvl1pPr algn="r">
+              <a:defRPr sz="1200"/>
+            </a:lvl1pPr>
+          </a:lstStyle>
+          <a:p>
+            <a:fld id="{FC1513FD-C785-4211-B2B0-BF864DB9E391}" type="slidenum">
+              <a:rPr lang="en-US" smtClean="0"/>
+              <a:t>‹#›</a:t>
+            </a:fld>
+            <a:endParaRPr lang="en-US"/>
+          </a:p>
+        </p:txBody>
+      </p:sp>
+    </p:spTree>
+    <p:extLst>
+      <p:ext uri="{BB962C8B-B14F-4D97-AF65-F5344CB8AC3E}">
+        <p14:creationId xmlns:p14="http://schemas.microsoft.com/office/powerpoint/2010/main" val="1416539697"/>
+      </p:ext>
+    </p:extLst>
+  </p:cSld>
+  <p:clrMap bg1="lt1" tx1="dk1" bg2="lt2" tx2="dk2" accent1="accent1" accent2="accent2" accent3="accent3" accent4="accent4" accent5="accent5" accent6="accent6" hlink="hlink" folHlink="folHlink"/>
+  <p:hf dt="0"/>
+  <p:notesStyle>
+    <a:lvl1pPr marL="0" algn="l" defTabSz="914400" rtl="0" eaLnBrk="1" latinLnBrk="0" hangingPunct="1">
+      <a:defRPr sz="1200" kern="1200">
+        <a:solidFill>
+          <a:schemeClr val="tx1"/>
+        </a:solidFill>
+        <a:latin typeface="+mn-lt"/>
+        <a:ea typeface="+mn-ea"/>
+        <a:cs typeface="+mn-cs"/>
+      </a:defRPr>
+    </a:lvl1pPr>
+    <a:lvl2pPr marL="457200" algn="l" defTabSz="914400" rtl="0" eaLnBrk="1" latinLnBrk="0" hangingPunct="1">
+      <a:defRPr sz="1200" kern="1200">
+        <a:solidFill>
+          <a:schemeClr val="tx1"/>
+        </a:solidFill>
+        <a:latin typeface="+mn-lt"/>
+        <a:ea typeface="+mn-ea"/>
+        <a:cs typeface="+mn-cs"/>
+      </a:defRPr>
+    </a:lvl2pPr>
+    <a:lvl3pPr marL="914400" algn="l" defTabSz="914400" rtl="0" eaLnBrk="1" latinLnBrk="0" hangingPunct="1">
+      <a:defRPr sz="1200" kern="1200">
+        <a:solidFill>
+          <a:schemeClr val="tx1"/>
+        </a:solidFill>
+        <a:latin typeface="+mn-lt"/>
+        <a:ea typeface="+mn-ea"/>
+        <a:cs typeface="+mn-cs"/>
+      </a:defRPr>
+    </a:lvl3pPr>
+    <a:lvl4pPr marL="1371600" algn="l" defTabSz="914400" rtl="0" eaLnBrk="1" latinLnBrk="0" hangingPunct="1">
+      <a:defRPr sz="1200" kern="1200">
+        <a:solidFill>
+          <a:schemeClr val="tx1"/>
+        </a:solidFill>
+        <a:latin typeface="+mn-lt"/>
+        <a:ea typeface="+mn-ea"/>
+        <a:cs typeface="+mn-cs"/>
+      </a:defRPr>
+    </a:lvl4pPr>
+    <a:lvl5pPr marL="1828800" algn="l" defTabSz="914400" rtl="0" eaLnBrk="1" latinLnBrk="0" hangingPunct="1">
+      <a:defRPr sz="1200" kern="1200">
+        <a:solidFill>
+          <a:schemeClr val="tx1"/>
+        </a:solidFill>
+        <a:latin typeface="+mn-lt"/>
+        <a:ea typeface="+mn-ea"/>
+        <a:cs typeface="+mn-cs"/>
+      </a:defRPr>
+    </a:lvl5pPr>
+    <a:lvl6pPr marL="2286000" algn="l" defTabSz="914400" rtl="0" eaLnBrk="1" latinLnBrk="0" hangingPunct="1">
+      <a:defRPr sz="1200" kern="1200">
+        <a:solidFill>
+          <a:schemeClr val="tx1"/>
+        </a:solidFill>
+        <a:latin typeface="+mn-lt"/>
+        <a:ea typeface="+mn-ea"/>
+        <a:cs typeface="+mn-cs"/>
+      </a:defRPr>
+    </a:lvl6pPr>
+    <a:lvl7pPr marL="2743200" algn="l" defTabSz="914400" rtl="0" eaLnBrk="1" latinLnBrk="0" hangingPunct="1">
+      <a:defRPr sz="1200" kern="1200">
+        <a:solidFill>
+          <a:schemeClr val="tx1"/>
+        </a:solidFill>
+        <a:latin typeface="+mn-lt"/>
+        <a:ea typeface="+mn-ea"/>
+        <a:cs typeface="+mn-cs"/>
+      </a:defRPr>
+    </a:lvl7pPr>
+    <a:lvl8pPr marL="3200400" algn="l" defTabSz="914400" rtl="0" eaLnBrk="1" latinLnBrk="0" hangingPunct="1">
+      <a:defRPr sz="1200" kern="1200">
+        <a:solidFill>
+          <a:schemeClr val="tx1"/>
+        </a:solidFill>
+        <a:latin typeface="+mn-lt"/>
+        <a:ea typeface="+mn-ea"/>
+        <a:cs typeface="+mn-cs"/>
+      </a:defRPr>
+    </a:lvl8pPr>
+    <a:lvl9pPr marL="3657600" algn="l" defTabSz="914400" rtl="0" eaLnBrk="1" latinLnBrk="0" hangingPunct="1">
+      <a:defRPr sz="1200" kern="1200">
+        <a:solidFill>
+          <a:schemeClr val="tx1"/>
+        </a:solidFill>
+        <a:latin typeface="+mn-lt"/>
+        <a:ea typeface="+mn-ea"/>
+        <a:cs typeface="+mn-cs"/>
+      </a:defRPr>
+    </a:lvl9pPr>
+  </p:notesStyle>
+</p:notesMaster>
+</file>
+
+<file path=ppt/notesSlides/notesSlide1.xml><?xml version="1.0" encoding="utf-8"?>
+<p:notes xmlns:a="http://schemas.openxmlformats.org/drawingml/2006/main" xmlns:r="http://schemas.openxmlformats.org/officeDocument/2006/relationships" xmlns:p="http://schemas.openxmlformats.org/presentationml/2006/main">
+  <p:cSld>
+    <p:spTree>
+      <p:nvGrpSpPr>
+        <p:cNvPr id="1" name=""/>
+        <p:cNvGrpSpPr/>
+        <p:nvPr/>
+      </p:nvGrpSpPr>
+      <p:grpSpPr>
+        <a:xfrm>
+          <a:off x="0" y="0"/>
+          <a:ext cx="0" cy="0"/>
+          <a:chOff x="0" y="0"/>
+          <a:chExt cx="0" cy="0"/>
+        </a:xfrm>
+      </p:grpSpPr>
+      <p:sp>
+        <p:nvSpPr>
+          <p:cNvPr id="2" name="Slide Image Placeholder 1"/>
+          <p:cNvSpPr>
+            <a:spLocks noGrp="1" noRot="1" noChangeAspect="1"/>
+          </p:cNvSpPr>
+          <p:nvPr>
+            <p:ph type="sldImg"/>
+          </p:nvPr>
+        </p:nvSpPr>
+        <p:spPr/>
+      </p:sp>
+      <p:sp>
+        <p:nvSpPr>
+          <p:cNvPr id="3" name="Notes Placeholder 2"/>
+          <p:cNvSpPr>
+            <a:spLocks noGrp="1"/>
+          </p:cNvSpPr>
+          <p:nvPr>
+            <p:ph type="body" idx="1"/>
+          </p:nvPr>
+        </p:nvSpPr>
+        <p:spPr/>
+        <p:txBody>
+          <a:bodyPr/>
+          <a:lstStyle/>
+          <a:p>
+            <a:endParaRPr lang="en-US"/>
+          </a:p>
+        </p:txBody>
+      </p:sp>
+      <p:sp>
+        <p:nvSpPr>
+          <p:cNvPr id="4" name="Header Placeholder 3"/>
+          <p:cNvSpPr>
+            <a:spLocks noGrp="1"/>
+          </p:cNvSpPr>
+          <p:nvPr>
+            <p:ph type="hdr" sz="quarter"/>
+          </p:nvPr>
+        </p:nvSpPr>
+        <p:spPr/>
+        <p:txBody>
+          <a:bodyPr/>
+          <a:lstStyle/>
+          <a:p>
+            <a:endParaRPr lang="en-US"/>
+          </a:p>
+        </p:txBody>
+      </p:sp>
+      <p:sp>
+        <p:nvSpPr>
+          <p:cNvPr id="5" name="Footer Placeholder 4"/>
+          <p:cNvSpPr>
+            <a:spLocks noGrp="1"/>
+          </p:cNvSpPr>
+          <p:nvPr>
+            <p:ph type="ftr" sz="quarter" idx="4"/>
+          </p:nvPr>
+        </p:nvSpPr>
+        <p:spPr/>
+        <p:txBody>
+          <a:bodyPr/>
+          <a:lstStyle/>
+          <a:p>
+            <a:endParaRPr lang="en-US"/>
+          </a:p>
+        </p:txBody>
+      </p:sp>
+      <p:sp>
+        <p:nvSpPr>
+          <p:cNvPr id="6" name="Slide Number Placeholder 5"/>
+          <p:cNvSpPr>
+            <a:spLocks noGrp="1"/>
+          </p:cNvSpPr>
+          <p:nvPr>
+            <p:ph type="sldNum" sz="quarter" idx="5"/>
+          </p:nvPr>
+        </p:nvSpPr>
+        <p:spPr/>
+        <p:txBody>
+          <a:bodyPr/>
+          <a:lstStyle/>
+          <a:p>
+            <a:fld id="{FC1513FD-C785-4211-B2B0-BF864DB9E391}" type="slidenum">
+              <a:rPr lang="en-US" smtClean="0"/>
+              <a:t>1</a:t>
+            </a:fld>
+            <a:endParaRPr lang="en-US"/>
+          </a:p>
+        </p:txBody>
+      </p:sp>
+    </p:spTree>
+    <p:extLst>
+      <p:ext uri="{BB962C8B-B14F-4D97-AF65-F5344CB8AC3E}">
+        <p14:creationId xmlns:p14="http://schemas.microsoft.com/office/powerpoint/2010/main" val="1624944633"/>
+      </p:ext>
+    </p:extLst>
+  </p:cSld>
+  <p:clrMapOvr>
+    <a:masterClrMapping/>
+  </p:clrMapOvr>
+</p:notes>
+</file>
+
+<file path=ppt/notesSlides/notesSlide2.xml><?xml version="1.0" encoding="utf-8"?>
+<p:notes xmlns:a="http://schemas.openxmlformats.org/drawingml/2006/main" xmlns:r="http://schemas.openxmlformats.org/officeDocument/2006/relationships" xmlns:p="http://schemas.openxmlformats.org/presentationml/2006/main">
+  <p:cSld>
+    <p:spTree>
+      <p:nvGrpSpPr>
+        <p:cNvPr id="1" name=""/>
+        <p:cNvGrpSpPr/>
+        <p:nvPr/>
+      </p:nvGrpSpPr>
+      <p:grpSpPr>
+        <a:xfrm>
+          <a:off x="0" y="0"/>
+          <a:ext cx="0" cy="0"/>
+          <a:chOff x="0" y="0"/>
+          <a:chExt cx="0" cy="0"/>
+        </a:xfrm>
+      </p:grpSpPr>
+      <p:sp>
+        <p:nvSpPr>
+          <p:cNvPr id="2" name="Slide Image Placeholder 1"/>
+          <p:cNvSpPr>
+            <a:spLocks noGrp="1" noRot="1" noChangeAspect="1"/>
+          </p:cNvSpPr>
+          <p:nvPr>
+            <p:ph type="sldImg"/>
+          </p:nvPr>
+        </p:nvSpPr>
+        <p:spPr/>
+      </p:sp>
+      <p:sp>
+        <p:nvSpPr>
+          <p:cNvPr id="3" name="Notes Placeholder 2"/>
+          <p:cNvSpPr>
+            <a:spLocks noGrp="1"/>
+          </p:cNvSpPr>
+          <p:nvPr>
+            <p:ph type="body" idx="1"/>
+          </p:nvPr>
+        </p:nvSpPr>
+        <p:spPr/>
+        <p:txBody>
+          <a:bodyPr/>
+          <a:lstStyle/>
+          <a:p>
+            <a:endParaRPr lang="en-US"/>
+          </a:p>
+        </p:txBody>
+      </p:sp>
+      <p:sp>
+        <p:nvSpPr>
+          <p:cNvPr id="4" name="Header Placeholder 3"/>
+          <p:cNvSpPr>
+            <a:spLocks noGrp="1"/>
+          </p:cNvSpPr>
+          <p:nvPr>
+            <p:ph type="hdr" sz="quarter"/>
+          </p:nvPr>
+        </p:nvSpPr>
+        <p:spPr/>
+        <p:txBody>
+          <a:bodyPr/>
+          <a:lstStyle/>
+          <a:p>
+            <a:endParaRPr lang="en-US"/>
+          </a:p>
+        </p:txBody>
+      </p:sp>
+      <p:sp>
+        <p:nvSpPr>
+          <p:cNvPr id="5" name="Footer Placeholder 4"/>
+          <p:cNvSpPr>
+            <a:spLocks noGrp="1"/>
+          </p:cNvSpPr>
+          <p:nvPr>
+            <p:ph type="ftr" sz="quarter" idx="4"/>
+          </p:nvPr>
+        </p:nvSpPr>
+        <p:spPr/>
+        <p:txBody>
+          <a:bodyPr/>
+          <a:lstStyle/>
+          <a:p>
+            <a:endParaRPr lang="en-US"/>
+          </a:p>
+        </p:txBody>
+      </p:sp>
+      <p:sp>
+        <p:nvSpPr>
+          <p:cNvPr id="6" name="Slide Number Placeholder 5"/>
+          <p:cNvSpPr>
+            <a:spLocks noGrp="1"/>
+          </p:cNvSpPr>
+          <p:nvPr>
+            <p:ph type="sldNum" sz="quarter" idx="5"/>
+          </p:nvPr>
+        </p:nvSpPr>
+        <p:spPr/>
+        <p:txBody>
+          <a:bodyPr/>
+          <a:lstStyle/>
+          <a:p>
+            <a:fld id="{FC1513FD-C785-4211-B2B0-BF864DB9E391}" type="slidenum">
+              <a:rPr lang="en-US" smtClean="0"/>
+              <a:t>2</a:t>
+            </a:fld>
+            <a:endParaRPr lang="en-US"/>
+          </a:p>
+        </p:txBody>
+      </p:sp>
+    </p:spTree>
+    <p:extLst>
+      <p:ext uri="{BB962C8B-B14F-4D97-AF65-F5344CB8AC3E}">
+        <p14:creationId xmlns:p14="http://schemas.microsoft.com/office/powerpoint/2010/main" val="713017731"/>
+      </p:ext>
+    </p:extLst>
+  </p:cSld>
+  <p:clrMapOvr>
+    <a:masterClrMapping/>
+  </p:clrMapOvr>
+</p:notes>
+</file>
+
+<file path=ppt/notesSlides/notesSlide3.xml><?xml version="1.0" encoding="utf-8"?>
+<p:notes xmlns:a="http://schemas.openxmlformats.org/drawingml/2006/main" xmlns:r="http://schemas.openxmlformats.org/officeDocument/2006/relationships" xmlns:p="http://schemas.openxmlformats.org/presentationml/2006/main">
+  <p:cSld>
+    <p:spTree>
+      <p:nvGrpSpPr>
+        <p:cNvPr id="1" name=""/>
+        <p:cNvGrpSpPr/>
+        <p:nvPr/>
+      </p:nvGrpSpPr>
+      <p:grpSpPr>
+        <a:xfrm>
+          <a:off x="0" y="0"/>
+          <a:ext cx="0" cy="0"/>
+          <a:chOff x="0" y="0"/>
+          <a:chExt cx="0" cy="0"/>
+        </a:xfrm>
+      </p:grpSpPr>
+      <p:sp>
+        <p:nvSpPr>
+          <p:cNvPr id="2" name="Slide Image Placeholder 1"/>
+          <p:cNvSpPr>
+            <a:spLocks noGrp="1" noRot="1" noChangeAspect="1"/>
+          </p:cNvSpPr>
+          <p:nvPr>
+            <p:ph type="sldImg"/>
+          </p:nvPr>
+        </p:nvSpPr>
+        <p:spPr/>
+      </p:sp>
+      <p:sp>
+        <p:nvSpPr>
+          <p:cNvPr id="3" name="Notes Placeholder 2"/>
+          <p:cNvSpPr>
+            <a:spLocks noGrp="1"/>
+          </p:cNvSpPr>
+          <p:nvPr>
+            <p:ph type="body" idx="1"/>
+          </p:nvPr>
+        </p:nvSpPr>
+        <p:spPr/>
+        <p:txBody>
+          <a:bodyPr/>
+          <a:lstStyle/>
+          <a:p>
+            <a:endParaRPr lang="en-US"/>
+          </a:p>
+        </p:txBody>
+      </p:sp>
+      <p:sp>
+        <p:nvSpPr>
+          <p:cNvPr id="4" name="Header Placeholder 3"/>
+          <p:cNvSpPr>
+            <a:spLocks noGrp="1"/>
+          </p:cNvSpPr>
+          <p:nvPr>
+            <p:ph type="hdr" sz="quarter"/>
+          </p:nvPr>
+        </p:nvSpPr>
+        <p:spPr/>
+        <p:txBody>
+          <a:bodyPr/>
+          <a:lstStyle/>
+          <a:p>
+            <a:endParaRPr lang="en-US"/>
+          </a:p>
+        </p:txBody>
+      </p:sp>
+      <p:sp>
+        <p:nvSpPr>
+          <p:cNvPr id="5" name="Footer Placeholder 4"/>
+          <p:cNvSpPr>
+            <a:spLocks noGrp="1"/>
+          </p:cNvSpPr>
+          <p:nvPr>
+            <p:ph type="ftr" sz="quarter" idx="4"/>
+          </p:nvPr>
+        </p:nvSpPr>
+        <p:spPr/>
+        <p:txBody>
+          <a:bodyPr/>
+          <a:lstStyle/>
+          <a:p>
+            <a:endParaRPr lang="en-US"/>
+          </a:p>
+        </p:txBody>
+      </p:sp>
+      <p:sp>
+        <p:nvSpPr>
+          <p:cNvPr id="6" name="Slide Number Placeholder 5"/>
+          <p:cNvSpPr>
+            <a:spLocks noGrp="1"/>
+          </p:cNvSpPr>
+          <p:nvPr>
+            <p:ph type="sldNum" sz="quarter" idx="5"/>
+          </p:nvPr>
+        </p:nvSpPr>
+        <p:spPr/>
+        <p:txBody>
+          <a:bodyPr/>
+          <a:lstStyle/>
+          <a:p>
+            <a:fld id="{FC1513FD-C785-4211-B2B0-BF864DB9E391}" type="slidenum">
+              <a:rPr lang="en-US" smtClean="0"/>
+              <a:t>3</a:t>
+            </a:fld>
+            <a:endParaRPr lang="en-US"/>
+          </a:p>
+        </p:txBody>
+      </p:sp>
+    </p:spTree>
+    <p:extLst>
+      <p:ext uri="{BB962C8B-B14F-4D97-AF65-F5344CB8AC3E}">
+        <p14:creationId xmlns:p14="http://schemas.microsoft.com/office/powerpoint/2010/main" val="1147223370"/>
+      </p:ext>
+    </p:extLst>
+  </p:cSld>
+  <p:clrMapOvr>
+    <a:masterClrMapping/>
+  </p:clrMapOvr>
+</p:notes>
+</file>
+
+<file path=ppt/notesSlides/notesSlide4.xml><?xml version="1.0" encoding="utf-8"?>
+<p:notes xmlns:a="http://schemas.openxmlformats.org/drawingml/2006/main" xmlns:r="http://schemas.openxmlformats.org/officeDocument/2006/relationships" xmlns:p="http://schemas.openxmlformats.org/presentationml/2006/main">
+  <p:cSld>
+    <p:spTree>
+      <p:nvGrpSpPr>
+        <p:cNvPr id="1" name=""/>
+        <p:cNvGrpSpPr/>
+        <p:nvPr/>
+      </p:nvGrpSpPr>
+      <p:grpSpPr>
+        <a:xfrm>
+          <a:off x="0" y="0"/>
+          <a:ext cx="0" cy="0"/>
+          <a:chOff x="0" y="0"/>
+          <a:chExt cx="0" cy="0"/>
+        </a:xfrm>
+      </p:grpSpPr>
+      <p:sp>
+        <p:nvSpPr>
+          <p:cNvPr id="2" name="Slide Image Placeholder 1"/>
+          <p:cNvSpPr>
+            <a:spLocks noGrp="1" noRot="1" noChangeAspect="1"/>
+          </p:cNvSpPr>
+          <p:nvPr>
+            <p:ph type="sldImg"/>
+          </p:nvPr>
+        </p:nvSpPr>
+        <p:spPr/>
+      </p:sp>
+      <p:sp>
+        <p:nvSpPr>
+          <p:cNvPr id="3" name="Notes Placeholder 2"/>
+          <p:cNvSpPr>
+            <a:spLocks noGrp="1"/>
+          </p:cNvSpPr>
+          <p:nvPr>
+            <p:ph type="body" idx="1"/>
+          </p:nvPr>
+        </p:nvSpPr>
+        <p:spPr/>
+        <p:txBody>
+          <a:bodyPr/>
+          <a:lstStyle/>
+          <a:p>
+            <a:endParaRPr lang="en-US"/>
+          </a:p>
+        </p:txBody>
+      </p:sp>
+      <p:sp>
+        <p:nvSpPr>
+          <p:cNvPr id="4" name="Header Placeholder 3"/>
+          <p:cNvSpPr>
+            <a:spLocks noGrp="1"/>
+          </p:cNvSpPr>
+          <p:nvPr>
+            <p:ph type="hdr" sz="quarter"/>
+          </p:nvPr>
+        </p:nvSpPr>
+        <p:spPr/>
+        <p:txBody>
+          <a:bodyPr/>
+          <a:lstStyle/>
+          <a:p>
+            <a:endParaRPr lang="en-US"/>
+          </a:p>
+        </p:txBody>
+      </p:sp>
+      <p:sp>
+        <p:nvSpPr>
+          <p:cNvPr id="5" name="Footer Placeholder 4"/>
+          <p:cNvSpPr>
+            <a:spLocks noGrp="1"/>
+          </p:cNvSpPr>
+          <p:nvPr>
+            <p:ph type="ftr" sz="quarter" idx="4"/>
+          </p:nvPr>
+        </p:nvSpPr>
+        <p:spPr/>
+        <p:txBody>
+          <a:bodyPr/>
+          <a:lstStyle/>
+          <a:p>
+            <a:endParaRPr lang="en-US"/>
+          </a:p>
+        </p:txBody>
+      </p:sp>
+      <p:sp>
+        <p:nvSpPr>
+          <p:cNvPr id="6" name="Slide Number Placeholder 5"/>
+          <p:cNvSpPr>
+            <a:spLocks noGrp="1"/>
+          </p:cNvSpPr>
+          <p:nvPr>
+            <p:ph type="sldNum" sz="quarter" idx="5"/>
+          </p:nvPr>
+        </p:nvSpPr>
+        <p:spPr/>
+        <p:txBody>
+          <a:bodyPr/>
+          <a:lstStyle/>
+          <a:p>
+            <a:fld id="{FC1513FD-C785-4211-B2B0-BF864DB9E391}" type="slidenum">
+              <a:rPr lang="en-US" smtClean="0"/>
+              <a:t>4</a:t>
+            </a:fld>
+            <a:endParaRPr lang="en-US"/>
+          </a:p>
+        </p:txBody>
+      </p:sp>
+    </p:spTree>
+    <p:extLst>
+      <p:ext uri="{BB962C8B-B14F-4D97-AF65-F5344CB8AC3E}">
+        <p14:creationId xmlns:p14="http://schemas.microsoft.com/office/powerpoint/2010/main" val="877862846"/>
+      </p:ext>
+    </p:extLst>
+  </p:cSld>
+  <p:clrMapOvr>
+    <a:masterClrMapping/>
+  </p:clrMapOvr>
+</p:notes>
+</file>
+
+<file path=ppt/notesSlides/notesSlide5.xml><?xml version="1.0" encoding="utf-8"?>
+<p:notes xmlns:a="http://schemas.openxmlformats.org/drawingml/2006/main" xmlns:r="http://schemas.openxmlformats.org/officeDocument/2006/relationships" xmlns:p="http://schemas.openxmlformats.org/presentationml/2006/main">
+  <p:cSld>
+    <p:spTree>
+      <p:nvGrpSpPr>
+        <p:cNvPr id="1" name=""/>
+        <p:cNvGrpSpPr/>
+        <p:nvPr/>
+      </p:nvGrpSpPr>
+      <p:grpSpPr>
+        <a:xfrm>
+          <a:off x="0" y="0"/>
+          <a:ext cx="0" cy="0"/>
+          <a:chOff x="0" y="0"/>
+          <a:chExt cx="0" cy="0"/>
+        </a:xfrm>
+      </p:grpSpPr>
+      <p:sp>
+        <p:nvSpPr>
+          <p:cNvPr id="2" name="Slide Image Placeholder 1"/>
+          <p:cNvSpPr>
+            <a:spLocks noGrp="1" noRot="1" noChangeAspect="1"/>
+          </p:cNvSpPr>
+          <p:nvPr>
+            <p:ph type="sldImg"/>
+          </p:nvPr>
+        </p:nvSpPr>
+        <p:spPr/>
+      </p:sp>
+      <p:sp>
+        <p:nvSpPr>
+          <p:cNvPr id="3" name="Notes Placeholder 2"/>
+          <p:cNvSpPr>
+            <a:spLocks noGrp="1"/>
+          </p:cNvSpPr>
+          <p:nvPr>
+            <p:ph type="body" idx="1"/>
+          </p:nvPr>
+        </p:nvSpPr>
+        <p:spPr/>
+        <p:txBody>
+          <a:bodyPr/>
+          <a:lstStyle/>
+          <a:p>
+            <a:endParaRPr lang="en-US"/>
+          </a:p>
+        </p:txBody>
+      </p:sp>
+      <p:sp>
+        <p:nvSpPr>
+          <p:cNvPr id="4" name="Header Placeholder 3"/>
+          <p:cNvSpPr>
+            <a:spLocks noGrp="1"/>
+          </p:cNvSpPr>
+          <p:nvPr>
+            <p:ph type="hdr" sz="quarter"/>
+          </p:nvPr>
+        </p:nvSpPr>
+        <p:spPr/>
+        <p:txBody>
+          <a:bodyPr/>
+          <a:lstStyle/>
+          <a:p>
+            <a:endParaRPr lang="en-US"/>
+          </a:p>
+        </p:txBody>
+      </p:sp>
+      <p:sp>
+        <p:nvSpPr>
+          <p:cNvPr id="5" name="Footer Placeholder 4"/>
+          <p:cNvSpPr>
+            <a:spLocks noGrp="1"/>
+          </p:cNvSpPr>
+          <p:nvPr>
+            <p:ph type="ftr" sz="quarter" idx="4"/>
+          </p:nvPr>
+        </p:nvSpPr>
+        <p:spPr/>
+        <p:txBody>
+          <a:bodyPr/>
+          <a:lstStyle/>
+          <a:p>
+            <a:endParaRPr lang="en-US"/>
+          </a:p>
+        </p:txBody>
+      </p:sp>
+      <p:sp>
+        <p:nvSpPr>
+          <p:cNvPr id="6" name="Slide Number Placeholder 5"/>
+          <p:cNvSpPr>
+            <a:spLocks noGrp="1"/>
+          </p:cNvSpPr>
+          <p:nvPr>
+            <p:ph type="sldNum" sz="quarter" idx="5"/>
+          </p:nvPr>
+        </p:nvSpPr>
+        <p:spPr/>
+        <p:txBody>
+          <a:bodyPr/>
+          <a:lstStyle/>
+          <a:p>
+            <a:fld id="{FC1513FD-C785-4211-B2B0-BF864DB9E391}" type="slidenum">
+              <a:rPr lang="en-US" smtClean="0"/>
+              <a:t>5</a:t>
+            </a:fld>
+            <a:endParaRPr lang="en-US"/>
+          </a:p>
+        </p:txBody>
+      </p:sp>
+    </p:spTree>
+    <p:extLst>
+      <p:ext uri="{BB962C8B-B14F-4D97-AF65-F5344CB8AC3E}">
+        <p14:creationId xmlns:p14="http://schemas.microsoft.com/office/powerpoint/2010/main" val="418226113"/>
+      </p:ext>
+    </p:extLst>
+  </p:cSld>
+  <p:clrMapOvr>
+    <a:masterClrMapping/>
+  </p:clrMapOvr>
+</p:notes>
+</file>
+
+<file path=ppt/notesSlides/notesSlide6.xml><?xml version="1.0" encoding="utf-8"?>
+<p:notes xmlns:a="http://schemas.openxmlformats.org/drawingml/2006/main" xmlns:r="http://schemas.openxmlformats.org/officeDocument/2006/relationships" xmlns:p="http://schemas.openxmlformats.org/presentationml/2006/main">
+  <p:cSld>
+    <p:spTree>
+      <p:nvGrpSpPr>
+        <p:cNvPr id="1" name=""/>
+        <p:cNvGrpSpPr/>
+        <p:nvPr/>
+      </p:nvGrpSpPr>
+      <p:grpSpPr>
+        <a:xfrm>
+          <a:off x="0" y="0"/>
+          <a:ext cx="0" cy="0"/>
+          <a:chOff x="0" y="0"/>
+          <a:chExt cx="0" cy="0"/>
+        </a:xfrm>
+      </p:grpSpPr>
+      <p:sp>
+        <p:nvSpPr>
+          <p:cNvPr id="2" name="Slide Image Placeholder 1"/>
+          <p:cNvSpPr>
+            <a:spLocks noGrp="1" noRot="1" noChangeAspect="1"/>
+          </p:cNvSpPr>
+          <p:nvPr>
+            <p:ph type="sldImg"/>
+          </p:nvPr>
+        </p:nvSpPr>
+        <p:spPr/>
+      </p:sp>
+      <p:sp>
+        <p:nvSpPr>
+          <p:cNvPr id="3" name="Notes Placeholder 2"/>
+          <p:cNvSpPr>
+            <a:spLocks noGrp="1"/>
+          </p:cNvSpPr>
+          <p:nvPr>
+            <p:ph type="body" idx="1"/>
+          </p:nvPr>
+        </p:nvSpPr>
+        <p:spPr/>
+        <p:txBody>
+          <a:bodyPr/>
+          <a:lstStyle/>
+          <a:p>
+            <a:endParaRPr lang="en-US"/>
+          </a:p>
+        </p:txBody>
+      </p:sp>
+      <p:sp>
+        <p:nvSpPr>
+          <p:cNvPr id="4" name="Header Placeholder 3"/>
+          <p:cNvSpPr>
+            <a:spLocks noGrp="1"/>
+          </p:cNvSpPr>
+          <p:nvPr>
+            <p:ph type="hdr" sz="quarter"/>
+          </p:nvPr>
+        </p:nvSpPr>
+        <p:spPr/>
+        <p:txBody>
+          <a:bodyPr/>
+          <a:lstStyle/>
+          <a:p>
+            <a:endParaRPr lang="en-US"/>
+          </a:p>
+        </p:txBody>
+      </p:sp>
+      <p:sp>
+        <p:nvSpPr>
+          <p:cNvPr id="5" name="Footer Placeholder 4"/>
+          <p:cNvSpPr>
+            <a:spLocks noGrp="1"/>
+          </p:cNvSpPr>
+          <p:nvPr>
+            <p:ph type="ftr" sz="quarter" idx="4"/>
+          </p:nvPr>
+        </p:nvSpPr>
+        <p:spPr/>
+        <p:txBody>
+          <a:bodyPr/>
+          <a:lstStyle/>
+          <a:p>
+            <a:endParaRPr lang="en-US"/>
+          </a:p>
+        </p:txBody>
+      </p:sp>
+      <p:sp>
+        <p:nvSpPr>
+          <p:cNvPr id="6" name="Slide Number Placeholder 5"/>
+          <p:cNvSpPr>
+            <a:spLocks noGrp="1"/>
+          </p:cNvSpPr>
+          <p:nvPr>
+            <p:ph type="sldNum" sz="quarter" idx="5"/>
+          </p:nvPr>
+        </p:nvSpPr>
+        <p:spPr/>
+        <p:txBody>
+          <a:bodyPr/>
+          <a:lstStyle/>
+          <a:p>
+            <a:fld id="{FC1513FD-C785-4211-B2B0-BF864DB9E391}" type="slidenum">
+              <a:rPr lang="en-US" smtClean="0"/>
+              <a:t>6</a:t>
+            </a:fld>
+            <a:endParaRPr lang="en-US"/>
+          </a:p>
+        </p:txBody>
+      </p:sp>
+    </p:spTree>
+    <p:extLst>
+      <p:ext uri="{BB962C8B-B14F-4D97-AF65-F5344CB8AC3E}">
+        <p14:creationId xmlns:p14="http://schemas.microsoft.com/office/powerpoint/2010/main" val="2883995183"/>
+      </p:ext>
+    </p:extLst>
+  </p:cSld>
+  <p:clrMapOvr>
+    <a:masterClrMapping/>
+  </p:clrMapOvr>
+</p:notes>
+</file>
+
+<file path=ppt/notesSlides/notesSlide7.xml><?xml version="1.0" encoding="utf-8"?>
+<p:notes xmlns:a="http://schemas.openxmlformats.org/drawingml/2006/main" xmlns:r="http://schemas.openxmlformats.org/officeDocument/2006/relationships" xmlns:p="http://schemas.openxmlformats.org/presentationml/2006/main">
+  <p:cSld>
+    <p:spTree>
+      <p:nvGrpSpPr>
+        <p:cNvPr id="1" name=""/>
+        <p:cNvGrpSpPr/>
+        <p:nvPr/>
+      </p:nvGrpSpPr>
+      <p:grpSpPr>
+        <a:xfrm>
+          <a:off x="0" y="0"/>
+          <a:ext cx="0" cy="0"/>
+          <a:chOff x="0" y="0"/>
+          <a:chExt cx="0" cy="0"/>
+        </a:xfrm>
+      </p:grpSpPr>
+      <p:sp>
+        <p:nvSpPr>
+          <p:cNvPr id="2" name="Slide Image Placeholder 1"/>
+          <p:cNvSpPr>
+            <a:spLocks noGrp="1" noRot="1" noChangeAspect="1"/>
+          </p:cNvSpPr>
+          <p:nvPr>
+            <p:ph type="sldImg"/>
+          </p:nvPr>
+        </p:nvSpPr>
+        <p:spPr/>
+      </p:sp>
+      <p:sp>
+        <p:nvSpPr>
+          <p:cNvPr id="3" name="Notes Placeholder 2"/>
+          <p:cNvSpPr>
+            <a:spLocks noGrp="1"/>
+          </p:cNvSpPr>
+          <p:nvPr>
+            <p:ph type="body" idx="1"/>
+          </p:nvPr>
+        </p:nvSpPr>
+        <p:spPr/>
+        <p:txBody>
+          <a:bodyPr/>
+          <a:lstStyle/>
+          <a:p>
+            <a:endParaRPr lang="en-US"/>
+          </a:p>
+        </p:txBody>
+      </p:sp>
+      <p:sp>
+        <p:nvSpPr>
+          <p:cNvPr id="4" name="Header Placeholder 3"/>
+          <p:cNvSpPr>
+            <a:spLocks noGrp="1"/>
+          </p:cNvSpPr>
+          <p:nvPr>
+            <p:ph type="hdr" sz="quarter"/>
+          </p:nvPr>
+        </p:nvSpPr>
+        <p:spPr/>
+        <p:txBody>
+          <a:bodyPr/>
+          <a:lstStyle/>
+          <a:p>
+            <a:endParaRPr lang="en-US"/>
+          </a:p>
+        </p:txBody>
+      </p:sp>
+      <p:sp>
+        <p:nvSpPr>
+          <p:cNvPr id="5" name="Footer Placeholder 4"/>
+          <p:cNvSpPr>
+            <a:spLocks noGrp="1"/>
+          </p:cNvSpPr>
+          <p:nvPr>
+            <p:ph type="ftr" sz="quarter" idx="4"/>
+          </p:nvPr>
+        </p:nvSpPr>
+        <p:spPr/>
+        <p:txBody>
+          <a:bodyPr/>
+          <a:lstStyle/>
+          <a:p>
+            <a:endParaRPr lang="en-US"/>
+          </a:p>
+        </p:txBody>
+      </p:sp>
+      <p:sp>
+        <p:nvSpPr>
+          <p:cNvPr id="6" name="Slide Number Placeholder 5"/>
+          <p:cNvSpPr>
+            <a:spLocks noGrp="1"/>
+          </p:cNvSpPr>
+          <p:nvPr>
+            <p:ph type="sldNum" sz="quarter" idx="5"/>
+          </p:nvPr>
+        </p:nvSpPr>
+        <p:spPr/>
+        <p:txBody>
+          <a:bodyPr/>
+          <a:lstStyle/>
+          <a:p>
+            <a:fld id="{FC1513FD-C785-4211-B2B0-BF864DB9E391}" type="slidenum">
+              <a:rPr lang="en-US" smtClean="0"/>
+              <a:t>7</a:t>
+            </a:fld>
+            <a:endParaRPr lang="en-US"/>
+          </a:p>
+        </p:txBody>
+      </p:sp>
+    </p:spTree>
+    <p:extLst>
+      <p:ext uri="{BB962C8B-B14F-4D97-AF65-F5344CB8AC3E}">
+        <p14:creationId xmlns:p14="http://schemas.microsoft.com/office/powerpoint/2010/main" val="4199135739"/>
+      </p:ext>
+    </p:extLst>
+  </p:cSld>
+  <p:clrMapOvr>
+    <a:masterClrMapping/>
+  </p:clrMapOvr>
+</p:notes>
+</file>
+
+<file path=ppt/notesSlides/notesSlide8.xml><?xml version="1.0" encoding="utf-8"?>
+<p:notes xmlns:a="http://schemas.openxmlformats.org/drawingml/2006/main" xmlns:r="http://schemas.openxmlformats.org/officeDocument/2006/relationships" xmlns:p="http://schemas.openxmlformats.org/presentationml/2006/main">
+  <p:cSld>
+    <p:spTree>
+      <p:nvGrpSpPr>
+        <p:cNvPr id="1" name=""/>
+        <p:cNvGrpSpPr/>
+        <p:nvPr/>
+      </p:nvGrpSpPr>
+      <p:grpSpPr>
+        <a:xfrm>
+          <a:off x="0" y="0"/>
+          <a:ext cx="0" cy="0"/>
+          <a:chOff x="0" y="0"/>
+          <a:chExt cx="0" cy="0"/>
+        </a:xfrm>
+      </p:grpSpPr>
+      <p:sp>
+        <p:nvSpPr>
+          <p:cNvPr id="2" name="Slide Image Placeholder 1"/>
+          <p:cNvSpPr>
+            <a:spLocks noGrp="1" noRot="1" noChangeAspect="1"/>
+          </p:cNvSpPr>
+          <p:nvPr>
+            <p:ph type="sldImg"/>
+          </p:nvPr>
+        </p:nvSpPr>
+        <p:spPr/>
+      </p:sp>
+      <p:sp>
+        <p:nvSpPr>
+          <p:cNvPr id="3" name="Notes Placeholder 2"/>
+          <p:cNvSpPr>
+            <a:spLocks noGrp="1"/>
+          </p:cNvSpPr>
+          <p:nvPr>
+            <p:ph type="body" idx="1"/>
+          </p:nvPr>
+        </p:nvSpPr>
+        <p:spPr/>
+        <p:txBody>
+          <a:bodyPr/>
+          <a:lstStyle/>
+          <a:p>
+            <a:endParaRPr lang="en-US"/>
+          </a:p>
+        </p:txBody>
+      </p:sp>
+      <p:sp>
+        <p:nvSpPr>
+          <p:cNvPr id="4" name="Header Placeholder 3"/>
+          <p:cNvSpPr>
+            <a:spLocks noGrp="1"/>
+          </p:cNvSpPr>
+          <p:nvPr>
+            <p:ph type="hdr" sz="quarter"/>
+          </p:nvPr>
+        </p:nvSpPr>
+        <p:spPr/>
+        <p:txBody>
+          <a:bodyPr/>
+          <a:lstStyle/>
+          <a:p>
+            <a:endParaRPr lang="en-US"/>
+          </a:p>
+        </p:txBody>
+      </p:sp>
+      <p:sp>
+        <p:nvSpPr>
+          <p:cNvPr id="5" name="Footer Placeholder 4"/>
+          <p:cNvSpPr>
+            <a:spLocks noGrp="1"/>
+          </p:cNvSpPr>
+          <p:nvPr>
+            <p:ph type="ftr" sz="quarter" idx="4"/>
+          </p:nvPr>
+        </p:nvSpPr>
+        <p:spPr/>
+        <p:txBody>
+          <a:bodyPr/>
+          <a:lstStyle/>
+          <a:p>
+            <a:endParaRPr lang="en-US"/>
+          </a:p>
+        </p:txBody>
+      </p:sp>
+      <p:sp>
+        <p:nvSpPr>
+          <p:cNvPr id="6" name="Slide Number Placeholder 5"/>
+          <p:cNvSpPr>
+            <a:spLocks noGrp="1"/>
+          </p:cNvSpPr>
+          <p:nvPr>
+            <p:ph type="sldNum" sz="quarter" idx="5"/>
+          </p:nvPr>
+        </p:nvSpPr>
+        <p:spPr/>
+        <p:txBody>
+          <a:bodyPr/>
+          <a:lstStyle/>
+          <a:p>
+            <a:fld id="{FC1513FD-C785-4211-B2B0-BF864DB9E391}" type="slidenum">
+              <a:rPr lang="en-US" smtClean="0"/>
+              <a:t>8</a:t>
+            </a:fld>
+            <a:endParaRPr lang="en-US"/>
+          </a:p>
+        </p:txBody>
+      </p:sp>
+    </p:spTree>
+    <p:extLst>
+      <p:ext uri="{BB962C8B-B14F-4D97-AF65-F5344CB8AC3E}">
+        <p14:creationId xmlns:p14="http://schemas.microsoft.com/office/powerpoint/2010/main" val="2360331614"/>
+      </p:ext>
+    </p:extLst>
+  </p:cSld>
+  <p:clrMapOvr>
+    <a:masterClrMapping/>
+  </p:clrMapOvr>
+</p:notes>
 </file>
 
 <file path=ppt/slideLayouts/slideLayout1.xml><?xml version="1.0" encoding="utf-8"?>
@@ -270,7 +1787,7 @@
           <a:p>
             <a:fld id="{A42A12F9-EA54-49E1-A3FD-186D9B25B348}" type="datetimeFigureOut">
               <a:rPr lang="pl-PL" smtClean="0"/>
-              <a:t>12.08.2019</a:t>
+              <a:t>14.08.2019</a:t>
             </a:fld>
             <a:endParaRPr lang="pl-PL"/>
           </a:p>
@@ -468,7 +1985,7 @@
           <a:p>
             <a:fld id="{A42A12F9-EA54-49E1-A3FD-186D9B25B348}" type="datetimeFigureOut">
               <a:rPr lang="pl-PL" smtClean="0"/>
-              <a:t>12.08.2019</a:t>
+              <a:t>14.08.2019</a:t>
             </a:fld>
             <a:endParaRPr lang="pl-PL"/>
           </a:p>
@@ -676,7 +2193,7 @@
           <a:p>
             <a:fld id="{A42A12F9-EA54-49E1-A3FD-186D9B25B348}" type="datetimeFigureOut">
               <a:rPr lang="pl-PL" smtClean="0"/>
-              <a:t>12.08.2019</a:t>
+              <a:t>14.08.2019</a:t>
             </a:fld>
             <a:endParaRPr lang="pl-PL"/>
           </a:p>
@@ -874,7 +2391,7 @@
           <a:p>
             <a:fld id="{A42A12F9-EA54-49E1-A3FD-186D9B25B348}" type="datetimeFigureOut">
               <a:rPr lang="pl-PL" smtClean="0"/>
-              <a:t>12.08.2019</a:t>
+              <a:t>14.08.2019</a:t>
             </a:fld>
             <a:endParaRPr lang="pl-PL"/>
           </a:p>
@@ -1149,7 +2666,7 @@
           <a:p>
             <a:fld id="{A42A12F9-EA54-49E1-A3FD-186D9B25B348}" type="datetimeFigureOut">
               <a:rPr lang="pl-PL" smtClean="0"/>
-              <a:t>12.08.2019</a:t>
+              <a:t>14.08.2019</a:t>
             </a:fld>
             <a:endParaRPr lang="pl-PL"/>
           </a:p>
@@ -1414,7 +2931,7 @@
           <a:p>
             <a:fld id="{A42A12F9-EA54-49E1-A3FD-186D9B25B348}" type="datetimeFigureOut">
               <a:rPr lang="pl-PL" smtClean="0"/>
-              <a:t>12.08.2019</a:t>
+              <a:t>14.08.2019</a:t>
             </a:fld>
             <a:endParaRPr lang="pl-PL"/>
           </a:p>
@@ -1826,7 +3343,7 @@
           <a:p>
             <a:fld id="{A42A12F9-EA54-49E1-A3FD-186D9B25B348}" type="datetimeFigureOut">
               <a:rPr lang="pl-PL" smtClean="0"/>
-              <a:t>12.08.2019</a:t>
+              <a:t>14.08.2019</a:t>
             </a:fld>
             <a:endParaRPr lang="pl-PL"/>
           </a:p>
@@ -1967,7 +3484,7 @@
           <a:p>
             <a:fld id="{A42A12F9-EA54-49E1-A3FD-186D9B25B348}" type="datetimeFigureOut">
               <a:rPr lang="pl-PL" smtClean="0"/>
-              <a:t>12.08.2019</a:t>
+              <a:t>14.08.2019</a:t>
             </a:fld>
             <a:endParaRPr lang="pl-PL"/>
           </a:p>
@@ -2080,7 +3597,7 @@
           <a:p>
             <a:fld id="{A42A12F9-EA54-49E1-A3FD-186D9B25B348}" type="datetimeFigureOut">
               <a:rPr lang="pl-PL" smtClean="0"/>
-              <a:t>12.08.2019</a:t>
+              <a:t>14.08.2019</a:t>
             </a:fld>
             <a:endParaRPr lang="pl-PL"/>
           </a:p>
@@ -2391,7 +3908,7 @@
           <a:p>
             <a:fld id="{A42A12F9-EA54-49E1-A3FD-186D9B25B348}" type="datetimeFigureOut">
               <a:rPr lang="pl-PL" smtClean="0"/>
-              <a:t>12.08.2019</a:t>
+              <a:t>14.08.2019</a:t>
             </a:fld>
             <a:endParaRPr lang="pl-PL"/>
           </a:p>
@@ -2679,7 +4196,7 @@
           <a:p>
             <a:fld id="{A42A12F9-EA54-49E1-A3FD-186D9B25B348}" type="datetimeFigureOut">
               <a:rPr lang="pl-PL" smtClean="0"/>
-              <a:t>12.08.2019</a:t>
+              <a:t>14.08.2019</a:t>
             </a:fld>
             <a:endParaRPr lang="pl-PL"/>
           </a:p>
@@ -2920,7 +4437,7 @@
           <a:p>
             <a:fld id="{A42A12F9-EA54-49E1-A3FD-186D9B25B348}" type="datetimeFigureOut">
               <a:rPr lang="pl-PL" smtClean="0"/>
-              <a:t>12.08.2019</a:t>
+              <a:t>14.08.2019</a:t>
             </a:fld>
             <a:endParaRPr lang="pl-PL"/>
           </a:p>
@@ -3368,7 +4885,7 @@
           <p:nvPr/>
         </p:nvPicPr>
         <p:blipFill>
-          <a:blip r:embed="rId2">
+          <a:blip r:embed="rId3">
             <a:extLst>
               <a:ext uri="{28A0092B-C50C-407E-A947-70E740481C1C}">
                 <a14:useLocalDpi xmlns:a14="http://schemas.microsoft.com/office/drawing/2010/main" val="0"/>
@@ -3450,7 +4967,7 @@
           <p:nvPr/>
         </p:nvPicPr>
         <p:blipFill>
-          <a:blip r:embed="rId2">
+          <a:blip r:embed="rId3">
             <a:extLst>
               <a:ext uri="{28A0092B-C50C-407E-A947-70E740481C1C}">
                 <a14:useLocalDpi xmlns:a14="http://schemas.microsoft.com/office/drawing/2010/main" val="0"/>
@@ -3471,55 +4988,6 @@
           </a:prstGeom>
         </p:spPr>
       </p:pic>
-      <p:pic>
-        <p:nvPicPr>
-          <p:cNvPr id="3" name="Obraz 2">
-            <a:extLst>
-              <a:ext uri="{FF2B5EF4-FFF2-40B4-BE49-F238E27FC236}">
-                <a16:creationId xmlns:a16="http://schemas.microsoft.com/office/drawing/2014/main" id="{F1E30B0D-6972-4B65-BB1D-D0634A4E9B54}"/>
-              </a:ext>
-            </a:extLst>
-          </p:cNvPr>
-          <p:cNvPicPr>
-            <a:picLocks noChangeAspect="1"/>
-          </p:cNvPicPr>
-          <p:nvPr/>
-        </p:nvPicPr>
-        <p:blipFill>
-          <a:blip r:embed="rId3">
-            <a:extLst>
-              <a:ext uri="{28A0092B-C50C-407E-A947-70E740481C1C}">
-                <a14:useLocalDpi xmlns:a14="http://schemas.microsoft.com/office/drawing/2010/main" val="0"/>
-              </a:ext>
-            </a:extLst>
-          </a:blip>
-          <a:stretch>
-            <a:fillRect/>
-          </a:stretch>
-        </p:blipFill>
-        <p:spPr>
-          <a:xfrm>
-            <a:off x="2387247" y="1252213"/>
-            <a:ext cx="7339847" cy="4045026"/>
-          </a:xfrm>
-          <a:prstGeom prst="roundRect">
-            <a:avLst>
-              <a:gd name="adj" fmla="val 8594"/>
-            </a:avLst>
-          </a:prstGeom>
-          <a:solidFill>
-            <a:srgbClr val="FFFFFF">
-              <a:shade val="85000"/>
-            </a:srgbClr>
-          </a:solidFill>
-          <a:ln>
-            <a:noFill/>
-          </a:ln>
-          <a:effectLst>
-            <a:reflection blurRad="12700" stA="38000" endPos="28000" dist="5000" dir="5400000" sy="-100000" algn="bl" rotWithShape="0"/>
-          </a:effectLst>
-        </p:spPr>
-      </p:pic>
       <p:sp>
         <p:nvSpPr>
           <p:cNvPr id="6" name="Prostokąt 5">
@@ -3534,7 +5002,7 @@
         </p:nvSpPr>
         <p:spPr>
           <a:xfrm>
-            <a:off x="1586365" y="5297239"/>
+            <a:off x="1733845" y="5297239"/>
             <a:ext cx="8941612" cy="1015663"/>
           </a:xfrm>
           <a:prstGeom prst="rect">
@@ -3633,6 +5101,959 @@
           </a:p>
         </p:txBody>
       </p:sp>
+      <p:grpSp>
+        <p:nvGrpSpPr>
+          <p:cNvPr id="2" name="Group 1">
+            <a:extLst>
+              <a:ext uri="{FF2B5EF4-FFF2-40B4-BE49-F238E27FC236}">
+                <a16:creationId xmlns:a16="http://schemas.microsoft.com/office/drawing/2014/main" id="{3C8BD5CB-0D2D-43AA-B4BF-144AEB672580}"/>
+              </a:ext>
+            </a:extLst>
+          </p:cNvPr>
+          <p:cNvGrpSpPr/>
+          <p:nvPr/>
+        </p:nvGrpSpPr>
+        <p:grpSpPr>
+          <a:xfrm>
+            <a:off x="2809154" y="345043"/>
+            <a:ext cx="6790993" cy="5286947"/>
+            <a:chOff x="3618561" y="277466"/>
+            <a:chExt cx="5334702" cy="5286947"/>
+          </a:xfrm>
+        </p:grpSpPr>
+        <p:grpSp>
+          <p:nvGrpSpPr>
+            <p:cNvPr id="7" name="Group 6">
+              <a:extLst>
+                <a:ext uri="{FF2B5EF4-FFF2-40B4-BE49-F238E27FC236}">
+                  <a16:creationId xmlns:a16="http://schemas.microsoft.com/office/drawing/2014/main" id="{87BEEFD1-ECD0-4833-AA01-6964D5460ED8}"/>
+                </a:ext>
+              </a:extLst>
+            </p:cNvPr>
+            <p:cNvGrpSpPr/>
+            <p:nvPr/>
+          </p:nvGrpSpPr>
+          <p:grpSpPr>
+            <a:xfrm>
+              <a:off x="3672640" y="316796"/>
+              <a:ext cx="5280623" cy="5247617"/>
+              <a:chOff x="4664294" y="138060"/>
+              <a:chExt cx="5280623" cy="5247617"/>
+            </a:xfrm>
+          </p:grpSpPr>
+          <p:pic>
+            <p:nvPicPr>
+              <p:cNvPr id="8" name="Graphic 7" descr="Network diagram">
+                <a:extLst>
+                  <a:ext uri="{FF2B5EF4-FFF2-40B4-BE49-F238E27FC236}">
+                    <a16:creationId xmlns:a16="http://schemas.microsoft.com/office/drawing/2014/main" id="{AC8BD2D9-26D8-4842-BD3D-5212D1B9F7C3}"/>
+                  </a:ext>
+                </a:extLst>
+              </p:cNvPr>
+              <p:cNvPicPr>
+                <a:picLocks noChangeAspect="1"/>
+              </p:cNvPicPr>
+              <p:nvPr/>
+            </p:nvPicPr>
+            <p:blipFill>
+              <a:blip r:embed="rId4">
+                <a:extLst>
+                  <a:ext uri="{28A0092B-C50C-407E-A947-70E740481C1C}">
+                    <a14:useLocalDpi xmlns:a14="http://schemas.microsoft.com/office/drawing/2010/main" val="0"/>
+                  </a:ext>
+                  <a:ext uri="{96DAC541-7B7A-43D3-8B79-37D633B846F1}">
+                    <asvg:svgBlip xmlns:asvg="http://schemas.microsoft.com/office/drawing/2016/SVG/main" r:embed="rId5"/>
+                  </a:ext>
+                </a:extLst>
+              </a:blip>
+              <a:stretch>
+                <a:fillRect/>
+              </a:stretch>
+            </p:blipFill>
+            <p:spPr>
+              <a:xfrm rot="16200000">
+                <a:off x="6057899" y="2903032"/>
+                <a:ext cx="2482645" cy="2482645"/>
+              </a:xfrm>
+              <a:prstGeom prst="rect">
+                <a:avLst/>
+              </a:prstGeom>
+            </p:spPr>
+          </p:pic>
+          <p:pic>
+            <p:nvPicPr>
+              <p:cNvPr id="9" name="Graphic 8" descr="Network diagram">
+                <a:extLst>
+                  <a:ext uri="{FF2B5EF4-FFF2-40B4-BE49-F238E27FC236}">
+                    <a16:creationId xmlns:a16="http://schemas.microsoft.com/office/drawing/2014/main" id="{9A4BAC2E-86D3-4537-926B-60C0CFB2BB6B}"/>
+                  </a:ext>
+                </a:extLst>
+              </p:cNvPr>
+              <p:cNvPicPr>
+                <a:picLocks noChangeAspect="1"/>
+              </p:cNvPicPr>
+              <p:nvPr/>
+            </p:nvPicPr>
+            <p:blipFill>
+              <a:blip r:embed="rId4">
+                <a:extLst>
+                  <a:ext uri="{28A0092B-C50C-407E-A947-70E740481C1C}">
+                    <a14:useLocalDpi xmlns:a14="http://schemas.microsoft.com/office/drawing/2010/main" val="0"/>
+                  </a:ext>
+                  <a:ext uri="{96DAC541-7B7A-43D3-8B79-37D633B846F1}">
+                    <asvg:svgBlip xmlns:asvg="http://schemas.microsoft.com/office/drawing/2016/SVG/main" r:embed="rId5"/>
+                  </a:ext>
+                </a:extLst>
+              </a:blip>
+              <a:stretch>
+                <a:fillRect/>
+              </a:stretch>
+            </p:blipFill>
+            <p:spPr>
+              <a:xfrm rot="16200000">
+                <a:off x="4664294" y="1520546"/>
+                <a:ext cx="2482645" cy="2482645"/>
+              </a:xfrm>
+              <a:prstGeom prst="rect">
+                <a:avLst/>
+              </a:prstGeom>
+            </p:spPr>
+          </p:pic>
+          <p:pic>
+            <p:nvPicPr>
+              <p:cNvPr id="10" name="Graphic 9" descr="Network diagram">
+                <a:extLst>
+                  <a:ext uri="{FF2B5EF4-FFF2-40B4-BE49-F238E27FC236}">
+                    <a16:creationId xmlns:a16="http://schemas.microsoft.com/office/drawing/2014/main" id="{2232C554-E5C8-40F6-9BB2-7100D8522919}"/>
+                  </a:ext>
+                </a:extLst>
+              </p:cNvPr>
+              <p:cNvPicPr>
+                <a:picLocks noChangeAspect="1"/>
+              </p:cNvPicPr>
+              <p:nvPr/>
+            </p:nvPicPr>
+            <p:blipFill>
+              <a:blip r:embed="rId4">
+                <a:extLst>
+                  <a:ext uri="{28A0092B-C50C-407E-A947-70E740481C1C}">
+                    <a14:useLocalDpi xmlns:a14="http://schemas.microsoft.com/office/drawing/2010/main" val="0"/>
+                  </a:ext>
+                  <a:ext uri="{96DAC541-7B7A-43D3-8B79-37D633B846F1}">
+                    <asvg:svgBlip xmlns:asvg="http://schemas.microsoft.com/office/drawing/2016/SVG/main" r:embed="rId5"/>
+                  </a:ext>
+                </a:extLst>
+              </a:blip>
+              <a:stretch>
+                <a:fillRect/>
+              </a:stretch>
+            </p:blipFill>
+            <p:spPr>
+              <a:xfrm rot="16200000">
+                <a:off x="6057899" y="1520546"/>
+                <a:ext cx="2482645" cy="2482645"/>
+              </a:xfrm>
+              <a:prstGeom prst="rect">
+                <a:avLst/>
+              </a:prstGeom>
+            </p:spPr>
+          </p:pic>
+          <p:pic>
+            <p:nvPicPr>
+              <p:cNvPr id="11" name="Graphic 10" descr="Network diagram">
+                <a:extLst>
+                  <a:ext uri="{FF2B5EF4-FFF2-40B4-BE49-F238E27FC236}">
+                    <a16:creationId xmlns:a16="http://schemas.microsoft.com/office/drawing/2014/main" id="{2ED42577-B6EA-44D2-BE06-018857D39852}"/>
+                  </a:ext>
+                </a:extLst>
+              </p:cNvPr>
+              <p:cNvPicPr>
+                <a:picLocks noChangeAspect="1"/>
+              </p:cNvPicPr>
+              <p:nvPr/>
+            </p:nvPicPr>
+            <p:blipFill>
+              <a:blip r:embed="rId4">
+                <a:extLst>
+                  <a:ext uri="{28A0092B-C50C-407E-A947-70E740481C1C}">
+                    <a14:useLocalDpi xmlns:a14="http://schemas.microsoft.com/office/drawing/2010/main" val="0"/>
+                  </a:ext>
+                  <a:ext uri="{96DAC541-7B7A-43D3-8B79-37D633B846F1}">
+                    <asvg:svgBlip xmlns:asvg="http://schemas.microsoft.com/office/drawing/2016/SVG/main" r:embed="rId5"/>
+                  </a:ext>
+                </a:extLst>
+              </a:blip>
+              <a:stretch>
+                <a:fillRect/>
+              </a:stretch>
+            </p:blipFill>
+            <p:spPr>
+              <a:xfrm rot="16200000">
+                <a:off x="7462272" y="1520545"/>
+                <a:ext cx="2482645" cy="2482645"/>
+              </a:xfrm>
+              <a:prstGeom prst="rect">
+                <a:avLst/>
+              </a:prstGeom>
+            </p:spPr>
+          </p:pic>
+          <p:pic>
+            <p:nvPicPr>
+              <p:cNvPr id="12" name="Graphic 11" descr="Network diagram">
+                <a:extLst>
+                  <a:ext uri="{FF2B5EF4-FFF2-40B4-BE49-F238E27FC236}">
+                    <a16:creationId xmlns:a16="http://schemas.microsoft.com/office/drawing/2014/main" id="{9FD53E21-C0E2-4585-BAA2-78A7CE0274D7}"/>
+                  </a:ext>
+                </a:extLst>
+              </p:cNvPr>
+              <p:cNvPicPr>
+                <a:picLocks noChangeAspect="1"/>
+              </p:cNvPicPr>
+              <p:nvPr/>
+            </p:nvPicPr>
+            <p:blipFill>
+              <a:blip r:embed="rId4">
+                <a:extLst>
+                  <a:ext uri="{28A0092B-C50C-407E-A947-70E740481C1C}">
+                    <a14:useLocalDpi xmlns:a14="http://schemas.microsoft.com/office/drawing/2010/main" val="0"/>
+                  </a:ext>
+                  <a:ext uri="{96DAC541-7B7A-43D3-8B79-37D633B846F1}">
+                    <asvg:svgBlip xmlns:asvg="http://schemas.microsoft.com/office/drawing/2016/SVG/main" r:embed="rId5"/>
+                  </a:ext>
+                </a:extLst>
+              </a:blip>
+              <a:stretch>
+                <a:fillRect/>
+              </a:stretch>
+            </p:blipFill>
+            <p:spPr>
+              <a:xfrm rot="16200000">
+                <a:off x="5361096" y="138060"/>
+                <a:ext cx="2482645" cy="2482645"/>
+              </a:xfrm>
+              <a:prstGeom prst="rect">
+                <a:avLst/>
+              </a:prstGeom>
+            </p:spPr>
+          </p:pic>
+        </p:grpSp>
+        <p:grpSp>
+          <p:nvGrpSpPr>
+            <p:cNvPr id="13" name="Group 12">
+              <a:extLst>
+                <a:ext uri="{FF2B5EF4-FFF2-40B4-BE49-F238E27FC236}">
+                  <a16:creationId xmlns:a16="http://schemas.microsoft.com/office/drawing/2014/main" id="{463B5D01-350B-4319-89F4-BFD668B7C20F}"/>
+                </a:ext>
+              </a:extLst>
+            </p:cNvPr>
+            <p:cNvGrpSpPr/>
+            <p:nvPr/>
+          </p:nvGrpSpPr>
+          <p:grpSpPr>
+            <a:xfrm>
+              <a:off x="3618561" y="277466"/>
+              <a:ext cx="5280623" cy="5247617"/>
+              <a:chOff x="4664294" y="138060"/>
+              <a:chExt cx="5280623" cy="5247617"/>
+            </a:xfrm>
+            <a:solidFill>
+              <a:schemeClr val="bg1"/>
+            </a:solidFill>
+          </p:grpSpPr>
+          <p:pic>
+            <p:nvPicPr>
+              <p:cNvPr id="14" name="Graphic 13" descr="Network diagram">
+                <a:extLst>
+                  <a:ext uri="{FF2B5EF4-FFF2-40B4-BE49-F238E27FC236}">
+                    <a16:creationId xmlns:a16="http://schemas.microsoft.com/office/drawing/2014/main" id="{B0954412-D86B-475F-8569-1F1DEC19E7A1}"/>
+                  </a:ext>
+                </a:extLst>
+              </p:cNvPr>
+              <p:cNvPicPr>
+                <a:picLocks noChangeAspect="1"/>
+              </p:cNvPicPr>
+              <p:nvPr/>
+            </p:nvPicPr>
+            <p:blipFill>
+              <a:blip r:embed="rId6">
+                <a:extLst>
+                  <a:ext uri="{28A0092B-C50C-407E-A947-70E740481C1C}">
+                    <a14:useLocalDpi xmlns:a14="http://schemas.microsoft.com/office/drawing/2010/main" val="0"/>
+                  </a:ext>
+                  <a:ext uri="{96DAC541-7B7A-43D3-8B79-37D633B846F1}">
+                    <asvg:svgBlip xmlns:asvg="http://schemas.microsoft.com/office/drawing/2016/SVG/main" r:embed="rId7"/>
+                  </a:ext>
+                </a:extLst>
+              </a:blip>
+              <a:stretch>
+                <a:fillRect/>
+              </a:stretch>
+            </p:blipFill>
+            <p:spPr>
+              <a:xfrm rot="16200000">
+                <a:off x="6057899" y="2903032"/>
+                <a:ext cx="2482645" cy="2482645"/>
+              </a:xfrm>
+              <a:prstGeom prst="rect">
+                <a:avLst/>
+              </a:prstGeom>
+            </p:spPr>
+          </p:pic>
+          <p:pic>
+            <p:nvPicPr>
+              <p:cNvPr id="15" name="Graphic 14" descr="Network diagram">
+                <a:extLst>
+                  <a:ext uri="{FF2B5EF4-FFF2-40B4-BE49-F238E27FC236}">
+                    <a16:creationId xmlns:a16="http://schemas.microsoft.com/office/drawing/2014/main" id="{1F6BED6F-6DF9-4937-BD8A-18017CDCA831}"/>
+                  </a:ext>
+                </a:extLst>
+              </p:cNvPr>
+              <p:cNvPicPr>
+                <a:picLocks noChangeAspect="1"/>
+              </p:cNvPicPr>
+              <p:nvPr/>
+            </p:nvPicPr>
+            <p:blipFill>
+              <a:blip r:embed="rId6">
+                <a:extLst>
+                  <a:ext uri="{28A0092B-C50C-407E-A947-70E740481C1C}">
+                    <a14:useLocalDpi xmlns:a14="http://schemas.microsoft.com/office/drawing/2010/main" val="0"/>
+                  </a:ext>
+                  <a:ext uri="{96DAC541-7B7A-43D3-8B79-37D633B846F1}">
+                    <asvg:svgBlip xmlns:asvg="http://schemas.microsoft.com/office/drawing/2016/SVG/main" r:embed="rId7"/>
+                  </a:ext>
+                </a:extLst>
+              </a:blip>
+              <a:stretch>
+                <a:fillRect/>
+              </a:stretch>
+            </p:blipFill>
+            <p:spPr>
+              <a:xfrm rot="16200000">
+                <a:off x="4664294" y="1520546"/>
+                <a:ext cx="2482645" cy="2482645"/>
+              </a:xfrm>
+              <a:prstGeom prst="rect">
+                <a:avLst/>
+              </a:prstGeom>
+            </p:spPr>
+          </p:pic>
+          <p:pic>
+            <p:nvPicPr>
+              <p:cNvPr id="16" name="Graphic 15" descr="Network diagram">
+                <a:extLst>
+                  <a:ext uri="{FF2B5EF4-FFF2-40B4-BE49-F238E27FC236}">
+                    <a16:creationId xmlns:a16="http://schemas.microsoft.com/office/drawing/2014/main" id="{6304EEBA-4EDB-4044-B4A3-7486BBA10B6B}"/>
+                  </a:ext>
+                </a:extLst>
+              </p:cNvPr>
+              <p:cNvPicPr>
+                <a:picLocks noChangeAspect="1"/>
+              </p:cNvPicPr>
+              <p:nvPr/>
+            </p:nvPicPr>
+            <p:blipFill>
+              <a:blip r:embed="rId6">
+                <a:extLst>
+                  <a:ext uri="{28A0092B-C50C-407E-A947-70E740481C1C}">
+                    <a14:useLocalDpi xmlns:a14="http://schemas.microsoft.com/office/drawing/2010/main" val="0"/>
+                  </a:ext>
+                  <a:ext uri="{96DAC541-7B7A-43D3-8B79-37D633B846F1}">
+                    <asvg:svgBlip xmlns:asvg="http://schemas.microsoft.com/office/drawing/2016/SVG/main" r:embed="rId7"/>
+                  </a:ext>
+                </a:extLst>
+              </a:blip>
+              <a:stretch>
+                <a:fillRect/>
+              </a:stretch>
+            </p:blipFill>
+            <p:spPr>
+              <a:xfrm rot="16200000">
+                <a:off x="6057899" y="1520546"/>
+                <a:ext cx="2482645" cy="2482645"/>
+              </a:xfrm>
+              <a:prstGeom prst="rect">
+                <a:avLst/>
+              </a:prstGeom>
+            </p:spPr>
+          </p:pic>
+          <p:pic>
+            <p:nvPicPr>
+              <p:cNvPr id="17" name="Graphic 16" descr="Network diagram">
+                <a:extLst>
+                  <a:ext uri="{FF2B5EF4-FFF2-40B4-BE49-F238E27FC236}">
+                    <a16:creationId xmlns:a16="http://schemas.microsoft.com/office/drawing/2014/main" id="{37687D57-3458-451A-B6C4-B4C5642C8438}"/>
+                  </a:ext>
+                </a:extLst>
+              </p:cNvPr>
+              <p:cNvPicPr>
+                <a:picLocks noChangeAspect="1"/>
+              </p:cNvPicPr>
+              <p:nvPr/>
+            </p:nvPicPr>
+            <p:blipFill>
+              <a:blip r:embed="rId6">
+                <a:extLst>
+                  <a:ext uri="{28A0092B-C50C-407E-A947-70E740481C1C}">
+                    <a14:useLocalDpi xmlns:a14="http://schemas.microsoft.com/office/drawing/2010/main" val="0"/>
+                  </a:ext>
+                  <a:ext uri="{96DAC541-7B7A-43D3-8B79-37D633B846F1}">
+                    <asvg:svgBlip xmlns:asvg="http://schemas.microsoft.com/office/drawing/2016/SVG/main" r:embed="rId7"/>
+                  </a:ext>
+                </a:extLst>
+              </a:blip>
+              <a:stretch>
+                <a:fillRect/>
+              </a:stretch>
+            </p:blipFill>
+            <p:spPr>
+              <a:xfrm rot="16200000">
+                <a:off x="7462272" y="1520545"/>
+                <a:ext cx="2482645" cy="2482645"/>
+              </a:xfrm>
+              <a:prstGeom prst="rect">
+                <a:avLst/>
+              </a:prstGeom>
+            </p:spPr>
+          </p:pic>
+          <p:pic>
+            <p:nvPicPr>
+              <p:cNvPr id="18" name="Graphic 17" descr="Network diagram">
+                <a:extLst>
+                  <a:ext uri="{FF2B5EF4-FFF2-40B4-BE49-F238E27FC236}">
+                    <a16:creationId xmlns:a16="http://schemas.microsoft.com/office/drawing/2014/main" id="{91D53D9D-ACC0-4D86-BF08-E7AAD3E30BE4}"/>
+                  </a:ext>
+                </a:extLst>
+              </p:cNvPr>
+              <p:cNvPicPr>
+                <a:picLocks noChangeAspect="1"/>
+              </p:cNvPicPr>
+              <p:nvPr/>
+            </p:nvPicPr>
+            <p:blipFill>
+              <a:blip r:embed="rId6">
+                <a:extLst>
+                  <a:ext uri="{28A0092B-C50C-407E-A947-70E740481C1C}">
+                    <a14:useLocalDpi xmlns:a14="http://schemas.microsoft.com/office/drawing/2010/main" val="0"/>
+                  </a:ext>
+                  <a:ext uri="{96DAC541-7B7A-43D3-8B79-37D633B846F1}">
+                    <asvg:svgBlip xmlns:asvg="http://schemas.microsoft.com/office/drawing/2016/SVG/main" r:embed="rId7"/>
+                  </a:ext>
+                </a:extLst>
+              </a:blip>
+              <a:stretch>
+                <a:fillRect/>
+              </a:stretch>
+            </p:blipFill>
+            <p:spPr>
+              <a:xfrm rot="16200000">
+                <a:off x="5361096" y="138060"/>
+                <a:ext cx="2482645" cy="2482645"/>
+              </a:xfrm>
+              <a:prstGeom prst="rect">
+                <a:avLst/>
+              </a:prstGeom>
+            </p:spPr>
+          </p:pic>
+        </p:grpSp>
+      </p:grpSp>
+      <p:sp>
+        <p:nvSpPr>
+          <p:cNvPr id="19" name="Prostokąt 5">
+            <a:extLst>
+              <a:ext uri="{FF2B5EF4-FFF2-40B4-BE49-F238E27FC236}">
+                <a16:creationId xmlns:a16="http://schemas.microsoft.com/office/drawing/2014/main" id="{1B43E6F2-2082-439D-937C-CEA7CDAA3625}"/>
+              </a:ext>
+            </a:extLst>
+          </p:cNvPr>
+          <p:cNvSpPr/>
+          <p:nvPr/>
+        </p:nvSpPr>
+        <p:spPr>
+          <a:xfrm>
+            <a:off x="7956826" y="2089428"/>
+            <a:ext cx="1388637" cy="400110"/>
+          </a:xfrm>
+          <a:prstGeom prst="rect">
+            <a:avLst/>
+          </a:prstGeom>
+          <a:noFill/>
+        </p:spPr>
+        <p:txBody>
+          <a:bodyPr wrap="square" lIns="91440" tIns="45720" rIns="91440" bIns="45720">
+            <a:spAutoFit/>
+          </a:bodyPr>
+          <a:lstStyle/>
+          <a:p>
+            <a:pPr algn="ctr"/>
+            <a:r>
+              <a:rPr lang="en-US" sz="2000" b="1" cap="none" spc="0" dirty="0">
+                <a:ln w="10160">
+                  <a:solidFill>
+                    <a:schemeClr val="accent5"/>
+                  </a:solidFill>
+                  <a:prstDash val="solid"/>
+                </a:ln>
+                <a:solidFill>
+                  <a:srgbClr val="FFFFFF"/>
+                </a:solidFill>
+                <a:effectLst>
+                  <a:outerShdw blurRad="38100" dist="22860" dir="5400000" algn="tl" rotWithShape="0">
+                    <a:srgbClr val="000000">
+                      <a:alpha val="30000"/>
+                    </a:srgbClr>
+                  </a:outerShdw>
+                </a:effectLst>
+              </a:rPr>
+              <a:t>Parent</a:t>
+            </a:r>
+            <a:endParaRPr lang="pl-PL" sz="2000" b="1" cap="none" spc="0" dirty="0">
+              <a:ln w="10160">
+                <a:solidFill>
+                  <a:schemeClr val="accent5"/>
+                </a:solidFill>
+                <a:prstDash val="solid"/>
+              </a:ln>
+              <a:solidFill>
+                <a:srgbClr val="FFFFFF"/>
+              </a:solidFill>
+              <a:effectLst>
+                <a:outerShdw blurRad="38100" dist="22860" dir="5400000" algn="tl" rotWithShape="0">
+                  <a:srgbClr val="000000">
+                    <a:alpha val="30000"/>
+                  </a:srgbClr>
+                </a:outerShdw>
+              </a:effectLst>
+            </a:endParaRPr>
+          </a:p>
+        </p:txBody>
+      </p:sp>
+      <p:sp>
+        <p:nvSpPr>
+          <p:cNvPr id="20" name="Prostokąt 5">
+            <a:extLst>
+              <a:ext uri="{FF2B5EF4-FFF2-40B4-BE49-F238E27FC236}">
+                <a16:creationId xmlns:a16="http://schemas.microsoft.com/office/drawing/2014/main" id="{8D41FCAD-DB38-464F-9E2A-A498D9521B79}"/>
+              </a:ext>
+            </a:extLst>
+          </p:cNvPr>
+          <p:cNvSpPr/>
+          <p:nvPr/>
+        </p:nvSpPr>
+        <p:spPr>
+          <a:xfrm>
+            <a:off x="2946838" y="2189304"/>
+            <a:ext cx="1388637" cy="400110"/>
+          </a:xfrm>
+          <a:prstGeom prst="rect">
+            <a:avLst/>
+          </a:prstGeom>
+          <a:noFill/>
+        </p:spPr>
+        <p:txBody>
+          <a:bodyPr wrap="square" lIns="91440" tIns="45720" rIns="91440" bIns="45720">
+            <a:spAutoFit/>
+          </a:bodyPr>
+          <a:lstStyle/>
+          <a:p>
+            <a:pPr algn="ctr"/>
+            <a:r>
+              <a:rPr lang="en-US" sz="2000" b="1" cap="none" spc="0" dirty="0">
+                <a:ln w="10160">
+                  <a:solidFill>
+                    <a:schemeClr val="accent5"/>
+                  </a:solidFill>
+                  <a:prstDash val="solid"/>
+                </a:ln>
+                <a:solidFill>
+                  <a:srgbClr val="FFFFFF"/>
+                </a:solidFill>
+                <a:effectLst>
+                  <a:outerShdw blurRad="38100" dist="22860" dir="5400000" algn="tl" rotWithShape="0">
+                    <a:srgbClr val="000000">
+                      <a:alpha val="30000"/>
+                    </a:srgbClr>
+                  </a:outerShdw>
+                </a:effectLst>
+              </a:rPr>
+              <a:t>Parent</a:t>
+            </a:r>
+            <a:endParaRPr lang="pl-PL" sz="2000" b="1" cap="none" spc="0" dirty="0">
+              <a:ln w="10160">
+                <a:solidFill>
+                  <a:schemeClr val="accent5"/>
+                </a:solidFill>
+                <a:prstDash val="solid"/>
+              </a:ln>
+              <a:solidFill>
+                <a:srgbClr val="FFFFFF"/>
+              </a:solidFill>
+              <a:effectLst>
+                <a:outerShdw blurRad="38100" dist="22860" dir="5400000" algn="tl" rotWithShape="0">
+                  <a:srgbClr val="000000">
+                    <a:alpha val="30000"/>
+                  </a:srgbClr>
+                </a:outerShdw>
+              </a:effectLst>
+            </a:endParaRPr>
+          </a:p>
+        </p:txBody>
+      </p:sp>
+      <p:sp>
+        <p:nvSpPr>
+          <p:cNvPr id="21" name="Prostokąt 5">
+            <a:extLst>
+              <a:ext uri="{FF2B5EF4-FFF2-40B4-BE49-F238E27FC236}">
+                <a16:creationId xmlns:a16="http://schemas.microsoft.com/office/drawing/2014/main" id="{EAB03A0E-C12B-4DAF-B74C-223ADD2F03F5}"/>
+              </a:ext>
+            </a:extLst>
+          </p:cNvPr>
+          <p:cNvSpPr/>
+          <p:nvPr/>
+        </p:nvSpPr>
+        <p:spPr>
+          <a:xfrm>
+            <a:off x="5251516" y="731925"/>
+            <a:ext cx="1388637" cy="400110"/>
+          </a:xfrm>
+          <a:prstGeom prst="rect">
+            <a:avLst/>
+          </a:prstGeom>
+          <a:noFill/>
+        </p:spPr>
+        <p:txBody>
+          <a:bodyPr wrap="square" lIns="91440" tIns="45720" rIns="91440" bIns="45720">
+            <a:spAutoFit/>
+          </a:bodyPr>
+          <a:lstStyle/>
+          <a:p>
+            <a:pPr algn="ctr"/>
+            <a:r>
+              <a:rPr lang="en-US" sz="2000" b="1" cap="none" spc="0" dirty="0">
+                <a:ln w="10160">
+                  <a:solidFill>
+                    <a:schemeClr val="accent5"/>
+                  </a:solidFill>
+                  <a:prstDash val="solid"/>
+                </a:ln>
+                <a:solidFill>
+                  <a:srgbClr val="FFFFFF"/>
+                </a:solidFill>
+                <a:effectLst>
+                  <a:outerShdw blurRad="38100" dist="22860" dir="5400000" algn="tl" rotWithShape="0">
+                    <a:srgbClr val="000000">
+                      <a:alpha val="30000"/>
+                    </a:srgbClr>
+                  </a:outerShdw>
+                </a:effectLst>
+              </a:rPr>
+              <a:t>Parent</a:t>
+            </a:r>
+            <a:endParaRPr lang="pl-PL" sz="2000" b="1" cap="none" spc="0" dirty="0">
+              <a:ln w="10160">
+                <a:solidFill>
+                  <a:schemeClr val="accent5"/>
+                </a:solidFill>
+                <a:prstDash val="solid"/>
+              </a:ln>
+              <a:solidFill>
+                <a:srgbClr val="FFFFFF"/>
+              </a:solidFill>
+              <a:effectLst>
+                <a:outerShdw blurRad="38100" dist="22860" dir="5400000" algn="tl" rotWithShape="0">
+                  <a:srgbClr val="000000">
+                    <a:alpha val="30000"/>
+                  </a:srgbClr>
+                </a:outerShdw>
+              </a:effectLst>
+            </a:endParaRPr>
+          </a:p>
+        </p:txBody>
+      </p:sp>
+      <p:sp>
+        <p:nvSpPr>
+          <p:cNvPr id="22" name="Prostokąt 5">
+            <a:extLst>
+              <a:ext uri="{FF2B5EF4-FFF2-40B4-BE49-F238E27FC236}">
+                <a16:creationId xmlns:a16="http://schemas.microsoft.com/office/drawing/2014/main" id="{72C956D3-E1DE-4678-B3DC-B6CFBCCC08EA}"/>
+              </a:ext>
+            </a:extLst>
+          </p:cNvPr>
+          <p:cNvSpPr/>
+          <p:nvPr/>
+        </p:nvSpPr>
+        <p:spPr>
+          <a:xfrm>
+            <a:off x="2159971" y="3477534"/>
+            <a:ext cx="1388637" cy="400110"/>
+          </a:xfrm>
+          <a:prstGeom prst="rect">
+            <a:avLst/>
+          </a:prstGeom>
+          <a:noFill/>
+        </p:spPr>
+        <p:txBody>
+          <a:bodyPr wrap="square" lIns="91440" tIns="45720" rIns="91440" bIns="45720">
+            <a:spAutoFit/>
+          </a:bodyPr>
+          <a:lstStyle/>
+          <a:p>
+            <a:pPr algn="ctr"/>
+            <a:r>
+              <a:rPr lang="en-US" sz="2000" b="1" cap="none" spc="0" dirty="0">
+                <a:ln w="10160">
+                  <a:solidFill>
+                    <a:schemeClr val="accent5"/>
+                  </a:solidFill>
+                  <a:prstDash val="solid"/>
+                </a:ln>
+                <a:solidFill>
+                  <a:srgbClr val="FFFFFF"/>
+                </a:solidFill>
+                <a:effectLst>
+                  <a:outerShdw blurRad="38100" dist="22860" dir="5400000" algn="tl" rotWithShape="0">
+                    <a:srgbClr val="000000">
+                      <a:alpha val="30000"/>
+                    </a:srgbClr>
+                  </a:outerShdw>
+                </a:effectLst>
+              </a:rPr>
+              <a:t>Child</a:t>
+            </a:r>
+            <a:endParaRPr lang="pl-PL" sz="2000" b="1" cap="none" spc="0" dirty="0">
+              <a:ln w="10160">
+                <a:solidFill>
+                  <a:schemeClr val="accent5"/>
+                </a:solidFill>
+                <a:prstDash val="solid"/>
+              </a:ln>
+              <a:solidFill>
+                <a:srgbClr val="FFFFFF"/>
+              </a:solidFill>
+              <a:effectLst>
+                <a:outerShdw blurRad="38100" dist="22860" dir="5400000" algn="tl" rotWithShape="0">
+                  <a:srgbClr val="000000">
+                    <a:alpha val="30000"/>
+                  </a:srgbClr>
+                </a:outerShdw>
+              </a:effectLst>
+            </a:endParaRPr>
+          </a:p>
+        </p:txBody>
+      </p:sp>
+      <p:sp>
+        <p:nvSpPr>
+          <p:cNvPr id="24" name="Prostokąt 5">
+            <a:extLst>
+              <a:ext uri="{FF2B5EF4-FFF2-40B4-BE49-F238E27FC236}">
+                <a16:creationId xmlns:a16="http://schemas.microsoft.com/office/drawing/2014/main" id="{5A06780C-2225-4B77-B1E9-703AD88C3CE6}"/>
+              </a:ext>
+            </a:extLst>
+          </p:cNvPr>
+          <p:cNvSpPr/>
+          <p:nvPr/>
+        </p:nvSpPr>
+        <p:spPr>
+          <a:xfrm>
+            <a:off x="8754436" y="3478281"/>
+            <a:ext cx="1388637" cy="400110"/>
+          </a:xfrm>
+          <a:prstGeom prst="rect">
+            <a:avLst/>
+          </a:prstGeom>
+          <a:noFill/>
+        </p:spPr>
+        <p:txBody>
+          <a:bodyPr wrap="square" lIns="91440" tIns="45720" rIns="91440" bIns="45720">
+            <a:spAutoFit/>
+          </a:bodyPr>
+          <a:lstStyle/>
+          <a:p>
+            <a:pPr algn="ctr"/>
+            <a:r>
+              <a:rPr lang="en-US" sz="2000" b="1" cap="none" spc="0" dirty="0">
+                <a:ln w="10160">
+                  <a:solidFill>
+                    <a:schemeClr val="accent5"/>
+                  </a:solidFill>
+                  <a:prstDash val="solid"/>
+                </a:ln>
+                <a:solidFill>
+                  <a:srgbClr val="FFFFFF"/>
+                </a:solidFill>
+                <a:effectLst>
+                  <a:outerShdw blurRad="38100" dist="22860" dir="5400000" algn="tl" rotWithShape="0">
+                    <a:srgbClr val="000000">
+                      <a:alpha val="30000"/>
+                    </a:srgbClr>
+                  </a:outerShdw>
+                </a:effectLst>
+              </a:rPr>
+              <a:t>Child</a:t>
+            </a:r>
+            <a:endParaRPr lang="pl-PL" sz="2000" b="1" cap="none" spc="0" dirty="0">
+              <a:ln w="10160">
+                <a:solidFill>
+                  <a:schemeClr val="accent5"/>
+                </a:solidFill>
+                <a:prstDash val="solid"/>
+              </a:ln>
+              <a:solidFill>
+                <a:srgbClr val="FFFFFF"/>
+              </a:solidFill>
+              <a:effectLst>
+                <a:outerShdw blurRad="38100" dist="22860" dir="5400000" algn="tl" rotWithShape="0">
+                  <a:srgbClr val="000000">
+                    <a:alpha val="30000"/>
+                  </a:srgbClr>
+                </a:outerShdw>
+              </a:effectLst>
+            </a:endParaRPr>
+          </a:p>
+        </p:txBody>
+      </p:sp>
+      <p:sp>
+        <p:nvSpPr>
+          <p:cNvPr id="25" name="Prostokąt 5">
+            <a:extLst>
+              <a:ext uri="{FF2B5EF4-FFF2-40B4-BE49-F238E27FC236}">
+                <a16:creationId xmlns:a16="http://schemas.microsoft.com/office/drawing/2014/main" id="{ACD7B25E-8B69-498C-B05F-4CEC92AA846A}"/>
+              </a:ext>
+            </a:extLst>
+          </p:cNvPr>
+          <p:cNvSpPr/>
+          <p:nvPr/>
+        </p:nvSpPr>
+        <p:spPr>
+          <a:xfrm>
+            <a:off x="6986596" y="4877464"/>
+            <a:ext cx="1388637" cy="400110"/>
+          </a:xfrm>
+          <a:prstGeom prst="rect">
+            <a:avLst/>
+          </a:prstGeom>
+          <a:noFill/>
+        </p:spPr>
+        <p:txBody>
+          <a:bodyPr wrap="square" lIns="91440" tIns="45720" rIns="91440" bIns="45720">
+            <a:spAutoFit/>
+          </a:bodyPr>
+          <a:lstStyle/>
+          <a:p>
+            <a:pPr algn="ctr"/>
+            <a:r>
+              <a:rPr lang="en-US" sz="2000" b="1" cap="none" spc="0" dirty="0">
+                <a:ln w="10160">
+                  <a:solidFill>
+                    <a:schemeClr val="accent5"/>
+                  </a:solidFill>
+                  <a:prstDash val="solid"/>
+                </a:ln>
+                <a:solidFill>
+                  <a:srgbClr val="FFFFFF"/>
+                </a:solidFill>
+                <a:effectLst>
+                  <a:outerShdw blurRad="38100" dist="22860" dir="5400000" algn="tl" rotWithShape="0">
+                    <a:srgbClr val="000000">
+                      <a:alpha val="30000"/>
+                    </a:srgbClr>
+                  </a:outerShdw>
+                </a:effectLst>
+              </a:rPr>
+              <a:t>Child</a:t>
+            </a:r>
+            <a:endParaRPr lang="pl-PL" sz="2000" b="1" cap="none" spc="0" dirty="0">
+              <a:ln w="10160">
+                <a:solidFill>
+                  <a:schemeClr val="accent5"/>
+                </a:solidFill>
+                <a:prstDash val="solid"/>
+              </a:ln>
+              <a:solidFill>
+                <a:srgbClr val="FFFFFF"/>
+              </a:solidFill>
+              <a:effectLst>
+                <a:outerShdw blurRad="38100" dist="22860" dir="5400000" algn="tl" rotWithShape="0">
+                  <a:srgbClr val="000000">
+                    <a:alpha val="30000"/>
+                  </a:srgbClr>
+                </a:outerShdw>
+              </a:effectLst>
+            </a:endParaRPr>
+          </a:p>
+        </p:txBody>
+      </p:sp>
+      <p:sp>
+        <p:nvSpPr>
+          <p:cNvPr id="27" name="Prostokąt 5">
+            <a:extLst>
+              <a:ext uri="{FF2B5EF4-FFF2-40B4-BE49-F238E27FC236}">
+                <a16:creationId xmlns:a16="http://schemas.microsoft.com/office/drawing/2014/main" id="{F5326095-281A-4DC8-A815-84B539397D48}"/>
+              </a:ext>
+            </a:extLst>
+          </p:cNvPr>
+          <p:cNvSpPr/>
+          <p:nvPr/>
+        </p:nvSpPr>
+        <p:spPr>
+          <a:xfrm>
+            <a:off x="2957965" y="1951031"/>
+            <a:ext cx="1388637" cy="400110"/>
+          </a:xfrm>
+          <a:prstGeom prst="rect">
+            <a:avLst/>
+          </a:prstGeom>
+          <a:noFill/>
+        </p:spPr>
+        <p:txBody>
+          <a:bodyPr wrap="square" lIns="91440" tIns="45720" rIns="91440" bIns="45720">
+            <a:spAutoFit/>
+          </a:bodyPr>
+          <a:lstStyle/>
+          <a:p>
+            <a:pPr algn="ctr"/>
+            <a:r>
+              <a:rPr lang="en-US" sz="2000" b="1" cap="none" spc="0" dirty="0">
+                <a:ln w="10160">
+                  <a:solidFill>
+                    <a:schemeClr val="accent5"/>
+                  </a:solidFill>
+                  <a:prstDash val="solid"/>
+                </a:ln>
+                <a:solidFill>
+                  <a:srgbClr val="FFFFFF"/>
+                </a:solidFill>
+                <a:effectLst>
+                  <a:outerShdw blurRad="38100" dist="22860" dir="5400000" algn="tl" rotWithShape="0">
+                    <a:srgbClr val="000000">
+                      <a:alpha val="30000"/>
+                    </a:srgbClr>
+                  </a:outerShdw>
+                </a:effectLst>
+              </a:rPr>
+              <a:t>Child</a:t>
+            </a:r>
+            <a:endParaRPr lang="pl-PL" sz="2000" b="1" cap="none" spc="0" dirty="0">
+              <a:ln w="10160">
+                <a:solidFill>
+                  <a:schemeClr val="accent5"/>
+                </a:solidFill>
+                <a:prstDash val="solid"/>
+              </a:ln>
+              <a:solidFill>
+                <a:srgbClr val="FFFFFF"/>
+              </a:solidFill>
+              <a:effectLst>
+                <a:outerShdw blurRad="38100" dist="22860" dir="5400000" algn="tl" rotWithShape="0">
+                  <a:srgbClr val="000000">
+                    <a:alpha val="30000"/>
+                  </a:srgbClr>
+                </a:outerShdw>
+              </a:effectLst>
+            </a:endParaRPr>
+          </a:p>
+        </p:txBody>
+      </p:sp>
     </p:spTree>
     <p:extLst>
       <p:ext uri="{BB962C8B-B14F-4D97-AF65-F5344CB8AC3E}">
@@ -3694,7 +6115,7 @@
           <p:nvPr/>
         </p:nvPicPr>
         <p:blipFill>
-          <a:blip r:embed="rId2">
+          <a:blip r:embed="rId3">
             <a:extLst>
               <a:ext uri="{28A0092B-C50C-407E-A947-70E740481C1C}">
                 <a14:useLocalDpi xmlns:a14="http://schemas.microsoft.com/office/drawing/2010/main" val="0"/>
@@ -9671,7 +12092,7 @@
           <p:nvPr/>
         </p:nvPicPr>
         <p:blipFill>
-          <a:blip r:embed="rId3">
+          <a:blip r:embed="rId4">
             <a:extLst>
               <a:ext uri="{28A0092B-C50C-407E-A947-70E740481C1C}">
                 <a14:useLocalDpi xmlns:a14="http://schemas.microsoft.com/office/drawing/2010/main" val="0"/>
@@ -9707,7 +12128,7 @@
           <p:nvPr/>
         </p:nvPicPr>
         <p:blipFill>
-          <a:blip r:embed="rId4">
+          <a:blip r:embed="rId5">
             <a:extLst>
               <a:ext uri="{28A0092B-C50C-407E-A947-70E740481C1C}">
                 <a14:useLocalDpi xmlns:a14="http://schemas.microsoft.com/office/drawing/2010/main" val="0"/>
@@ -9743,7 +12164,7 @@
           <p:nvPr/>
         </p:nvPicPr>
         <p:blipFill>
-          <a:blip r:embed="rId5">
+          <a:blip r:embed="rId6">
             <a:extLst>
               <a:ext uri="{28A0092B-C50C-407E-A947-70E740481C1C}">
                 <a14:useLocalDpi xmlns:a14="http://schemas.microsoft.com/office/drawing/2010/main" val="0"/>
@@ -9779,7 +12200,7 @@
           <p:nvPr/>
         </p:nvPicPr>
         <p:blipFill>
-          <a:blip r:embed="rId6">
+          <a:blip r:embed="rId7">
             <a:extLst>
               <a:ext uri="{28A0092B-C50C-407E-A947-70E740481C1C}">
                 <a14:useLocalDpi xmlns:a14="http://schemas.microsoft.com/office/drawing/2010/main" val="0"/>
@@ -10058,13 +12479,13 @@
           <p:nvPr/>
         </p:nvPicPr>
         <p:blipFill>
-          <a:blip r:embed="rId2">
+          <a:blip r:embed="rId3">
             <a:extLst>
               <a:ext uri="{28A0092B-C50C-407E-A947-70E740481C1C}">
                 <a14:useLocalDpi xmlns:a14="http://schemas.microsoft.com/office/drawing/2010/main" val="0"/>
               </a:ext>
               <a:ext uri="{96DAC541-7B7A-43D3-8B79-37D633B846F1}">
-                <asvg:svgBlip xmlns:asvg="http://schemas.microsoft.com/office/drawing/2016/SVG/main" r:embed="rId3"/>
+                <asvg:svgBlip xmlns:asvg="http://schemas.microsoft.com/office/drawing/2016/SVG/main" r:embed="rId4"/>
               </a:ext>
             </a:extLst>
           </a:blip>
@@ -10097,13 +12518,13 @@
           <p:nvPr/>
         </p:nvPicPr>
         <p:blipFill>
-          <a:blip r:embed="rId2">
+          <a:blip r:embed="rId3">
             <a:extLst>
               <a:ext uri="{28A0092B-C50C-407E-A947-70E740481C1C}">
                 <a14:useLocalDpi xmlns:a14="http://schemas.microsoft.com/office/drawing/2010/main" val="0"/>
               </a:ext>
               <a:ext uri="{96DAC541-7B7A-43D3-8B79-37D633B846F1}">
-                <asvg:svgBlip xmlns:asvg="http://schemas.microsoft.com/office/drawing/2016/SVG/main" r:embed="rId3"/>
+                <asvg:svgBlip xmlns:asvg="http://schemas.microsoft.com/office/drawing/2016/SVG/main" r:embed="rId4"/>
               </a:ext>
             </a:extLst>
           </a:blip>
@@ -10136,13 +12557,13 @@
           <p:nvPr/>
         </p:nvPicPr>
         <p:blipFill>
-          <a:blip r:embed="rId2">
+          <a:blip r:embed="rId3">
             <a:extLst>
               <a:ext uri="{28A0092B-C50C-407E-A947-70E740481C1C}">
                 <a14:useLocalDpi xmlns:a14="http://schemas.microsoft.com/office/drawing/2010/main" val="0"/>
               </a:ext>
               <a:ext uri="{96DAC541-7B7A-43D3-8B79-37D633B846F1}">
-                <asvg:svgBlip xmlns:asvg="http://schemas.microsoft.com/office/drawing/2016/SVG/main" r:embed="rId3"/>
+                <asvg:svgBlip xmlns:asvg="http://schemas.microsoft.com/office/drawing/2016/SVG/main" r:embed="rId4"/>
               </a:ext>
             </a:extLst>
           </a:blip>
@@ -10175,13 +12596,13 @@
           <p:nvPr/>
         </p:nvPicPr>
         <p:blipFill>
-          <a:blip r:embed="rId4">
+          <a:blip r:embed="rId5">
             <a:extLst>
               <a:ext uri="{28A0092B-C50C-407E-A947-70E740481C1C}">
                 <a14:useLocalDpi xmlns:a14="http://schemas.microsoft.com/office/drawing/2010/main" val="0"/>
               </a:ext>
               <a:ext uri="{96DAC541-7B7A-43D3-8B79-37D633B846F1}">
-                <asvg:svgBlip xmlns:asvg="http://schemas.microsoft.com/office/drawing/2016/SVG/main" r:embed="rId5"/>
+                <asvg:svgBlip xmlns:asvg="http://schemas.microsoft.com/office/drawing/2016/SVG/main" r:embed="rId6"/>
               </a:ext>
             </a:extLst>
           </a:blip>
@@ -10214,7 +12635,7 @@
           <p:nvPr/>
         </p:nvPicPr>
         <p:blipFill>
-          <a:blip r:embed="rId6">
+          <a:blip r:embed="rId7">
             <a:extLst>
               <a:ext uri="{28A0092B-C50C-407E-A947-70E740481C1C}">
                 <a14:useLocalDpi xmlns:a14="http://schemas.microsoft.com/office/drawing/2010/main" val="0"/>
@@ -10270,13 +12691,13 @@
             <p:nvPr/>
           </p:nvPicPr>
           <p:blipFill>
-            <a:blip r:embed="rId7">
+            <a:blip r:embed="rId8">
               <a:extLst>
                 <a:ext uri="{28A0092B-C50C-407E-A947-70E740481C1C}">
                   <a14:useLocalDpi xmlns:a14="http://schemas.microsoft.com/office/drawing/2010/main" val="0"/>
                 </a:ext>
                 <a:ext uri="{96DAC541-7B7A-43D3-8B79-37D633B846F1}">
-                  <asvg:svgBlip xmlns:asvg="http://schemas.microsoft.com/office/drawing/2016/SVG/main" r:embed="rId8"/>
+                  <asvg:svgBlip xmlns:asvg="http://schemas.microsoft.com/office/drawing/2016/SVG/main" r:embed="rId9"/>
                 </a:ext>
               </a:extLst>
             </a:blip>
@@ -10355,13 +12776,13 @@
           <p:nvPr/>
         </p:nvPicPr>
         <p:blipFill>
-          <a:blip r:embed="rId9">
+          <a:blip r:embed="rId10">
             <a:extLst>
               <a:ext uri="{28A0092B-C50C-407E-A947-70E740481C1C}">
                 <a14:useLocalDpi xmlns:a14="http://schemas.microsoft.com/office/drawing/2010/main" val="0"/>
               </a:ext>
               <a:ext uri="{96DAC541-7B7A-43D3-8B79-37D633B846F1}">
-                <asvg:svgBlip xmlns:asvg="http://schemas.microsoft.com/office/drawing/2016/SVG/main" r:embed="rId10"/>
+                <asvg:svgBlip xmlns:asvg="http://schemas.microsoft.com/office/drawing/2016/SVG/main" r:embed="rId11"/>
               </a:ext>
             </a:extLst>
           </a:blip>
@@ -10394,13 +12815,13 @@
           <p:nvPr/>
         </p:nvPicPr>
         <p:blipFill>
-          <a:blip r:embed="rId7">
+          <a:blip r:embed="rId8">
             <a:extLst>
               <a:ext uri="{28A0092B-C50C-407E-A947-70E740481C1C}">
                 <a14:useLocalDpi xmlns:a14="http://schemas.microsoft.com/office/drawing/2010/main" val="0"/>
               </a:ext>
               <a:ext uri="{96DAC541-7B7A-43D3-8B79-37D633B846F1}">
-                <asvg:svgBlip xmlns:asvg="http://schemas.microsoft.com/office/drawing/2016/SVG/main" r:embed="rId8"/>
+                <asvg:svgBlip xmlns:asvg="http://schemas.microsoft.com/office/drawing/2016/SVG/main" r:embed="rId9"/>
               </a:ext>
             </a:extLst>
           </a:blip>
@@ -10478,13 +12899,13 @@
           <p:nvPr/>
         </p:nvPicPr>
         <p:blipFill>
-          <a:blip r:embed="rId7">
+          <a:blip r:embed="rId8">
             <a:extLst>
               <a:ext uri="{28A0092B-C50C-407E-A947-70E740481C1C}">
                 <a14:useLocalDpi xmlns:a14="http://schemas.microsoft.com/office/drawing/2010/main" val="0"/>
               </a:ext>
               <a:ext uri="{96DAC541-7B7A-43D3-8B79-37D633B846F1}">
-                <asvg:svgBlip xmlns:asvg="http://schemas.microsoft.com/office/drawing/2016/SVG/main" r:embed="rId8"/>
+                <asvg:svgBlip xmlns:asvg="http://schemas.microsoft.com/office/drawing/2016/SVG/main" r:embed="rId9"/>
               </a:ext>
             </a:extLst>
           </a:blip>
@@ -10768,7 +13189,7 @@
           <p:nvPr/>
         </p:nvPicPr>
         <p:blipFill>
-          <a:blip r:embed="rId2">
+          <a:blip r:embed="rId3">
             <a:extLst>
               <a:ext uri="{28A0092B-C50C-407E-A947-70E740481C1C}">
                 <a14:useLocalDpi xmlns:a14="http://schemas.microsoft.com/office/drawing/2010/main" val="0"/>
@@ -11158,13 +13579,13 @@
                 <p:nvPr/>
               </p:nvPicPr>
               <p:blipFill>
-                <a:blip r:embed="rId3">
+                <a:blip r:embed="rId4">
                   <a:extLst>
                     <a:ext uri="{28A0092B-C50C-407E-A947-70E740481C1C}">
                       <a14:useLocalDpi xmlns:a14="http://schemas.microsoft.com/office/drawing/2010/main" val="0"/>
                     </a:ext>
                     <a:ext uri="{96DAC541-7B7A-43D3-8B79-37D633B846F1}">
-                      <asvg:svgBlip xmlns:asvg="http://schemas.microsoft.com/office/drawing/2016/SVG/main" r:embed="rId4"/>
+                      <asvg:svgBlip xmlns:asvg="http://schemas.microsoft.com/office/drawing/2016/SVG/main" r:embed="rId5"/>
                     </a:ext>
                   </a:extLst>
                 </a:blip>
@@ -11524,13 +13945,13 @@
                 <p:nvPr/>
               </p:nvPicPr>
               <p:blipFill>
-                <a:blip r:embed="rId5">
+                <a:blip r:embed="rId6">
                   <a:extLst>
                     <a:ext uri="{28A0092B-C50C-407E-A947-70E740481C1C}">
                       <a14:useLocalDpi xmlns:a14="http://schemas.microsoft.com/office/drawing/2010/main" val="0"/>
                     </a:ext>
                     <a:ext uri="{96DAC541-7B7A-43D3-8B79-37D633B846F1}">
-                      <asvg:svgBlip xmlns:asvg="http://schemas.microsoft.com/office/drawing/2016/SVG/main" r:embed="rId6"/>
+                      <asvg:svgBlip xmlns:asvg="http://schemas.microsoft.com/office/drawing/2016/SVG/main" r:embed="rId7"/>
                     </a:ext>
                   </a:extLst>
                 </a:blip>
@@ -11606,13 +14027,13 @@
               <p:nvPr/>
             </p:nvPicPr>
             <p:blipFill>
-              <a:blip r:embed="rId7">
+              <a:blip r:embed="rId8">
                 <a:extLst>
                   <a:ext uri="{28A0092B-C50C-407E-A947-70E740481C1C}">
                     <a14:useLocalDpi xmlns:a14="http://schemas.microsoft.com/office/drawing/2010/main" val="0"/>
                   </a:ext>
                   <a:ext uri="{96DAC541-7B7A-43D3-8B79-37D633B846F1}">
-                    <asvg:svgBlip xmlns:asvg="http://schemas.microsoft.com/office/drawing/2016/SVG/main" r:embed="rId8"/>
+                    <asvg:svgBlip xmlns:asvg="http://schemas.microsoft.com/office/drawing/2016/SVG/main" r:embed="rId9"/>
                   </a:ext>
                 </a:extLst>
               </a:blip>
@@ -11645,13 +14066,13 @@
               <p:nvPr/>
             </p:nvPicPr>
             <p:blipFill>
-              <a:blip r:embed="rId9">
+              <a:blip r:embed="rId10">
                 <a:extLst>
                   <a:ext uri="{28A0092B-C50C-407E-A947-70E740481C1C}">
                     <a14:useLocalDpi xmlns:a14="http://schemas.microsoft.com/office/drawing/2010/main" val="0"/>
                   </a:ext>
                   <a:ext uri="{96DAC541-7B7A-43D3-8B79-37D633B846F1}">
-                    <asvg:svgBlip xmlns:asvg="http://schemas.microsoft.com/office/drawing/2016/SVG/main" r:embed="rId10"/>
+                    <asvg:svgBlip xmlns:asvg="http://schemas.microsoft.com/office/drawing/2016/SVG/main" r:embed="rId11"/>
                   </a:ext>
                 </a:extLst>
               </a:blip>
@@ -11708,13 +14129,13 @@
               <p:nvPr/>
             </p:nvPicPr>
             <p:blipFill>
-              <a:blip r:embed="rId11">
+              <a:blip r:embed="rId12">
                 <a:extLst>
                   <a:ext uri="{28A0092B-C50C-407E-A947-70E740481C1C}">
                     <a14:useLocalDpi xmlns:a14="http://schemas.microsoft.com/office/drawing/2010/main" val="0"/>
                   </a:ext>
                   <a:ext uri="{96DAC541-7B7A-43D3-8B79-37D633B846F1}">
-                    <asvg:svgBlip xmlns:asvg="http://schemas.microsoft.com/office/drawing/2016/SVG/main" r:embed="rId12"/>
+                    <asvg:svgBlip xmlns:asvg="http://schemas.microsoft.com/office/drawing/2016/SVG/main" r:embed="rId13"/>
                   </a:ext>
                 </a:extLst>
               </a:blip>
@@ -11747,13 +14168,13 @@
               <p:nvPr/>
             </p:nvPicPr>
             <p:blipFill>
-              <a:blip r:embed="rId13">
+              <a:blip r:embed="rId14">
                 <a:extLst>
                   <a:ext uri="{28A0092B-C50C-407E-A947-70E740481C1C}">
                     <a14:useLocalDpi xmlns:a14="http://schemas.microsoft.com/office/drawing/2010/main" val="0"/>
                   </a:ext>
                   <a:ext uri="{96DAC541-7B7A-43D3-8B79-37D633B846F1}">
-                    <asvg:svgBlip xmlns:asvg="http://schemas.microsoft.com/office/drawing/2016/SVG/main" r:embed="rId14"/>
+                    <asvg:svgBlip xmlns:asvg="http://schemas.microsoft.com/office/drawing/2016/SVG/main" r:embed="rId15"/>
                   </a:ext>
                 </a:extLst>
               </a:blip>
@@ -12737,7 +15158,7 @@
           <p:nvPr/>
         </p:nvPicPr>
         <p:blipFill>
-          <a:blip r:embed="rId2">
+          <a:blip r:embed="rId3">
             <a:extLst>
               <a:ext uri="{28A0092B-C50C-407E-A947-70E740481C1C}">
                 <a14:useLocalDpi xmlns:a14="http://schemas.microsoft.com/office/drawing/2010/main" val="0"/>
@@ -12773,13 +15194,13 @@
           <p:nvPr/>
         </p:nvPicPr>
         <p:blipFill>
-          <a:blip r:embed="rId3">
+          <a:blip r:embed="rId4">
             <a:extLst>
               <a:ext uri="{28A0092B-C50C-407E-A947-70E740481C1C}">
                 <a14:useLocalDpi xmlns:a14="http://schemas.microsoft.com/office/drawing/2010/main" val="0"/>
               </a:ext>
               <a:ext uri="{96DAC541-7B7A-43D3-8B79-37D633B846F1}">
-                <asvg:svgBlip xmlns:asvg="http://schemas.microsoft.com/office/drawing/2016/SVG/main" r:embed="rId4"/>
+                <asvg:svgBlip xmlns:asvg="http://schemas.microsoft.com/office/drawing/2016/SVG/main" r:embed="rId5"/>
               </a:ext>
             </a:extLst>
           </a:blip>
@@ -12832,13 +15253,13 @@
             <p:nvPr/>
           </p:nvPicPr>
           <p:blipFill>
-            <a:blip r:embed="rId5">
+            <a:blip r:embed="rId6">
               <a:extLst>
                 <a:ext uri="{28A0092B-C50C-407E-A947-70E740481C1C}">
                   <a14:useLocalDpi xmlns:a14="http://schemas.microsoft.com/office/drawing/2010/main" val="0"/>
                 </a:ext>
                 <a:ext uri="{96DAC541-7B7A-43D3-8B79-37D633B846F1}">
-                  <asvg:svgBlip xmlns:asvg="http://schemas.microsoft.com/office/drawing/2016/SVG/main" r:embed="rId6"/>
+                  <asvg:svgBlip xmlns:asvg="http://schemas.microsoft.com/office/drawing/2016/SVG/main" r:embed="rId7"/>
                 </a:ext>
               </a:extLst>
             </a:blip>
@@ -12871,13 +15292,13 @@
             <p:nvPr/>
           </p:nvPicPr>
           <p:blipFill>
-            <a:blip r:embed="rId5">
+            <a:blip r:embed="rId6">
               <a:extLst>
                 <a:ext uri="{28A0092B-C50C-407E-A947-70E740481C1C}">
                   <a14:useLocalDpi xmlns:a14="http://schemas.microsoft.com/office/drawing/2010/main" val="0"/>
                 </a:ext>
                 <a:ext uri="{96DAC541-7B7A-43D3-8B79-37D633B846F1}">
-                  <asvg:svgBlip xmlns:asvg="http://schemas.microsoft.com/office/drawing/2016/SVG/main" r:embed="rId6"/>
+                  <asvg:svgBlip xmlns:asvg="http://schemas.microsoft.com/office/drawing/2016/SVG/main" r:embed="rId7"/>
                 </a:ext>
               </a:extLst>
             </a:blip>
@@ -12910,13 +15331,13 @@
             <p:nvPr/>
           </p:nvPicPr>
           <p:blipFill>
-            <a:blip r:embed="rId5">
+            <a:blip r:embed="rId6">
               <a:extLst>
                 <a:ext uri="{28A0092B-C50C-407E-A947-70E740481C1C}">
                   <a14:useLocalDpi xmlns:a14="http://schemas.microsoft.com/office/drawing/2010/main" val="0"/>
                 </a:ext>
                 <a:ext uri="{96DAC541-7B7A-43D3-8B79-37D633B846F1}">
-                  <asvg:svgBlip xmlns:asvg="http://schemas.microsoft.com/office/drawing/2016/SVG/main" r:embed="rId6"/>
+                  <asvg:svgBlip xmlns:asvg="http://schemas.microsoft.com/office/drawing/2016/SVG/main" r:embed="rId7"/>
                 </a:ext>
               </a:extLst>
             </a:blip>
@@ -12973,13 +15394,13 @@
             <p:nvPr/>
           </p:nvPicPr>
           <p:blipFill>
-            <a:blip r:embed="rId7">
+            <a:blip r:embed="rId8">
               <a:extLst>
                 <a:ext uri="{28A0092B-C50C-407E-A947-70E740481C1C}">
                   <a14:useLocalDpi xmlns:a14="http://schemas.microsoft.com/office/drawing/2010/main" val="0"/>
                 </a:ext>
                 <a:ext uri="{96DAC541-7B7A-43D3-8B79-37D633B846F1}">
-                  <asvg:svgBlip xmlns:asvg="http://schemas.microsoft.com/office/drawing/2016/SVG/main" r:embed="rId8"/>
+                  <asvg:svgBlip xmlns:asvg="http://schemas.microsoft.com/office/drawing/2016/SVG/main" r:embed="rId9"/>
                 </a:ext>
               </a:extLst>
             </a:blip>
@@ -13012,13 +15433,13 @@
             <p:nvPr/>
           </p:nvPicPr>
           <p:blipFill>
-            <a:blip r:embed="rId7">
+            <a:blip r:embed="rId8">
               <a:extLst>
                 <a:ext uri="{28A0092B-C50C-407E-A947-70E740481C1C}">
                   <a14:useLocalDpi xmlns:a14="http://schemas.microsoft.com/office/drawing/2010/main" val="0"/>
                 </a:ext>
                 <a:ext uri="{96DAC541-7B7A-43D3-8B79-37D633B846F1}">
-                  <asvg:svgBlip xmlns:asvg="http://schemas.microsoft.com/office/drawing/2016/SVG/main" r:embed="rId8"/>
+                  <asvg:svgBlip xmlns:asvg="http://schemas.microsoft.com/office/drawing/2016/SVG/main" r:embed="rId9"/>
                 </a:ext>
               </a:extLst>
             </a:blip>
@@ -13051,13 +15472,13 @@
             <p:nvPr/>
           </p:nvPicPr>
           <p:blipFill>
-            <a:blip r:embed="rId7">
+            <a:blip r:embed="rId8">
               <a:extLst>
                 <a:ext uri="{28A0092B-C50C-407E-A947-70E740481C1C}">
                   <a14:useLocalDpi xmlns:a14="http://schemas.microsoft.com/office/drawing/2010/main" val="0"/>
                 </a:ext>
                 <a:ext uri="{96DAC541-7B7A-43D3-8B79-37D633B846F1}">
-                  <asvg:svgBlip xmlns:asvg="http://schemas.microsoft.com/office/drawing/2016/SVG/main" r:embed="rId8"/>
+                  <asvg:svgBlip xmlns:asvg="http://schemas.microsoft.com/office/drawing/2016/SVG/main" r:embed="rId9"/>
                 </a:ext>
               </a:extLst>
             </a:blip>
@@ -13091,13 +15512,13 @@
           <p:nvPr/>
         </p:nvPicPr>
         <p:blipFill>
-          <a:blip r:embed="rId9">
+          <a:blip r:embed="rId10">
             <a:extLst>
               <a:ext uri="{28A0092B-C50C-407E-A947-70E740481C1C}">
                 <a14:useLocalDpi xmlns:a14="http://schemas.microsoft.com/office/drawing/2010/main" val="0"/>
               </a:ext>
               <a:ext uri="{96DAC541-7B7A-43D3-8B79-37D633B846F1}">
-                <asvg:svgBlip xmlns:asvg="http://schemas.microsoft.com/office/drawing/2016/SVG/main" r:embed="rId10"/>
+                <asvg:svgBlip xmlns:asvg="http://schemas.microsoft.com/office/drawing/2016/SVG/main" r:embed="rId11"/>
               </a:ext>
             </a:extLst>
           </a:blip>
@@ -13170,13 +15591,13 @@
               <p:nvPr/>
             </p:nvPicPr>
             <p:blipFill>
-              <a:blip r:embed="rId11">
+              <a:blip r:embed="rId12">
                 <a:extLst>
                   <a:ext uri="{28A0092B-C50C-407E-A947-70E740481C1C}">
                     <a14:useLocalDpi xmlns:a14="http://schemas.microsoft.com/office/drawing/2010/main" val="0"/>
                   </a:ext>
                   <a:ext uri="{96DAC541-7B7A-43D3-8B79-37D633B846F1}">
-                    <asvg:svgBlip xmlns:asvg="http://schemas.microsoft.com/office/drawing/2016/SVG/main" r:embed="rId12"/>
+                    <asvg:svgBlip xmlns:asvg="http://schemas.microsoft.com/office/drawing/2016/SVG/main" r:embed="rId13"/>
                   </a:ext>
                 </a:extLst>
               </a:blip>
@@ -13209,13 +15630,13 @@
               <p:nvPr/>
             </p:nvPicPr>
             <p:blipFill>
-              <a:blip r:embed="rId13">
+              <a:blip r:embed="rId14">
                 <a:extLst>
                   <a:ext uri="{28A0092B-C50C-407E-A947-70E740481C1C}">
                     <a14:useLocalDpi xmlns:a14="http://schemas.microsoft.com/office/drawing/2010/main" val="0"/>
                   </a:ext>
                   <a:ext uri="{96DAC541-7B7A-43D3-8B79-37D633B846F1}">
-                    <asvg:svgBlip xmlns:asvg="http://schemas.microsoft.com/office/drawing/2016/SVG/main" r:embed="rId14"/>
+                    <asvg:svgBlip xmlns:asvg="http://schemas.microsoft.com/office/drawing/2016/SVG/main" r:embed="rId15"/>
                   </a:ext>
                 </a:extLst>
               </a:blip>
@@ -13272,13 +15693,13 @@
               <p:nvPr/>
             </p:nvPicPr>
             <p:blipFill>
-              <a:blip r:embed="rId15">
+              <a:blip r:embed="rId16">
                 <a:extLst>
                   <a:ext uri="{28A0092B-C50C-407E-A947-70E740481C1C}">
                     <a14:useLocalDpi xmlns:a14="http://schemas.microsoft.com/office/drawing/2010/main" val="0"/>
                   </a:ext>
                   <a:ext uri="{96DAC541-7B7A-43D3-8B79-37D633B846F1}">
-                    <asvg:svgBlip xmlns:asvg="http://schemas.microsoft.com/office/drawing/2016/SVG/main" r:embed="rId16"/>
+                    <asvg:svgBlip xmlns:asvg="http://schemas.microsoft.com/office/drawing/2016/SVG/main" r:embed="rId17"/>
                   </a:ext>
                 </a:extLst>
               </a:blip>
@@ -13311,13 +15732,13 @@
               <p:nvPr/>
             </p:nvPicPr>
             <p:blipFill>
-              <a:blip r:embed="rId17">
+              <a:blip r:embed="rId18">
                 <a:extLst>
                   <a:ext uri="{28A0092B-C50C-407E-A947-70E740481C1C}">
                     <a14:useLocalDpi xmlns:a14="http://schemas.microsoft.com/office/drawing/2010/main" val="0"/>
                   </a:ext>
                   <a:ext uri="{96DAC541-7B7A-43D3-8B79-37D633B846F1}">
-                    <asvg:svgBlip xmlns:asvg="http://schemas.microsoft.com/office/drawing/2016/SVG/main" r:embed="rId18"/>
+                    <asvg:svgBlip xmlns:asvg="http://schemas.microsoft.com/office/drawing/2016/SVG/main" r:embed="rId19"/>
                   </a:ext>
                 </a:extLst>
               </a:blip>
@@ -13490,7 +15911,7 @@
           <p:nvPr/>
         </p:nvPicPr>
         <p:blipFill>
-          <a:blip r:embed="rId2">
+          <a:blip r:embed="rId3">
             <a:extLst>
               <a:ext uri="{28A0092B-C50C-407E-A947-70E740481C1C}">
                 <a14:useLocalDpi xmlns:a14="http://schemas.microsoft.com/office/drawing/2010/main" val="0"/>
@@ -13526,13 +15947,13 @@
           <p:nvPr/>
         </p:nvPicPr>
         <p:blipFill>
-          <a:blip r:embed="rId3">
+          <a:blip r:embed="rId4">
             <a:extLst>
               <a:ext uri="{28A0092B-C50C-407E-A947-70E740481C1C}">
                 <a14:useLocalDpi xmlns:a14="http://schemas.microsoft.com/office/drawing/2010/main" val="0"/>
               </a:ext>
               <a:ext uri="{96DAC541-7B7A-43D3-8B79-37D633B846F1}">
-                <asvg:svgBlip xmlns:asvg="http://schemas.microsoft.com/office/drawing/2016/SVG/main" r:embed="rId4"/>
+                <asvg:svgBlip xmlns:asvg="http://schemas.microsoft.com/office/drawing/2016/SVG/main" r:embed="rId5"/>
               </a:ext>
             </a:extLst>
           </a:blip>
@@ -13565,13 +15986,13 @@
           <p:nvPr/>
         </p:nvPicPr>
         <p:blipFill>
-          <a:blip r:embed="rId5">
+          <a:blip r:embed="rId6">
             <a:extLst>
               <a:ext uri="{28A0092B-C50C-407E-A947-70E740481C1C}">
                 <a14:useLocalDpi xmlns:a14="http://schemas.microsoft.com/office/drawing/2010/main" val="0"/>
               </a:ext>
               <a:ext uri="{96DAC541-7B7A-43D3-8B79-37D633B846F1}">
-                <asvg:svgBlip xmlns:asvg="http://schemas.microsoft.com/office/drawing/2016/SVG/main" r:embed="rId6"/>
+                <asvg:svgBlip xmlns:asvg="http://schemas.microsoft.com/office/drawing/2016/SVG/main" r:embed="rId7"/>
               </a:ext>
             </a:extLst>
           </a:blip>
@@ -13604,13 +16025,13 @@
           <p:nvPr/>
         </p:nvPicPr>
         <p:blipFill>
-          <a:blip r:embed="rId7">
+          <a:blip r:embed="rId8">
             <a:extLst>
               <a:ext uri="{28A0092B-C50C-407E-A947-70E740481C1C}">
                 <a14:useLocalDpi xmlns:a14="http://schemas.microsoft.com/office/drawing/2010/main" val="0"/>
               </a:ext>
               <a:ext uri="{96DAC541-7B7A-43D3-8B79-37D633B846F1}">
-                <asvg:svgBlip xmlns:asvg="http://schemas.microsoft.com/office/drawing/2016/SVG/main" r:embed="rId8"/>
+                <asvg:svgBlip xmlns:asvg="http://schemas.microsoft.com/office/drawing/2016/SVG/main" r:embed="rId9"/>
               </a:ext>
             </a:extLst>
           </a:blip>
@@ -13643,13 +16064,13 @@
           <p:nvPr/>
         </p:nvPicPr>
         <p:blipFill>
-          <a:blip r:embed="rId9">
+          <a:blip r:embed="rId10">
             <a:extLst>
               <a:ext uri="{28A0092B-C50C-407E-A947-70E740481C1C}">
                 <a14:useLocalDpi xmlns:a14="http://schemas.microsoft.com/office/drawing/2010/main" val="0"/>
               </a:ext>
               <a:ext uri="{96DAC541-7B7A-43D3-8B79-37D633B846F1}">
-                <asvg:svgBlip xmlns:asvg="http://schemas.microsoft.com/office/drawing/2016/SVG/main" r:embed="rId10"/>
+                <asvg:svgBlip xmlns:asvg="http://schemas.microsoft.com/office/drawing/2016/SVG/main" r:embed="rId11"/>
               </a:ext>
             </a:extLst>
           </a:blip>
@@ -13682,13 +16103,13 @@
           <p:nvPr/>
         </p:nvPicPr>
         <p:blipFill>
-          <a:blip r:embed="rId11">
+          <a:blip r:embed="rId12">
             <a:extLst>
               <a:ext uri="{28A0092B-C50C-407E-A947-70E740481C1C}">
                 <a14:useLocalDpi xmlns:a14="http://schemas.microsoft.com/office/drawing/2010/main" val="0"/>
               </a:ext>
               <a:ext uri="{96DAC541-7B7A-43D3-8B79-37D633B846F1}">
-                <asvg:svgBlip xmlns:asvg="http://schemas.microsoft.com/office/drawing/2016/SVG/main" r:embed="rId12"/>
+                <asvg:svgBlip xmlns:asvg="http://schemas.microsoft.com/office/drawing/2016/SVG/main" r:embed="rId13"/>
               </a:ext>
             </a:extLst>
           </a:blip>
@@ -13918,13 +16339,13 @@
             <p:nvPr/>
           </p:nvPicPr>
           <p:blipFill>
-            <a:blip r:embed="rId5">
+            <a:blip r:embed="rId6">
               <a:extLst>
                 <a:ext uri="{28A0092B-C50C-407E-A947-70E740481C1C}">
                   <a14:useLocalDpi xmlns:a14="http://schemas.microsoft.com/office/drawing/2010/main" val="0"/>
                 </a:ext>
                 <a:ext uri="{96DAC541-7B7A-43D3-8B79-37D633B846F1}">
-                  <asvg:svgBlip xmlns:asvg="http://schemas.microsoft.com/office/drawing/2016/SVG/main" r:embed="rId6"/>
+                  <asvg:svgBlip xmlns:asvg="http://schemas.microsoft.com/office/drawing/2016/SVG/main" r:embed="rId7"/>
                 </a:ext>
               </a:extLst>
             </a:blip>
@@ -13957,13 +16378,13 @@
             <p:nvPr/>
           </p:nvPicPr>
           <p:blipFill>
-            <a:blip r:embed="rId5">
+            <a:blip r:embed="rId6">
               <a:extLst>
                 <a:ext uri="{28A0092B-C50C-407E-A947-70E740481C1C}">
                   <a14:useLocalDpi xmlns:a14="http://schemas.microsoft.com/office/drawing/2010/main" val="0"/>
                 </a:ext>
                 <a:ext uri="{96DAC541-7B7A-43D3-8B79-37D633B846F1}">
-                  <asvg:svgBlip xmlns:asvg="http://schemas.microsoft.com/office/drawing/2016/SVG/main" r:embed="rId6"/>
+                  <asvg:svgBlip xmlns:asvg="http://schemas.microsoft.com/office/drawing/2016/SVG/main" r:embed="rId7"/>
                 </a:ext>
               </a:extLst>
             </a:blip>
@@ -13996,13 +16417,13 @@
             <p:nvPr/>
           </p:nvPicPr>
           <p:blipFill>
-            <a:blip r:embed="rId5">
+            <a:blip r:embed="rId6">
               <a:extLst>
                 <a:ext uri="{28A0092B-C50C-407E-A947-70E740481C1C}">
                   <a14:useLocalDpi xmlns:a14="http://schemas.microsoft.com/office/drawing/2010/main" val="0"/>
                 </a:ext>
                 <a:ext uri="{96DAC541-7B7A-43D3-8B79-37D633B846F1}">
-                  <asvg:svgBlip xmlns:asvg="http://schemas.microsoft.com/office/drawing/2016/SVG/main" r:embed="rId6"/>
+                  <asvg:svgBlip xmlns:asvg="http://schemas.microsoft.com/office/drawing/2016/SVG/main" r:embed="rId7"/>
                 </a:ext>
               </a:extLst>
             </a:blip>
@@ -14036,13 +16457,13 @@
           <p:nvPr/>
         </p:nvPicPr>
         <p:blipFill>
-          <a:blip r:embed="rId13">
+          <a:blip r:embed="rId14">
             <a:extLst>
               <a:ext uri="{28A0092B-C50C-407E-A947-70E740481C1C}">
                 <a14:useLocalDpi xmlns:a14="http://schemas.microsoft.com/office/drawing/2010/main" val="0"/>
               </a:ext>
               <a:ext uri="{96DAC541-7B7A-43D3-8B79-37D633B846F1}">
-                <asvg:svgBlip xmlns:asvg="http://schemas.microsoft.com/office/drawing/2016/SVG/main" r:embed="rId14"/>
+                <asvg:svgBlip xmlns:asvg="http://schemas.microsoft.com/office/drawing/2016/SVG/main" r:embed="rId15"/>
               </a:ext>
             </a:extLst>
           </a:blip>
@@ -14075,13 +16496,13 @@
           <p:nvPr/>
         </p:nvPicPr>
         <p:blipFill>
-          <a:blip r:embed="rId15">
+          <a:blip r:embed="rId16">
             <a:extLst>
               <a:ext uri="{28A0092B-C50C-407E-A947-70E740481C1C}">
                 <a14:useLocalDpi xmlns:a14="http://schemas.microsoft.com/office/drawing/2010/main" val="0"/>
               </a:ext>
               <a:ext uri="{96DAC541-7B7A-43D3-8B79-37D633B846F1}">
-                <asvg:svgBlip xmlns:asvg="http://schemas.microsoft.com/office/drawing/2016/SVG/main" r:embed="rId16"/>
+                <asvg:svgBlip xmlns:asvg="http://schemas.microsoft.com/office/drawing/2016/SVG/main" r:embed="rId17"/>
               </a:ext>
             </a:extLst>
           </a:blip>
@@ -14114,13 +16535,13 @@
           <p:nvPr/>
         </p:nvPicPr>
         <p:blipFill>
-          <a:blip r:embed="rId17">
+          <a:blip r:embed="rId18">
             <a:extLst>
               <a:ext uri="{28A0092B-C50C-407E-A947-70E740481C1C}">
                 <a14:useLocalDpi xmlns:a14="http://schemas.microsoft.com/office/drawing/2010/main" val="0"/>
               </a:ext>
               <a:ext uri="{96DAC541-7B7A-43D3-8B79-37D633B846F1}">
-                <asvg:svgBlip xmlns:asvg="http://schemas.microsoft.com/office/drawing/2016/SVG/main" r:embed="rId18"/>
+                <asvg:svgBlip xmlns:asvg="http://schemas.microsoft.com/office/drawing/2016/SVG/main" r:embed="rId19"/>
               </a:ext>
             </a:extLst>
           </a:blip>
@@ -16156,13 +18577,13 @@
             <p:nvPr/>
           </p:nvPicPr>
           <p:blipFill>
-            <a:blip r:embed="rId19">
+            <a:blip r:embed="rId20">
               <a:extLst>
                 <a:ext uri="{28A0092B-C50C-407E-A947-70E740481C1C}">
                   <a14:useLocalDpi xmlns:a14="http://schemas.microsoft.com/office/drawing/2010/main" val="0"/>
                 </a:ext>
                 <a:ext uri="{96DAC541-7B7A-43D3-8B79-37D633B846F1}">
-                  <asvg:svgBlip xmlns:asvg="http://schemas.microsoft.com/office/drawing/2016/SVG/main" r:embed="rId20"/>
+                  <asvg:svgBlip xmlns:asvg="http://schemas.microsoft.com/office/drawing/2016/SVG/main" r:embed="rId21"/>
                 </a:ext>
               </a:extLst>
             </a:blip>
@@ -16195,13 +18616,13 @@
             <p:nvPr/>
           </p:nvPicPr>
           <p:blipFill>
-            <a:blip r:embed="rId21">
+            <a:blip r:embed="rId22">
               <a:extLst>
                 <a:ext uri="{28A0092B-C50C-407E-A947-70E740481C1C}">
                   <a14:useLocalDpi xmlns:a14="http://schemas.microsoft.com/office/drawing/2010/main" val="0"/>
                 </a:ext>
                 <a:ext uri="{96DAC541-7B7A-43D3-8B79-37D633B846F1}">
-                  <asvg:svgBlip xmlns:asvg="http://schemas.microsoft.com/office/drawing/2016/SVG/main" r:embed="rId22"/>
+                  <asvg:svgBlip xmlns:asvg="http://schemas.microsoft.com/office/drawing/2016/SVG/main" r:embed="rId23"/>
                 </a:ext>
               </a:extLst>
             </a:blip>
@@ -16598,13 +19019,13 @@
           <p:nvPr/>
         </p:nvPicPr>
         <p:blipFill>
-          <a:blip r:embed="rId23">
+          <a:blip r:embed="rId24">
             <a:extLst>
               <a:ext uri="{28A0092B-C50C-407E-A947-70E740481C1C}">
                 <a14:useLocalDpi xmlns:a14="http://schemas.microsoft.com/office/drawing/2010/main" val="0"/>
               </a:ext>
               <a:ext uri="{96DAC541-7B7A-43D3-8B79-37D633B846F1}">
-                <asvg:svgBlip xmlns:asvg="http://schemas.microsoft.com/office/drawing/2016/SVG/main" r:embed="rId24"/>
+                <asvg:svgBlip xmlns:asvg="http://schemas.microsoft.com/office/drawing/2016/SVG/main" r:embed="rId25"/>
               </a:ext>
             </a:extLst>
           </a:blip>
@@ -16637,13 +19058,13 @@
           <p:nvPr/>
         </p:nvPicPr>
         <p:blipFill>
-          <a:blip r:embed="rId25">
+          <a:blip r:embed="rId26">
             <a:extLst>
               <a:ext uri="{28A0092B-C50C-407E-A947-70E740481C1C}">
                 <a14:useLocalDpi xmlns:a14="http://schemas.microsoft.com/office/drawing/2010/main" val="0"/>
               </a:ext>
               <a:ext uri="{96DAC541-7B7A-43D3-8B79-37D633B846F1}">
-                <asvg:svgBlip xmlns:asvg="http://schemas.microsoft.com/office/drawing/2016/SVG/main" r:embed="rId26"/>
+                <asvg:svgBlip xmlns:asvg="http://schemas.microsoft.com/office/drawing/2016/SVG/main" r:embed="rId27"/>
               </a:ext>
             </a:extLst>
           </a:blip>
@@ -17770,13 +20191,13 @@
             <p:nvPr/>
           </p:nvPicPr>
           <p:blipFill>
-            <a:blip r:embed="rId25">
+            <a:blip r:embed="rId26">
               <a:extLst>
                 <a:ext uri="{28A0092B-C50C-407E-A947-70E740481C1C}">
                   <a14:useLocalDpi xmlns:a14="http://schemas.microsoft.com/office/drawing/2010/main" val="0"/>
                 </a:ext>
                 <a:ext uri="{96DAC541-7B7A-43D3-8B79-37D633B846F1}">
-                  <asvg:svgBlip xmlns:asvg="http://schemas.microsoft.com/office/drawing/2016/SVG/main" r:embed="rId26"/>
+                  <asvg:svgBlip xmlns:asvg="http://schemas.microsoft.com/office/drawing/2016/SVG/main" r:embed="rId27"/>
                 </a:ext>
               </a:extLst>
             </a:blip>
@@ -17809,13 +20230,13 @@
             <p:nvPr/>
           </p:nvPicPr>
           <p:blipFill>
-            <a:blip r:embed="rId25">
+            <a:blip r:embed="rId26">
               <a:extLst>
                 <a:ext uri="{28A0092B-C50C-407E-A947-70E740481C1C}">
                   <a14:useLocalDpi xmlns:a14="http://schemas.microsoft.com/office/drawing/2010/main" val="0"/>
                 </a:ext>
                 <a:ext uri="{96DAC541-7B7A-43D3-8B79-37D633B846F1}">
-                  <asvg:svgBlip xmlns:asvg="http://schemas.microsoft.com/office/drawing/2016/SVG/main" r:embed="rId26"/>
+                  <asvg:svgBlip xmlns:asvg="http://schemas.microsoft.com/office/drawing/2016/SVG/main" r:embed="rId27"/>
                 </a:ext>
               </a:extLst>
             </a:blip>
@@ -17848,13 +20269,13 @@
             <p:nvPr/>
           </p:nvPicPr>
           <p:blipFill>
-            <a:blip r:embed="rId25">
+            <a:blip r:embed="rId26">
               <a:extLst>
                 <a:ext uri="{28A0092B-C50C-407E-A947-70E740481C1C}">
                   <a14:useLocalDpi xmlns:a14="http://schemas.microsoft.com/office/drawing/2010/main" val="0"/>
                 </a:ext>
                 <a:ext uri="{96DAC541-7B7A-43D3-8B79-37D633B846F1}">
-                  <asvg:svgBlip xmlns:asvg="http://schemas.microsoft.com/office/drawing/2016/SVG/main" r:embed="rId26"/>
+                  <asvg:svgBlip xmlns:asvg="http://schemas.microsoft.com/office/drawing/2016/SVG/main" r:embed="rId27"/>
                 </a:ext>
               </a:extLst>
             </a:blip>
@@ -17934,7 +20355,7 @@
           <p:nvPr/>
         </p:nvPicPr>
         <p:blipFill>
-          <a:blip r:embed="rId2">
+          <a:blip r:embed="rId3">
             <a:extLst>
               <a:ext uri="{28A0092B-C50C-407E-A947-70E740481C1C}">
                 <a14:useLocalDpi xmlns:a14="http://schemas.microsoft.com/office/drawing/2010/main" val="0"/>
@@ -17970,13 +20391,13 @@
           <p:nvPr/>
         </p:nvPicPr>
         <p:blipFill>
-          <a:blip r:embed="rId3">
+          <a:blip r:embed="rId4">
             <a:extLst>
               <a:ext uri="{28A0092B-C50C-407E-A947-70E740481C1C}">
                 <a14:useLocalDpi xmlns:a14="http://schemas.microsoft.com/office/drawing/2010/main" val="0"/>
               </a:ext>
               <a:ext uri="{96DAC541-7B7A-43D3-8B79-37D633B846F1}">
-                <asvg:svgBlip xmlns:asvg="http://schemas.microsoft.com/office/drawing/2016/SVG/main" r:embed="rId4"/>
+                <asvg:svgBlip xmlns:asvg="http://schemas.microsoft.com/office/drawing/2016/SVG/main" r:embed="rId5"/>
               </a:ext>
             </a:extLst>
           </a:blip>
@@ -18009,13 +20430,13 @@
           <p:nvPr/>
         </p:nvPicPr>
         <p:blipFill>
-          <a:blip r:embed="rId5">
+          <a:blip r:embed="rId6">
             <a:extLst>
               <a:ext uri="{28A0092B-C50C-407E-A947-70E740481C1C}">
                 <a14:useLocalDpi xmlns:a14="http://schemas.microsoft.com/office/drawing/2010/main" val="0"/>
               </a:ext>
               <a:ext uri="{96DAC541-7B7A-43D3-8B79-37D633B846F1}">
-                <asvg:svgBlip xmlns:asvg="http://schemas.microsoft.com/office/drawing/2016/SVG/main" r:embed="rId6"/>
+                <asvg:svgBlip xmlns:asvg="http://schemas.microsoft.com/office/drawing/2016/SVG/main" r:embed="rId7"/>
               </a:ext>
             </a:extLst>
           </a:blip>
@@ -22206,4 +24627,609 @@
     </a:ext>
   </a:extLst>
 </a:theme>
+</file>
+
+<file path=ppt/theme/theme2.xml><?xml version="1.0" encoding="utf-8"?>
+<a:theme xmlns:a="http://schemas.openxmlformats.org/drawingml/2006/main" name="Office Theme">
+  <a:themeElements>
+    <a:clrScheme name="Office">
+      <a:dk1>
+        <a:sysClr val="windowText" lastClr="000000"/>
+      </a:dk1>
+      <a:lt1>
+        <a:sysClr val="window" lastClr="FFFFFF"/>
+      </a:lt1>
+      <a:dk2>
+        <a:srgbClr val="44546A"/>
+      </a:dk2>
+      <a:lt2>
+        <a:srgbClr val="E7E6E6"/>
+      </a:lt2>
+      <a:accent1>
+        <a:srgbClr val="4472C4"/>
+      </a:accent1>
+      <a:accent2>
+        <a:srgbClr val="ED7D31"/>
+      </a:accent2>
+      <a:accent3>
+        <a:srgbClr val="A5A5A5"/>
+      </a:accent3>
+      <a:accent4>
+        <a:srgbClr val="FFC000"/>
+      </a:accent4>
+      <a:accent5>
+        <a:srgbClr val="5B9BD5"/>
+      </a:accent5>
+      <a:accent6>
+        <a:srgbClr val="70AD47"/>
+      </a:accent6>
+      <a:hlink>
+        <a:srgbClr val="0563C1"/>
+      </a:hlink>
+      <a:folHlink>
+        <a:srgbClr val="954F72"/>
+      </a:folHlink>
+    </a:clrScheme>
+    <a:fontScheme name="Office">
+      <a:majorFont>
+        <a:latin typeface="Calibri Light" panose="020F0302020204030204"/>
+        <a:ea typeface=""/>
+        <a:cs typeface=""/>
+        <a:font script="Jpan" typeface="游ゴシック Light"/>
+        <a:font script="Hang" typeface="맑은 고딕"/>
+        <a:font script="Hans" typeface="等线 Light"/>
+        <a:font script="Hant" typeface="新細明體"/>
+        <a:font script="Arab" typeface="Times New Roman"/>
+        <a:font script="Hebr" typeface="Times New Roman"/>
+        <a:font script="Thai" typeface="Angsana New"/>
+        <a:font script="Ethi" typeface="Nyala"/>
+        <a:font script="Beng" typeface="Vrinda"/>
+        <a:font script="Gujr" typeface="Shruti"/>
+        <a:font script="Khmr" typeface="MoolBoran"/>
+        <a:font script="Knda" typeface="Tunga"/>
+        <a:font script="Guru" typeface="Raavi"/>
+        <a:font script="Cans" typeface="Euphemia"/>
+        <a:font script="Cher" typeface="Plantagenet Cherokee"/>
+        <a:font script="Yiii" typeface="Microsoft Yi Baiti"/>
+        <a:font script="Tibt" typeface="Microsoft Himalaya"/>
+        <a:font script="Thaa" typeface="MV Boli"/>
+        <a:font script="Deva" typeface="Mangal"/>
+        <a:font script="Telu" typeface="Gautami"/>
+        <a:font script="Taml" typeface="Latha"/>
+        <a:font script="Syrc" typeface="Estrangelo Edessa"/>
+        <a:font script="Orya" typeface="Kalinga"/>
+        <a:font script="Mlym" typeface="Kartika"/>
+        <a:font script="Laoo" typeface="DokChampa"/>
+        <a:font script="Sinh" typeface="Iskoola Pota"/>
+        <a:font script="Mong" typeface="Mongolian Baiti"/>
+        <a:font script="Viet" typeface="Times New Roman"/>
+        <a:font script="Uigh" typeface="Microsoft Uighur"/>
+        <a:font script="Geor" typeface="Sylfaen"/>
+        <a:font script="Armn" typeface="Arial"/>
+        <a:font script="Bugi" typeface="Leelawadee UI"/>
+        <a:font script="Bopo" typeface="Microsoft JhengHei"/>
+        <a:font script="Java" typeface="Javanese Text"/>
+        <a:font script="Lisu" typeface="Segoe UI"/>
+        <a:font script="Mymr" typeface="Myanmar Text"/>
+        <a:font script="Nkoo" typeface="Ebrima"/>
+        <a:font script="Olck" typeface="Nirmala UI"/>
+        <a:font script="Osma" typeface="Ebrima"/>
+        <a:font script="Phag" typeface="Phagspa"/>
+        <a:font script="Syrn" typeface="Estrangelo Edessa"/>
+        <a:font script="Syrj" typeface="Estrangelo Edessa"/>
+        <a:font script="Syre" typeface="Estrangelo Edessa"/>
+        <a:font script="Sora" typeface="Nirmala UI"/>
+        <a:font script="Tale" typeface="Microsoft Tai Le"/>
+        <a:font script="Talu" typeface="Microsoft New Tai Lue"/>
+        <a:font script="Tfng" typeface="Ebrima"/>
+      </a:majorFont>
+      <a:minorFont>
+        <a:latin typeface="Calibri" panose="020F0502020204030204"/>
+        <a:ea typeface=""/>
+        <a:cs typeface=""/>
+        <a:font script="Jpan" typeface="游ゴシック"/>
+        <a:font script="Hang" typeface="맑은 고딕"/>
+        <a:font script="Hans" typeface="等线"/>
+        <a:font script="Hant" typeface="新細明體"/>
+        <a:font script="Arab" typeface="Arial"/>
+        <a:font script="Hebr" typeface="Arial"/>
+        <a:font script="Thai" typeface="Cordia New"/>
+        <a:font script="Ethi" typeface="Nyala"/>
+        <a:font script="Beng" typeface="Vrinda"/>
+        <a:font script="Gujr" typeface="Shruti"/>
+        <a:font script="Khmr" typeface="DaunPenh"/>
+        <a:font script="Knda" typeface="Tunga"/>
+        <a:font script="Guru" typeface="Raavi"/>
+        <a:font script="Cans" typeface="Euphemia"/>
+        <a:font script="Cher" typeface="Plantagenet Cherokee"/>
+        <a:font script="Yiii" typeface="Microsoft Yi Baiti"/>
+        <a:font script="Tibt" typeface="Microsoft Himalaya"/>
+        <a:font script="Thaa" typeface="MV Boli"/>
+        <a:font script="Deva" typeface="Mangal"/>
+        <a:font script="Telu" typeface="Gautami"/>
+        <a:font script="Taml" typeface="Latha"/>
+        <a:font script="Syrc" typeface="Estrangelo Edessa"/>
+        <a:font script="Orya" typeface="Kalinga"/>
+        <a:font script="Mlym" typeface="Kartika"/>
+        <a:font script="Laoo" typeface="DokChampa"/>
+        <a:font script="Sinh" typeface="Iskoola Pota"/>
+        <a:font script="Mong" typeface="Mongolian Baiti"/>
+        <a:font script="Viet" typeface="Arial"/>
+        <a:font script="Uigh" typeface="Microsoft Uighur"/>
+        <a:font script="Geor" typeface="Sylfaen"/>
+        <a:font script="Armn" typeface="Arial"/>
+        <a:font script="Bugi" typeface="Leelawadee UI"/>
+        <a:font script="Bopo" typeface="Microsoft JhengHei"/>
+        <a:font script="Java" typeface="Javanese Text"/>
+        <a:font script="Lisu" typeface="Segoe UI"/>
+        <a:font script="Mymr" typeface="Myanmar Text"/>
+        <a:font script="Nkoo" typeface="Ebrima"/>
+        <a:font script="Olck" typeface="Nirmala UI"/>
+        <a:font script="Osma" typeface="Ebrima"/>
+        <a:font script="Phag" typeface="Phagspa"/>
+        <a:font script="Syrn" typeface="Estrangelo Edessa"/>
+        <a:font script="Syrj" typeface="Estrangelo Edessa"/>
+        <a:font script="Syre" typeface="Estrangelo Edessa"/>
+        <a:font script="Sora" typeface="Nirmala UI"/>
+        <a:font script="Tale" typeface="Microsoft Tai Le"/>
+        <a:font script="Talu" typeface="Microsoft New Tai Lue"/>
+        <a:font script="Tfng" typeface="Ebrima"/>
+      </a:minorFont>
+    </a:fontScheme>
+    <a:fmtScheme name="Office">
+      <a:fillStyleLst>
+        <a:solidFill>
+          <a:schemeClr val="phClr"/>
+        </a:solidFill>
+        <a:gradFill rotWithShape="1">
+          <a:gsLst>
+            <a:gs pos="0">
+              <a:schemeClr val="phClr">
+                <a:lumMod val="110000"/>
+                <a:satMod val="105000"/>
+                <a:tint val="67000"/>
+              </a:schemeClr>
+            </a:gs>
+            <a:gs pos="50000">
+              <a:schemeClr val="phClr">
+                <a:lumMod val="105000"/>
+                <a:satMod val="103000"/>
+                <a:tint val="73000"/>
+              </a:schemeClr>
+            </a:gs>
+            <a:gs pos="100000">
+              <a:schemeClr val="phClr">
+                <a:lumMod val="105000"/>
+                <a:satMod val="109000"/>
+                <a:tint val="81000"/>
+              </a:schemeClr>
+            </a:gs>
+          </a:gsLst>
+          <a:lin ang="5400000" scaled="0"/>
+        </a:gradFill>
+        <a:gradFill rotWithShape="1">
+          <a:gsLst>
+            <a:gs pos="0">
+              <a:schemeClr val="phClr">
+                <a:satMod val="103000"/>
+                <a:lumMod val="102000"/>
+                <a:tint val="94000"/>
+              </a:schemeClr>
+            </a:gs>
+            <a:gs pos="50000">
+              <a:schemeClr val="phClr">
+                <a:satMod val="110000"/>
+                <a:lumMod val="100000"/>
+                <a:shade val="100000"/>
+              </a:schemeClr>
+            </a:gs>
+            <a:gs pos="100000">
+              <a:schemeClr val="phClr">
+                <a:lumMod val="99000"/>
+                <a:satMod val="120000"/>
+                <a:shade val="78000"/>
+              </a:schemeClr>
+            </a:gs>
+          </a:gsLst>
+          <a:lin ang="5400000" scaled="0"/>
+        </a:gradFill>
+      </a:fillStyleLst>
+      <a:lnStyleLst>
+        <a:ln w="6350" cap="flat" cmpd="sng" algn="ctr">
+          <a:solidFill>
+            <a:schemeClr val="phClr"/>
+          </a:solidFill>
+          <a:prstDash val="solid"/>
+          <a:miter lim="800000"/>
+        </a:ln>
+        <a:ln w="12700" cap="flat" cmpd="sng" algn="ctr">
+          <a:solidFill>
+            <a:schemeClr val="phClr"/>
+          </a:solidFill>
+          <a:prstDash val="solid"/>
+          <a:miter lim="800000"/>
+        </a:ln>
+        <a:ln w="19050" cap="flat" cmpd="sng" algn="ctr">
+          <a:solidFill>
+            <a:schemeClr val="phClr"/>
+          </a:solidFill>
+          <a:prstDash val="solid"/>
+          <a:miter lim="800000"/>
+        </a:ln>
+      </a:lnStyleLst>
+      <a:effectStyleLst>
+        <a:effectStyle>
+          <a:effectLst/>
+        </a:effectStyle>
+        <a:effectStyle>
+          <a:effectLst/>
+        </a:effectStyle>
+        <a:effectStyle>
+          <a:effectLst>
+            <a:outerShdw blurRad="57150" dist="19050" dir="5400000" algn="ctr" rotWithShape="0">
+              <a:srgbClr val="000000">
+                <a:alpha val="63000"/>
+              </a:srgbClr>
+            </a:outerShdw>
+          </a:effectLst>
+        </a:effectStyle>
+      </a:effectStyleLst>
+      <a:bgFillStyleLst>
+        <a:solidFill>
+          <a:schemeClr val="phClr"/>
+        </a:solidFill>
+        <a:solidFill>
+          <a:schemeClr val="phClr">
+            <a:tint val="95000"/>
+            <a:satMod val="170000"/>
+          </a:schemeClr>
+        </a:solidFill>
+        <a:gradFill rotWithShape="1">
+          <a:gsLst>
+            <a:gs pos="0">
+              <a:schemeClr val="phClr">
+                <a:tint val="93000"/>
+                <a:satMod val="150000"/>
+                <a:shade val="98000"/>
+                <a:lumMod val="102000"/>
+              </a:schemeClr>
+            </a:gs>
+            <a:gs pos="50000">
+              <a:schemeClr val="phClr">
+                <a:tint val="98000"/>
+                <a:satMod val="130000"/>
+                <a:shade val="90000"/>
+                <a:lumMod val="103000"/>
+              </a:schemeClr>
+            </a:gs>
+            <a:gs pos="100000">
+              <a:schemeClr val="phClr">
+                <a:shade val="63000"/>
+                <a:satMod val="120000"/>
+              </a:schemeClr>
+            </a:gs>
+          </a:gsLst>
+          <a:lin ang="5400000" scaled="0"/>
+        </a:gradFill>
+      </a:bgFillStyleLst>
+    </a:fmtScheme>
+  </a:themeElements>
+  <a:objectDefaults/>
+  <a:extraClrSchemeLst/>
+  <a:extLst>
+    <a:ext uri="{05A4C25C-085E-4340-85A3-A5531E510DB2}">
+      <thm15:themeFamily xmlns:thm15="http://schemas.microsoft.com/office/thememl/2012/main" name="Office Theme" id="{62F939B6-93AF-4DB8-9C6B-D6C7DFDC589F}" vid="{4A3C46E8-61CC-4603-A589-7422A47A8E4A}"/>
+    </a:ext>
+  </a:extLst>
+</a:theme>
+</file>
+
+<file path=ppt/theme/theme3.xml><?xml version="1.0" encoding="utf-8"?>
+<a:theme xmlns:a="http://schemas.openxmlformats.org/drawingml/2006/main" name="Office Theme">
+  <a:themeElements>
+    <a:clrScheme name="Office">
+      <a:dk1>
+        <a:sysClr val="windowText" lastClr="000000"/>
+      </a:dk1>
+      <a:lt1>
+        <a:sysClr val="window" lastClr="FFFFFF"/>
+      </a:lt1>
+      <a:dk2>
+        <a:srgbClr val="44546A"/>
+      </a:dk2>
+      <a:lt2>
+        <a:srgbClr val="E7E6E6"/>
+      </a:lt2>
+      <a:accent1>
+        <a:srgbClr val="4472C4"/>
+      </a:accent1>
+      <a:accent2>
+        <a:srgbClr val="ED7D31"/>
+      </a:accent2>
+      <a:accent3>
+        <a:srgbClr val="A5A5A5"/>
+      </a:accent3>
+      <a:accent4>
+        <a:srgbClr val="FFC000"/>
+      </a:accent4>
+      <a:accent5>
+        <a:srgbClr val="5B9BD5"/>
+      </a:accent5>
+      <a:accent6>
+        <a:srgbClr val="70AD47"/>
+      </a:accent6>
+      <a:hlink>
+        <a:srgbClr val="0563C1"/>
+      </a:hlink>
+      <a:folHlink>
+        <a:srgbClr val="954F72"/>
+      </a:folHlink>
+    </a:clrScheme>
+    <a:fontScheme name="Office">
+      <a:majorFont>
+        <a:latin typeface="Calibri Light" panose="020F0302020204030204"/>
+        <a:ea typeface=""/>
+        <a:cs typeface=""/>
+        <a:font script="Jpan" typeface="游ゴシック Light"/>
+        <a:font script="Hang" typeface="맑은 고딕"/>
+        <a:font script="Hans" typeface="等线 Light"/>
+        <a:font script="Hant" typeface="新細明體"/>
+        <a:font script="Arab" typeface="Times New Roman"/>
+        <a:font script="Hebr" typeface="Times New Roman"/>
+        <a:font script="Thai" typeface="Angsana New"/>
+        <a:font script="Ethi" typeface="Nyala"/>
+        <a:font script="Beng" typeface="Vrinda"/>
+        <a:font script="Gujr" typeface="Shruti"/>
+        <a:font script="Khmr" typeface="MoolBoran"/>
+        <a:font script="Knda" typeface="Tunga"/>
+        <a:font script="Guru" typeface="Raavi"/>
+        <a:font script="Cans" typeface="Euphemia"/>
+        <a:font script="Cher" typeface="Plantagenet Cherokee"/>
+        <a:font script="Yiii" typeface="Microsoft Yi Baiti"/>
+        <a:font script="Tibt" typeface="Microsoft Himalaya"/>
+        <a:font script="Thaa" typeface="MV Boli"/>
+        <a:font script="Deva" typeface="Mangal"/>
+        <a:font script="Telu" typeface="Gautami"/>
+        <a:font script="Taml" typeface="Latha"/>
+        <a:font script="Syrc" typeface="Estrangelo Edessa"/>
+        <a:font script="Orya" typeface="Kalinga"/>
+        <a:font script="Mlym" typeface="Kartika"/>
+        <a:font script="Laoo" typeface="DokChampa"/>
+        <a:font script="Sinh" typeface="Iskoola Pota"/>
+        <a:font script="Mong" typeface="Mongolian Baiti"/>
+        <a:font script="Viet" typeface="Times New Roman"/>
+        <a:font script="Uigh" typeface="Microsoft Uighur"/>
+        <a:font script="Geor" typeface="Sylfaen"/>
+        <a:font script="Armn" typeface="Arial"/>
+        <a:font script="Bugi" typeface="Leelawadee UI"/>
+        <a:font script="Bopo" typeface="Microsoft JhengHei"/>
+        <a:font script="Java" typeface="Javanese Text"/>
+        <a:font script="Lisu" typeface="Segoe UI"/>
+        <a:font script="Mymr" typeface="Myanmar Text"/>
+        <a:font script="Nkoo" typeface="Ebrima"/>
+        <a:font script="Olck" typeface="Nirmala UI"/>
+        <a:font script="Osma" typeface="Ebrima"/>
+        <a:font script="Phag" typeface="Phagspa"/>
+        <a:font script="Syrn" typeface="Estrangelo Edessa"/>
+        <a:font script="Syrj" typeface="Estrangelo Edessa"/>
+        <a:font script="Syre" typeface="Estrangelo Edessa"/>
+        <a:font script="Sora" typeface="Nirmala UI"/>
+        <a:font script="Tale" typeface="Microsoft Tai Le"/>
+        <a:font script="Talu" typeface="Microsoft New Tai Lue"/>
+        <a:font script="Tfng" typeface="Ebrima"/>
+      </a:majorFont>
+      <a:minorFont>
+        <a:latin typeface="Calibri" panose="020F0502020204030204"/>
+        <a:ea typeface=""/>
+        <a:cs typeface=""/>
+        <a:font script="Jpan" typeface="游ゴシック"/>
+        <a:font script="Hang" typeface="맑은 고딕"/>
+        <a:font script="Hans" typeface="等线"/>
+        <a:font script="Hant" typeface="新細明體"/>
+        <a:font script="Arab" typeface="Arial"/>
+        <a:font script="Hebr" typeface="Arial"/>
+        <a:font script="Thai" typeface="Cordia New"/>
+        <a:font script="Ethi" typeface="Nyala"/>
+        <a:font script="Beng" typeface="Vrinda"/>
+        <a:font script="Gujr" typeface="Shruti"/>
+        <a:font script="Khmr" typeface="DaunPenh"/>
+        <a:font script="Knda" typeface="Tunga"/>
+        <a:font script="Guru" typeface="Raavi"/>
+        <a:font script="Cans" typeface="Euphemia"/>
+        <a:font script="Cher" typeface="Plantagenet Cherokee"/>
+        <a:font script="Yiii" typeface="Microsoft Yi Baiti"/>
+        <a:font script="Tibt" typeface="Microsoft Himalaya"/>
+        <a:font script="Thaa" typeface="MV Boli"/>
+        <a:font script="Deva" typeface="Mangal"/>
+        <a:font script="Telu" typeface="Gautami"/>
+        <a:font script="Taml" typeface="Latha"/>
+        <a:font script="Syrc" typeface="Estrangelo Edessa"/>
+        <a:font script="Orya" typeface="Kalinga"/>
+        <a:font script="Mlym" typeface="Kartika"/>
+        <a:font script="Laoo" typeface="DokChampa"/>
+        <a:font script="Sinh" typeface="Iskoola Pota"/>
+        <a:font script="Mong" typeface="Mongolian Baiti"/>
+        <a:font script="Viet" typeface="Arial"/>
+        <a:font script="Uigh" typeface="Microsoft Uighur"/>
+        <a:font script="Geor" typeface="Sylfaen"/>
+        <a:font script="Armn" typeface="Arial"/>
+        <a:font script="Bugi" typeface="Leelawadee UI"/>
+        <a:font script="Bopo" typeface="Microsoft JhengHei"/>
+        <a:font script="Java" typeface="Javanese Text"/>
+        <a:font script="Lisu" typeface="Segoe UI"/>
+        <a:font script="Mymr" typeface="Myanmar Text"/>
+        <a:font script="Nkoo" typeface="Ebrima"/>
+        <a:font script="Olck" typeface="Nirmala UI"/>
+        <a:font script="Osma" typeface="Ebrima"/>
+        <a:font script="Phag" typeface="Phagspa"/>
+        <a:font script="Syrn" typeface="Estrangelo Edessa"/>
+        <a:font script="Syrj" typeface="Estrangelo Edessa"/>
+        <a:font script="Syre" typeface="Estrangelo Edessa"/>
+        <a:font script="Sora" typeface="Nirmala UI"/>
+        <a:font script="Tale" typeface="Microsoft Tai Le"/>
+        <a:font script="Talu" typeface="Microsoft New Tai Lue"/>
+        <a:font script="Tfng" typeface="Ebrima"/>
+      </a:minorFont>
+    </a:fontScheme>
+    <a:fmtScheme name="Office">
+      <a:fillStyleLst>
+        <a:solidFill>
+          <a:schemeClr val="phClr"/>
+        </a:solidFill>
+        <a:gradFill rotWithShape="1">
+          <a:gsLst>
+            <a:gs pos="0">
+              <a:schemeClr val="phClr">
+                <a:lumMod val="110000"/>
+                <a:satMod val="105000"/>
+                <a:tint val="67000"/>
+              </a:schemeClr>
+            </a:gs>
+            <a:gs pos="50000">
+              <a:schemeClr val="phClr">
+                <a:lumMod val="105000"/>
+                <a:satMod val="103000"/>
+                <a:tint val="73000"/>
+              </a:schemeClr>
+            </a:gs>
+            <a:gs pos="100000">
+              <a:schemeClr val="phClr">
+                <a:lumMod val="105000"/>
+                <a:satMod val="109000"/>
+                <a:tint val="81000"/>
+              </a:schemeClr>
+            </a:gs>
+          </a:gsLst>
+          <a:lin ang="5400000" scaled="0"/>
+        </a:gradFill>
+        <a:gradFill rotWithShape="1">
+          <a:gsLst>
+            <a:gs pos="0">
+              <a:schemeClr val="phClr">
+                <a:satMod val="103000"/>
+                <a:lumMod val="102000"/>
+                <a:tint val="94000"/>
+              </a:schemeClr>
+            </a:gs>
+            <a:gs pos="50000">
+              <a:schemeClr val="phClr">
+                <a:satMod val="110000"/>
+                <a:lumMod val="100000"/>
+                <a:shade val="100000"/>
+              </a:schemeClr>
+            </a:gs>
+            <a:gs pos="100000">
+              <a:schemeClr val="phClr">
+                <a:lumMod val="99000"/>
+                <a:satMod val="120000"/>
+                <a:shade val="78000"/>
+              </a:schemeClr>
+            </a:gs>
+          </a:gsLst>
+          <a:lin ang="5400000" scaled="0"/>
+        </a:gradFill>
+      </a:fillStyleLst>
+      <a:lnStyleLst>
+        <a:ln w="6350" cap="flat" cmpd="sng" algn="ctr">
+          <a:solidFill>
+            <a:schemeClr val="phClr"/>
+          </a:solidFill>
+          <a:prstDash val="solid"/>
+          <a:miter lim="800000"/>
+        </a:ln>
+        <a:ln w="12700" cap="flat" cmpd="sng" algn="ctr">
+          <a:solidFill>
+            <a:schemeClr val="phClr"/>
+          </a:solidFill>
+          <a:prstDash val="solid"/>
+          <a:miter lim="800000"/>
+        </a:ln>
+        <a:ln w="19050" cap="flat" cmpd="sng" algn="ctr">
+          <a:solidFill>
+            <a:schemeClr val="phClr"/>
+          </a:solidFill>
+          <a:prstDash val="solid"/>
+          <a:miter lim="800000"/>
+        </a:ln>
+      </a:lnStyleLst>
+      <a:effectStyleLst>
+        <a:effectStyle>
+          <a:effectLst/>
+        </a:effectStyle>
+        <a:effectStyle>
+          <a:effectLst/>
+        </a:effectStyle>
+        <a:effectStyle>
+          <a:effectLst>
+            <a:outerShdw blurRad="57150" dist="19050" dir="5400000" algn="ctr" rotWithShape="0">
+              <a:srgbClr val="000000">
+                <a:alpha val="63000"/>
+              </a:srgbClr>
+            </a:outerShdw>
+          </a:effectLst>
+        </a:effectStyle>
+      </a:effectStyleLst>
+      <a:bgFillStyleLst>
+        <a:solidFill>
+          <a:schemeClr val="phClr"/>
+        </a:solidFill>
+        <a:solidFill>
+          <a:schemeClr val="phClr">
+            <a:tint val="95000"/>
+            <a:satMod val="170000"/>
+          </a:schemeClr>
+        </a:solidFill>
+        <a:gradFill rotWithShape="1">
+          <a:gsLst>
+            <a:gs pos="0">
+              <a:schemeClr val="phClr">
+                <a:tint val="93000"/>
+                <a:satMod val="150000"/>
+                <a:shade val="98000"/>
+                <a:lumMod val="102000"/>
+              </a:schemeClr>
+            </a:gs>
+            <a:gs pos="50000">
+              <a:schemeClr val="phClr">
+                <a:tint val="98000"/>
+                <a:satMod val="130000"/>
+                <a:shade val="90000"/>
+                <a:lumMod val="103000"/>
+              </a:schemeClr>
+            </a:gs>
+            <a:gs pos="100000">
+              <a:schemeClr val="phClr">
+                <a:shade val="63000"/>
+                <a:satMod val="120000"/>
+              </a:schemeClr>
+            </a:gs>
+          </a:gsLst>
+          <a:lin ang="5400000" scaled="0"/>
+        </a:gradFill>
+      </a:bgFillStyleLst>
+    </a:fmtScheme>
+  </a:themeElements>
+  <a:objectDefaults/>
+  <a:extraClrSchemeLst/>
+  <a:extLst>
+    <a:ext uri="{05A4C25C-085E-4340-85A3-A5531E510DB2}">
+      <thm15:themeFamily xmlns:thm15="http://schemas.microsoft.com/office/thememl/2012/main" name="Office Theme" id="{62F939B6-93AF-4DB8-9C6B-D6C7DFDC589F}" vid="{4A3C46E8-61CC-4603-A589-7422A47A8E4A}"/>
+    </a:ext>
+  </a:extLst>
+</a:theme>
+</file>
+
+<file path=customXml/item1.xml><?xml version="1.0" encoding="utf-8"?>
+<sisl xmlns:xsi="http://www.w3.org/2001/XMLSchema-instance" xmlns:xsd="http://www.w3.org/2001/XMLSchema" xmlns="http://www.boldonjames.com/2008/01/sie/internal/label" sislVersion="0" policy="a10f9ac0-5937-4b4f-b459-96aedd9ed2c5" origin="userSelected">
+  <element uid="9920fcc9-9f43-4d43-9e3e-b98a219cfd55" value=""/>
+</sisl>
+</file>
+
+<file path=customXml/itemProps1.xml><?xml version="1.0" encoding="utf-8"?>
+<ds:datastoreItem xmlns:ds="http://schemas.openxmlformats.org/officeDocument/2006/customXml" ds:itemID="{6E6B17AD-F850-49E7-B468-742D096BC617}">
+  <ds:schemaRefs>
+    <ds:schemaRef ds:uri="http://www.w3.org/2001/XMLSchema"/>
+    <ds:schemaRef ds:uri="http://www.boldonjames.com/2008/01/sie/internal/label"/>
+  </ds:schemaRefs>
+</ds:datastoreItem>
 </file>
</xml_diff>